<commit_message>
Fix manual test (dummy_render)
</commit_message>
<xml_diff>
--- a/office_templates/raw_templates/template.pptx
+++ b/office_templates/raw_templates/template.pptx
@@ -1,5 +1,5 @@
 
-<file path=ppt/charts/chart3.xml><?xml version="1.0" encoding="utf-8"?>
+<file path=ppt/charts/chart1.xml><?xml version="1.0" encoding="utf-8"?>
 <c:chartSpace xmlns:c="http://schemas.openxmlformats.org/drawingml/2006/chart" xmlns:a="http://schemas.openxmlformats.org/drawingml/2006/main" xmlns:r="http://schemas.openxmlformats.org/officeDocument/2006/relationships" xmlns:c16r2="http://schemas.microsoft.com/office/drawing/2015/06/chart">
   <c:date1904 val="0"/>
   <c:lang val="en-US"/>
@@ -343,7 +343,7 @@
 </c:chartSpace>
 </file>
 
-<file path=ppt/charts/chart4.xml><?xml version="1.0" encoding="utf-8"?>
+<file path=ppt/charts/chart2.xml><?xml version="1.0" encoding="utf-8"?>
 <c:chartSpace xmlns:c="http://schemas.openxmlformats.org/drawingml/2006/chart" xmlns:a="http://schemas.openxmlformats.org/drawingml/2006/main" xmlns:r="http://schemas.openxmlformats.org/officeDocument/2006/relationships" xmlns:c16r2="http://schemas.microsoft.com/office/drawing/2015/06/chart">
   <c:date1904 val="0"/>
   <c:lang val="en-US"/>
@@ -687,7 +687,7 @@
 </cs:colorStyle>
 </file>
 
-<file path=ppt/charts/colors3.xml><?xml version="1.0" encoding="utf-8"?>
+<file path=ppt/charts/colors2.xml><?xml version="1.0" encoding="utf-8"?>
 <cs:colorStyle xmlns:cs="http://schemas.microsoft.com/office/drawing/2012/chartStyle" xmlns:a="http://schemas.openxmlformats.org/drawingml/2006/main" meth="cycle" id="10">
   <a:schemeClr val="accent1"/>
   <a:schemeClr val="accent2"/>
@@ -727,47 +727,7 @@
 </cs:colorStyle>
 </file>
 
-<file path=ppt/charts/colors4.xml><?xml version="1.0" encoding="utf-8"?>
-<cs:colorStyle xmlns:cs="http://schemas.microsoft.com/office/drawing/2012/chartStyle" xmlns:a="http://schemas.openxmlformats.org/drawingml/2006/main" meth="cycle" id="10">
-  <a:schemeClr val="accent1"/>
-  <a:schemeClr val="accent2"/>
-  <a:schemeClr val="accent3"/>
-  <a:schemeClr val="accent4"/>
-  <a:schemeClr val="accent5"/>
-  <a:schemeClr val="accent6"/>
-  <cs:variation/>
-  <cs:variation>
-    <a:lumMod val="60000"/>
-  </cs:variation>
-  <cs:variation>
-    <a:lumMod val="80000"/>
-    <a:lumOff val="20000"/>
-  </cs:variation>
-  <cs:variation>
-    <a:lumMod val="80000"/>
-  </cs:variation>
-  <cs:variation>
-    <a:lumMod val="60000"/>
-    <a:lumOff val="40000"/>
-  </cs:variation>
-  <cs:variation>
-    <a:lumMod val="50000"/>
-  </cs:variation>
-  <cs:variation>
-    <a:lumMod val="70000"/>
-    <a:lumOff val="30000"/>
-  </cs:variation>
-  <cs:variation>
-    <a:lumMod val="70000"/>
-  </cs:variation>
-  <cs:variation>
-    <a:lumMod val="50000"/>
-    <a:lumOff val="50000"/>
-  </cs:variation>
-</cs:colorStyle>
-</file>
-
-<file path=ppt/charts/style3.xml><?xml version="1.0" encoding="utf-8"?>
+<file path=ppt/charts/style1.xml><?xml version="1.0" encoding="utf-8"?>
 <cs:chartStyle xmlns:cs="http://schemas.microsoft.com/office/drawing/2012/chartStyle" xmlns:a="http://schemas.openxmlformats.org/drawingml/2006/main" id="251">
   <cs:axisTitle>
     <cs:lnRef idx="0"/>
@@ -1286,7 +1246,7 @@
 </cs:chartStyle>
 </file>
 
-<file path=ppt/charts/style4.xml><?xml version="1.0" encoding="utf-8"?>
+<file path=ppt/charts/style2.xml><?xml version="1.0" encoding="utf-8"?>
 <cs:chartStyle xmlns:cs="http://schemas.microsoft.com/office/drawing/2012/chartStyle" xmlns:a="http://schemas.openxmlformats.org/drawingml/2006/main" id="251">
   <cs:axisTitle>
     <cs:lnRef idx="0"/>
@@ -1803,4 +1763,2585 @@
     </cs:spPr>
   </cs:wall>
 </cs:chartStyle>
+</file>
+
+<file path=ppt/slideLayouts/slideLayout1.xml><?xml version="1.0" encoding="utf-8"?>
+<p:sldLayout xmlns:a="http://schemas.openxmlformats.org/drawingml/2006/main" xmlns:r="http://schemas.openxmlformats.org/officeDocument/2006/relationships" xmlns:p="http://schemas.openxmlformats.org/presentationml/2006/main" type="title" preserve="1">
+  <p:cSld name="Title Slide">
+    <p:spTree>
+      <p:nvGrpSpPr>
+        <p:cNvPr id="1" name=""/>
+        <p:cNvGrpSpPr/>
+        <p:nvPr/>
+      </p:nvGrpSpPr>
+      <p:grpSpPr>
+        <a:xfrm>
+          <a:off x="0" y="0"/>
+          <a:ext cx="0" cy="0"/>
+          <a:chOff x="0" y="0"/>
+          <a:chExt cx="0" cy="0"/>
+        </a:xfrm>
+      </p:grpSpPr>
+      <p:sp>
+        <p:nvSpPr>
+          <p:cNvPr id="2" name="Title 1">
+            <a:extLst>
+              <a:ext uri="{FF2B5EF4-FFF2-40B4-BE49-F238E27FC236}">
+                <a16:creationId xmlns:a16="http://schemas.microsoft.com/office/drawing/2014/main" id="{C8936798-D461-46B5-F5F6-AF7C788352B5}"/>
+              </a:ext>
+            </a:extLst>
+          </p:cNvPr>
+          <p:cNvSpPr>
+            <a:spLocks noGrp="1"/>
+          </p:cNvSpPr>
+          <p:nvPr>
+            <p:ph type="ctrTitle"/>
+          </p:nvPr>
+        </p:nvSpPr>
+        <p:spPr>
+          <a:xfrm>
+            <a:off x="1524000" y="1122363"/>
+            <a:ext cx="9144000" cy="2387600"/>
+          </a:xfrm>
+        </p:spPr>
+        <p:txBody>
+          <a:bodyPr anchor="b"/>
+          <a:lstStyle>
+            <a:lvl1pPr algn="ctr">
+              <a:defRPr sz="6000"/>
+            </a:lvl1pPr>
+          </a:lstStyle>
+          <a:p>
+            <a:r>
+              <a:rPr lang="en-US"/>
+              <a:t>Click to edit Master title style</a:t>
+            </a:r>
+          </a:p>
+        </p:txBody>
+      </p:sp>
+      <p:sp>
+        <p:nvSpPr>
+          <p:cNvPr id="3" name="Subtitle 2">
+            <a:extLst>
+              <a:ext uri="{FF2B5EF4-FFF2-40B4-BE49-F238E27FC236}">
+                <a16:creationId xmlns:a16="http://schemas.microsoft.com/office/drawing/2014/main" id="{E0C71BC2-6967-F97C-FEA3-E829863208A1}"/>
+              </a:ext>
+            </a:extLst>
+          </p:cNvPr>
+          <p:cNvSpPr>
+            <a:spLocks noGrp="1"/>
+          </p:cNvSpPr>
+          <p:nvPr>
+            <p:ph type="subTitle" idx="1"/>
+          </p:nvPr>
+        </p:nvSpPr>
+        <p:spPr>
+          <a:xfrm>
+            <a:off x="1524000" y="3602038"/>
+            <a:ext cx="9144000" cy="1655762"/>
+          </a:xfrm>
+        </p:spPr>
+        <p:txBody>
+          <a:bodyPr/>
+          <a:lstStyle>
+            <a:lvl1pPr marL="0" indent="0" algn="ctr">
+              <a:buNone/>
+              <a:defRPr sz="2400"/>
+            </a:lvl1pPr>
+            <a:lvl2pPr marL="457200" indent="0" algn="ctr">
+              <a:buNone/>
+              <a:defRPr sz="2000"/>
+            </a:lvl2pPr>
+            <a:lvl3pPr marL="914400" indent="0" algn="ctr">
+              <a:buNone/>
+              <a:defRPr sz="1800"/>
+            </a:lvl3pPr>
+            <a:lvl4pPr marL="1371600" indent="0" algn="ctr">
+              <a:buNone/>
+              <a:defRPr sz="1600"/>
+            </a:lvl4pPr>
+            <a:lvl5pPr marL="1828800" indent="0" algn="ctr">
+              <a:buNone/>
+              <a:defRPr sz="1600"/>
+            </a:lvl5pPr>
+            <a:lvl6pPr marL="2286000" indent="0" algn="ctr">
+              <a:buNone/>
+              <a:defRPr sz="1600"/>
+            </a:lvl6pPr>
+            <a:lvl7pPr marL="2743200" indent="0" algn="ctr">
+              <a:buNone/>
+              <a:defRPr sz="1600"/>
+            </a:lvl7pPr>
+            <a:lvl8pPr marL="3200400" indent="0" algn="ctr">
+              <a:buNone/>
+              <a:defRPr sz="1600"/>
+            </a:lvl8pPr>
+            <a:lvl9pPr marL="3657600" indent="0" algn="ctr">
+              <a:buNone/>
+              <a:defRPr sz="1600"/>
+            </a:lvl9pPr>
+          </a:lstStyle>
+          <a:p>
+            <a:r>
+              <a:rPr lang="en-US"/>
+              <a:t>Click to edit Master subtitle style</a:t>
+            </a:r>
+          </a:p>
+        </p:txBody>
+      </p:sp>
+      <p:sp>
+        <p:nvSpPr>
+          <p:cNvPr id="4" name="Date Placeholder 3">
+            <a:extLst>
+              <a:ext uri="{FF2B5EF4-FFF2-40B4-BE49-F238E27FC236}">
+                <a16:creationId xmlns:a16="http://schemas.microsoft.com/office/drawing/2014/main" id="{5D382680-42AE-AFE0-C9C7-C59197A12963}"/>
+              </a:ext>
+            </a:extLst>
+          </p:cNvPr>
+          <p:cNvSpPr>
+            <a:spLocks noGrp="1"/>
+          </p:cNvSpPr>
+          <p:nvPr>
+            <p:ph type="dt" sz="half" idx="10"/>
+          </p:nvPr>
+        </p:nvSpPr>
+        <p:spPr/>
+        <p:txBody>
+          <a:bodyPr/>
+          <a:lstStyle/>
+          <a:p>
+            <a:fld id="{8427D8FB-80AB-4B65-A20D-AFAA152C1E96}" type="datetimeFigureOut">
+              <a:rPr lang="en-US" smtClean="0"/>
+              <a:t>7/3/25</a:t>
+            </a:fld>
+            <a:endParaRPr lang="en-US"/>
+          </a:p>
+        </p:txBody>
+      </p:sp>
+      <p:sp>
+        <p:nvSpPr>
+          <p:cNvPr id="5" name="Footer Placeholder 4">
+            <a:extLst>
+              <a:ext uri="{FF2B5EF4-FFF2-40B4-BE49-F238E27FC236}">
+                <a16:creationId xmlns:a16="http://schemas.microsoft.com/office/drawing/2014/main" id="{563130D6-A19D-C0C8-170C-F2CDBFC11314}"/>
+              </a:ext>
+            </a:extLst>
+          </p:cNvPr>
+          <p:cNvSpPr>
+            <a:spLocks noGrp="1"/>
+          </p:cNvSpPr>
+          <p:nvPr>
+            <p:ph type="ftr" sz="quarter" idx="11"/>
+          </p:nvPr>
+        </p:nvSpPr>
+        <p:spPr/>
+        <p:txBody>
+          <a:bodyPr/>
+          <a:lstStyle/>
+          <a:p>
+            <a:endParaRPr lang="en-US"/>
+          </a:p>
+        </p:txBody>
+      </p:sp>
+      <p:sp>
+        <p:nvSpPr>
+          <p:cNvPr id="6" name="Slide Number Placeholder 5">
+            <a:extLst>
+              <a:ext uri="{FF2B5EF4-FFF2-40B4-BE49-F238E27FC236}">
+                <a16:creationId xmlns:a16="http://schemas.microsoft.com/office/drawing/2014/main" id="{BA10FB9E-FAD7-B613-6456-2FEDCBA973CC}"/>
+              </a:ext>
+            </a:extLst>
+          </p:cNvPr>
+          <p:cNvSpPr>
+            <a:spLocks noGrp="1"/>
+          </p:cNvSpPr>
+          <p:nvPr>
+            <p:ph type="sldNum" sz="quarter" idx="12"/>
+          </p:nvPr>
+        </p:nvSpPr>
+        <p:spPr/>
+        <p:txBody>
+          <a:bodyPr/>
+          <a:lstStyle/>
+          <a:p>
+            <a:fld id="{282CF145-C1F5-4F0A-9E2D-FC4643FE6C56}" type="slidenum">
+              <a:rPr lang="en-US" smtClean="0"/>
+              <a:t>‹#›</a:t>
+            </a:fld>
+            <a:endParaRPr lang="en-US"/>
+          </a:p>
+        </p:txBody>
+      </p:sp>
+    </p:spTree>
+    <p:extLst>
+      <p:ext uri="{BB962C8B-B14F-4D97-AF65-F5344CB8AC3E}">
+        <p14:creationId xmlns:p14="http://schemas.microsoft.com/office/powerpoint/2010/main" val="3802838184"/>
+      </p:ext>
+    </p:extLst>
+  </p:cSld>
+  <p:clrMapOvr>
+    <a:masterClrMapping/>
+  </p:clrMapOvr>
+</p:sldLayout>
+</file>
+
+<file path=ppt/slideLayouts/slideLayout10.xml><?xml version="1.0" encoding="utf-8"?>
+<p:sldLayout xmlns:a="http://schemas.openxmlformats.org/drawingml/2006/main" xmlns:r="http://schemas.openxmlformats.org/officeDocument/2006/relationships" xmlns:p="http://schemas.openxmlformats.org/presentationml/2006/main" type="vertTx" preserve="1">
+  <p:cSld name="Title and Vertical Text">
+    <p:spTree>
+      <p:nvGrpSpPr>
+        <p:cNvPr id="1" name=""/>
+        <p:cNvGrpSpPr/>
+        <p:nvPr/>
+      </p:nvGrpSpPr>
+      <p:grpSpPr>
+        <a:xfrm>
+          <a:off x="0" y="0"/>
+          <a:ext cx="0" cy="0"/>
+          <a:chOff x="0" y="0"/>
+          <a:chExt cx="0" cy="0"/>
+        </a:xfrm>
+      </p:grpSpPr>
+      <p:sp>
+        <p:nvSpPr>
+          <p:cNvPr id="2" name="Title 1">
+            <a:extLst>
+              <a:ext uri="{FF2B5EF4-FFF2-40B4-BE49-F238E27FC236}">
+                <a16:creationId xmlns:a16="http://schemas.microsoft.com/office/drawing/2014/main" id="{E01E21C2-B95B-E0DA-7BBB-423F7E150C2D}"/>
+              </a:ext>
+            </a:extLst>
+          </p:cNvPr>
+          <p:cNvSpPr>
+            <a:spLocks noGrp="1"/>
+          </p:cNvSpPr>
+          <p:nvPr>
+            <p:ph type="title"/>
+          </p:nvPr>
+        </p:nvSpPr>
+        <p:spPr/>
+        <p:txBody>
+          <a:bodyPr/>
+          <a:lstStyle/>
+          <a:p>
+            <a:r>
+              <a:rPr lang="en-US"/>
+              <a:t>Click to edit Master title style</a:t>
+            </a:r>
+          </a:p>
+        </p:txBody>
+      </p:sp>
+      <p:sp>
+        <p:nvSpPr>
+          <p:cNvPr id="3" name="Vertical Text Placeholder 2">
+            <a:extLst>
+              <a:ext uri="{FF2B5EF4-FFF2-40B4-BE49-F238E27FC236}">
+                <a16:creationId xmlns:a16="http://schemas.microsoft.com/office/drawing/2014/main" id="{7E6AD210-8607-AE25-AACC-647512667310}"/>
+              </a:ext>
+            </a:extLst>
+          </p:cNvPr>
+          <p:cNvSpPr>
+            <a:spLocks noGrp="1"/>
+          </p:cNvSpPr>
+          <p:nvPr>
+            <p:ph type="body" orient="vert" idx="1"/>
+          </p:nvPr>
+        </p:nvSpPr>
+        <p:spPr/>
+        <p:txBody>
+          <a:bodyPr vert="eaVert"/>
+          <a:lstStyle/>
+          <a:p>
+            <a:pPr lvl="0"/>
+            <a:r>
+              <a:rPr lang="en-US"/>
+              <a:t>Click to edit Master text styles</a:t>
+            </a:r>
+          </a:p>
+          <a:p>
+            <a:pPr lvl="1"/>
+            <a:r>
+              <a:rPr lang="en-US"/>
+              <a:t>Second level</a:t>
+            </a:r>
+          </a:p>
+          <a:p>
+            <a:pPr lvl="2"/>
+            <a:r>
+              <a:rPr lang="en-US"/>
+              <a:t>Third level</a:t>
+            </a:r>
+          </a:p>
+          <a:p>
+            <a:pPr lvl="3"/>
+            <a:r>
+              <a:rPr lang="en-US"/>
+              <a:t>Fourth level</a:t>
+            </a:r>
+          </a:p>
+          <a:p>
+            <a:pPr lvl="4"/>
+            <a:r>
+              <a:rPr lang="en-US"/>
+              <a:t>Fifth level</a:t>
+            </a:r>
+          </a:p>
+        </p:txBody>
+      </p:sp>
+      <p:sp>
+        <p:nvSpPr>
+          <p:cNvPr id="4" name="Date Placeholder 3">
+            <a:extLst>
+              <a:ext uri="{FF2B5EF4-FFF2-40B4-BE49-F238E27FC236}">
+                <a16:creationId xmlns:a16="http://schemas.microsoft.com/office/drawing/2014/main" id="{F7B2263B-3090-F8D7-0843-BF65D896B2C9}"/>
+              </a:ext>
+            </a:extLst>
+          </p:cNvPr>
+          <p:cNvSpPr>
+            <a:spLocks noGrp="1"/>
+          </p:cNvSpPr>
+          <p:nvPr>
+            <p:ph type="dt" sz="half" idx="10"/>
+          </p:nvPr>
+        </p:nvSpPr>
+        <p:spPr/>
+        <p:txBody>
+          <a:bodyPr/>
+          <a:lstStyle/>
+          <a:p>
+            <a:fld id="{8427D8FB-80AB-4B65-A20D-AFAA152C1E96}" type="datetimeFigureOut">
+              <a:rPr lang="en-US" smtClean="0"/>
+              <a:t>7/3/25</a:t>
+            </a:fld>
+            <a:endParaRPr lang="en-US"/>
+          </a:p>
+        </p:txBody>
+      </p:sp>
+      <p:sp>
+        <p:nvSpPr>
+          <p:cNvPr id="5" name="Footer Placeholder 4">
+            <a:extLst>
+              <a:ext uri="{FF2B5EF4-FFF2-40B4-BE49-F238E27FC236}">
+                <a16:creationId xmlns:a16="http://schemas.microsoft.com/office/drawing/2014/main" id="{FC1B10F2-CCF2-7ECE-3A24-3AB5BD62BBB5}"/>
+              </a:ext>
+            </a:extLst>
+          </p:cNvPr>
+          <p:cNvSpPr>
+            <a:spLocks noGrp="1"/>
+          </p:cNvSpPr>
+          <p:nvPr>
+            <p:ph type="ftr" sz="quarter" idx="11"/>
+          </p:nvPr>
+        </p:nvSpPr>
+        <p:spPr/>
+        <p:txBody>
+          <a:bodyPr/>
+          <a:lstStyle/>
+          <a:p>
+            <a:endParaRPr lang="en-US"/>
+          </a:p>
+        </p:txBody>
+      </p:sp>
+      <p:sp>
+        <p:nvSpPr>
+          <p:cNvPr id="6" name="Slide Number Placeholder 5">
+            <a:extLst>
+              <a:ext uri="{FF2B5EF4-FFF2-40B4-BE49-F238E27FC236}">
+                <a16:creationId xmlns:a16="http://schemas.microsoft.com/office/drawing/2014/main" id="{8201E5DE-4DFE-8BE6-8FD6-810B3CAD68D0}"/>
+              </a:ext>
+            </a:extLst>
+          </p:cNvPr>
+          <p:cNvSpPr>
+            <a:spLocks noGrp="1"/>
+          </p:cNvSpPr>
+          <p:nvPr>
+            <p:ph type="sldNum" sz="quarter" idx="12"/>
+          </p:nvPr>
+        </p:nvSpPr>
+        <p:spPr/>
+        <p:txBody>
+          <a:bodyPr/>
+          <a:lstStyle/>
+          <a:p>
+            <a:fld id="{282CF145-C1F5-4F0A-9E2D-FC4643FE6C56}" type="slidenum">
+              <a:rPr lang="en-US" smtClean="0"/>
+              <a:t>‹#›</a:t>
+            </a:fld>
+            <a:endParaRPr lang="en-US"/>
+          </a:p>
+        </p:txBody>
+      </p:sp>
+    </p:spTree>
+    <p:extLst>
+      <p:ext uri="{BB962C8B-B14F-4D97-AF65-F5344CB8AC3E}">
+        <p14:creationId xmlns:p14="http://schemas.microsoft.com/office/powerpoint/2010/main" val="1221959068"/>
+      </p:ext>
+    </p:extLst>
+  </p:cSld>
+  <p:clrMapOvr>
+    <a:masterClrMapping/>
+  </p:clrMapOvr>
+</p:sldLayout>
+</file>
+
+<file path=ppt/slideLayouts/slideLayout11.xml><?xml version="1.0" encoding="utf-8"?>
+<p:sldLayout xmlns:a="http://schemas.openxmlformats.org/drawingml/2006/main" xmlns:r="http://schemas.openxmlformats.org/officeDocument/2006/relationships" xmlns:p="http://schemas.openxmlformats.org/presentationml/2006/main" type="vertTitleAndTx" preserve="1">
+  <p:cSld name="Vertical Title and Text">
+    <p:spTree>
+      <p:nvGrpSpPr>
+        <p:cNvPr id="1" name=""/>
+        <p:cNvGrpSpPr/>
+        <p:nvPr/>
+      </p:nvGrpSpPr>
+      <p:grpSpPr>
+        <a:xfrm>
+          <a:off x="0" y="0"/>
+          <a:ext cx="0" cy="0"/>
+          <a:chOff x="0" y="0"/>
+          <a:chExt cx="0" cy="0"/>
+        </a:xfrm>
+      </p:grpSpPr>
+      <p:sp>
+        <p:nvSpPr>
+          <p:cNvPr id="2" name="Vertical Title 1">
+            <a:extLst>
+              <a:ext uri="{FF2B5EF4-FFF2-40B4-BE49-F238E27FC236}">
+                <a16:creationId xmlns:a16="http://schemas.microsoft.com/office/drawing/2014/main" id="{981B4B59-4C01-0FD6-46AF-DE0AF6966BCA}"/>
+              </a:ext>
+            </a:extLst>
+          </p:cNvPr>
+          <p:cNvSpPr>
+            <a:spLocks noGrp="1"/>
+          </p:cNvSpPr>
+          <p:nvPr>
+            <p:ph type="title" orient="vert"/>
+          </p:nvPr>
+        </p:nvSpPr>
+        <p:spPr>
+          <a:xfrm>
+            <a:off x="8724900" y="365125"/>
+            <a:ext cx="2628900" cy="5811838"/>
+          </a:xfrm>
+        </p:spPr>
+        <p:txBody>
+          <a:bodyPr vert="eaVert"/>
+          <a:lstStyle/>
+          <a:p>
+            <a:r>
+              <a:rPr lang="en-US"/>
+              <a:t>Click to edit Master title style</a:t>
+            </a:r>
+          </a:p>
+        </p:txBody>
+      </p:sp>
+      <p:sp>
+        <p:nvSpPr>
+          <p:cNvPr id="3" name="Vertical Text Placeholder 2">
+            <a:extLst>
+              <a:ext uri="{FF2B5EF4-FFF2-40B4-BE49-F238E27FC236}">
+                <a16:creationId xmlns:a16="http://schemas.microsoft.com/office/drawing/2014/main" id="{30F26B93-C055-C28A-1CD7-3A3D072EE28D}"/>
+              </a:ext>
+            </a:extLst>
+          </p:cNvPr>
+          <p:cNvSpPr>
+            <a:spLocks noGrp="1"/>
+          </p:cNvSpPr>
+          <p:nvPr>
+            <p:ph type="body" orient="vert" idx="1"/>
+          </p:nvPr>
+        </p:nvSpPr>
+        <p:spPr>
+          <a:xfrm>
+            <a:off x="838200" y="365125"/>
+            <a:ext cx="7734300" cy="5811838"/>
+          </a:xfrm>
+        </p:spPr>
+        <p:txBody>
+          <a:bodyPr vert="eaVert"/>
+          <a:lstStyle/>
+          <a:p>
+            <a:pPr lvl="0"/>
+            <a:r>
+              <a:rPr lang="en-US"/>
+              <a:t>Click to edit Master text styles</a:t>
+            </a:r>
+          </a:p>
+          <a:p>
+            <a:pPr lvl="1"/>
+            <a:r>
+              <a:rPr lang="en-US"/>
+              <a:t>Second level</a:t>
+            </a:r>
+          </a:p>
+          <a:p>
+            <a:pPr lvl="2"/>
+            <a:r>
+              <a:rPr lang="en-US"/>
+              <a:t>Third level</a:t>
+            </a:r>
+          </a:p>
+          <a:p>
+            <a:pPr lvl="3"/>
+            <a:r>
+              <a:rPr lang="en-US"/>
+              <a:t>Fourth level</a:t>
+            </a:r>
+          </a:p>
+          <a:p>
+            <a:pPr lvl="4"/>
+            <a:r>
+              <a:rPr lang="en-US"/>
+              <a:t>Fifth level</a:t>
+            </a:r>
+          </a:p>
+        </p:txBody>
+      </p:sp>
+      <p:sp>
+        <p:nvSpPr>
+          <p:cNvPr id="4" name="Date Placeholder 3">
+            <a:extLst>
+              <a:ext uri="{FF2B5EF4-FFF2-40B4-BE49-F238E27FC236}">
+                <a16:creationId xmlns:a16="http://schemas.microsoft.com/office/drawing/2014/main" id="{9DE206DF-0F50-9997-2EDD-7C25D4580FAE}"/>
+              </a:ext>
+            </a:extLst>
+          </p:cNvPr>
+          <p:cNvSpPr>
+            <a:spLocks noGrp="1"/>
+          </p:cNvSpPr>
+          <p:nvPr>
+            <p:ph type="dt" sz="half" idx="10"/>
+          </p:nvPr>
+        </p:nvSpPr>
+        <p:spPr/>
+        <p:txBody>
+          <a:bodyPr/>
+          <a:lstStyle/>
+          <a:p>
+            <a:fld id="{8427D8FB-80AB-4B65-A20D-AFAA152C1E96}" type="datetimeFigureOut">
+              <a:rPr lang="en-US" smtClean="0"/>
+              <a:t>7/3/25</a:t>
+            </a:fld>
+            <a:endParaRPr lang="en-US"/>
+          </a:p>
+        </p:txBody>
+      </p:sp>
+      <p:sp>
+        <p:nvSpPr>
+          <p:cNvPr id="5" name="Footer Placeholder 4">
+            <a:extLst>
+              <a:ext uri="{FF2B5EF4-FFF2-40B4-BE49-F238E27FC236}">
+                <a16:creationId xmlns:a16="http://schemas.microsoft.com/office/drawing/2014/main" id="{8CFF5725-2E25-E135-8FD8-237A7C7F7D48}"/>
+              </a:ext>
+            </a:extLst>
+          </p:cNvPr>
+          <p:cNvSpPr>
+            <a:spLocks noGrp="1"/>
+          </p:cNvSpPr>
+          <p:nvPr>
+            <p:ph type="ftr" sz="quarter" idx="11"/>
+          </p:nvPr>
+        </p:nvSpPr>
+        <p:spPr/>
+        <p:txBody>
+          <a:bodyPr/>
+          <a:lstStyle/>
+          <a:p>
+            <a:endParaRPr lang="en-US"/>
+          </a:p>
+        </p:txBody>
+      </p:sp>
+      <p:sp>
+        <p:nvSpPr>
+          <p:cNvPr id="6" name="Slide Number Placeholder 5">
+            <a:extLst>
+              <a:ext uri="{FF2B5EF4-FFF2-40B4-BE49-F238E27FC236}">
+                <a16:creationId xmlns:a16="http://schemas.microsoft.com/office/drawing/2014/main" id="{9A8142FC-0414-0C68-4EB0-5A1DCC212A12}"/>
+              </a:ext>
+            </a:extLst>
+          </p:cNvPr>
+          <p:cNvSpPr>
+            <a:spLocks noGrp="1"/>
+          </p:cNvSpPr>
+          <p:nvPr>
+            <p:ph type="sldNum" sz="quarter" idx="12"/>
+          </p:nvPr>
+        </p:nvSpPr>
+        <p:spPr/>
+        <p:txBody>
+          <a:bodyPr/>
+          <a:lstStyle/>
+          <a:p>
+            <a:fld id="{282CF145-C1F5-4F0A-9E2D-FC4643FE6C56}" type="slidenum">
+              <a:rPr lang="en-US" smtClean="0"/>
+              <a:t>‹#›</a:t>
+            </a:fld>
+            <a:endParaRPr lang="en-US"/>
+          </a:p>
+        </p:txBody>
+      </p:sp>
+    </p:spTree>
+    <p:extLst>
+      <p:ext uri="{BB962C8B-B14F-4D97-AF65-F5344CB8AC3E}">
+        <p14:creationId xmlns:p14="http://schemas.microsoft.com/office/powerpoint/2010/main" val="564847202"/>
+      </p:ext>
+    </p:extLst>
+  </p:cSld>
+  <p:clrMapOvr>
+    <a:masterClrMapping/>
+  </p:clrMapOvr>
+</p:sldLayout>
+</file>
+
+<file path=ppt/slideLayouts/slideLayout2.xml><?xml version="1.0" encoding="utf-8"?>
+<p:sldLayout xmlns:a="http://schemas.openxmlformats.org/drawingml/2006/main" xmlns:r="http://schemas.openxmlformats.org/officeDocument/2006/relationships" xmlns:p="http://schemas.openxmlformats.org/presentationml/2006/main" type="obj" preserve="1">
+  <p:cSld name="Title and Content">
+    <p:spTree>
+      <p:nvGrpSpPr>
+        <p:cNvPr id="1" name=""/>
+        <p:cNvGrpSpPr/>
+        <p:nvPr/>
+      </p:nvGrpSpPr>
+      <p:grpSpPr>
+        <a:xfrm>
+          <a:off x="0" y="0"/>
+          <a:ext cx="0" cy="0"/>
+          <a:chOff x="0" y="0"/>
+          <a:chExt cx="0" cy="0"/>
+        </a:xfrm>
+      </p:grpSpPr>
+      <p:sp>
+        <p:nvSpPr>
+          <p:cNvPr id="2" name="Title 1">
+            <a:extLst>
+              <a:ext uri="{FF2B5EF4-FFF2-40B4-BE49-F238E27FC236}">
+                <a16:creationId xmlns:a16="http://schemas.microsoft.com/office/drawing/2014/main" id="{6817DDF5-E22E-16AD-2762-77BA94F557ED}"/>
+              </a:ext>
+            </a:extLst>
+          </p:cNvPr>
+          <p:cNvSpPr>
+            <a:spLocks noGrp="1"/>
+          </p:cNvSpPr>
+          <p:nvPr>
+            <p:ph type="title"/>
+          </p:nvPr>
+        </p:nvSpPr>
+        <p:spPr/>
+        <p:txBody>
+          <a:bodyPr/>
+          <a:lstStyle/>
+          <a:p>
+            <a:r>
+              <a:rPr lang="en-US"/>
+              <a:t>Click to edit Master title style</a:t>
+            </a:r>
+          </a:p>
+        </p:txBody>
+      </p:sp>
+      <p:sp>
+        <p:nvSpPr>
+          <p:cNvPr id="3" name="Content Placeholder 2">
+            <a:extLst>
+              <a:ext uri="{FF2B5EF4-FFF2-40B4-BE49-F238E27FC236}">
+                <a16:creationId xmlns:a16="http://schemas.microsoft.com/office/drawing/2014/main" id="{8FF2E5BD-5A7C-81CB-EEED-3B72A1CFBD9B}"/>
+              </a:ext>
+            </a:extLst>
+          </p:cNvPr>
+          <p:cNvSpPr>
+            <a:spLocks noGrp="1"/>
+          </p:cNvSpPr>
+          <p:nvPr>
+            <p:ph idx="1"/>
+          </p:nvPr>
+        </p:nvSpPr>
+        <p:spPr/>
+        <p:txBody>
+          <a:bodyPr/>
+          <a:lstStyle/>
+          <a:p>
+            <a:pPr lvl="0"/>
+            <a:r>
+              <a:rPr lang="en-US"/>
+              <a:t>Click to edit Master text styles</a:t>
+            </a:r>
+          </a:p>
+          <a:p>
+            <a:pPr lvl="1"/>
+            <a:r>
+              <a:rPr lang="en-US"/>
+              <a:t>Second level</a:t>
+            </a:r>
+          </a:p>
+          <a:p>
+            <a:pPr lvl="2"/>
+            <a:r>
+              <a:rPr lang="en-US"/>
+              <a:t>Third level</a:t>
+            </a:r>
+          </a:p>
+          <a:p>
+            <a:pPr lvl="3"/>
+            <a:r>
+              <a:rPr lang="en-US"/>
+              <a:t>Fourth level</a:t>
+            </a:r>
+          </a:p>
+          <a:p>
+            <a:pPr lvl="4"/>
+            <a:r>
+              <a:rPr lang="en-US"/>
+              <a:t>Fifth level</a:t>
+            </a:r>
+          </a:p>
+        </p:txBody>
+      </p:sp>
+      <p:sp>
+        <p:nvSpPr>
+          <p:cNvPr id="4" name="Date Placeholder 3">
+            <a:extLst>
+              <a:ext uri="{FF2B5EF4-FFF2-40B4-BE49-F238E27FC236}">
+                <a16:creationId xmlns:a16="http://schemas.microsoft.com/office/drawing/2014/main" id="{C865DF21-9FF4-8CE7-6FB2-E33F565C6E30}"/>
+              </a:ext>
+            </a:extLst>
+          </p:cNvPr>
+          <p:cNvSpPr>
+            <a:spLocks noGrp="1"/>
+          </p:cNvSpPr>
+          <p:nvPr>
+            <p:ph type="dt" sz="half" idx="10"/>
+          </p:nvPr>
+        </p:nvSpPr>
+        <p:spPr/>
+        <p:txBody>
+          <a:bodyPr/>
+          <a:lstStyle/>
+          <a:p>
+            <a:fld id="{8427D8FB-80AB-4B65-A20D-AFAA152C1E96}" type="datetimeFigureOut">
+              <a:rPr lang="en-US" smtClean="0"/>
+              <a:t>7/3/25</a:t>
+            </a:fld>
+            <a:endParaRPr lang="en-US"/>
+          </a:p>
+        </p:txBody>
+      </p:sp>
+      <p:sp>
+        <p:nvSpPr>
+          <p:cNvPr id="5" name="Footer Placeholder 4">
+            <a:extLst>
+              <a:ext uri="{FF2B5EF4-FFF2-40B4-BE49-F238E27FC236}">
+                <a16:creationId xmlns:a16="http://schemas.microsoft.com/office/drawing/2014/main" id="{F19F5A7F-9895-6CAD-9A08-B55A1E9C291D}"/>
+              </a:ext>
+            </a:extLst>
+          </p:cNvPr>
+          <p:cNvSpPr>
+            <a:spLocks noGrp="1"/>
+          </p:cNvSpPr>
+          <p:nvPr>
+            <p:ph type="ftr" sz="quarter" idx="11"/>
+          </p:nvPr>
+        </p:nvSpPr>
+        <p:spPr/>
+        <p:txBody>
+          <a:bodyPr/>
+          <a:lstStyle/>
+          <a:p>
+            <a:endParaRPr lang="en-US"/>
+          </a:p>
+        </p:txBody>
+      </p:sp>
+      <p:sp>
+        <p:nvSpPr>
+          <p:cNvPr id="6" name="Slide Number Placeholder 5">
+            <a:extLst>
+              <a:ext uri="{FF2B5EF4-FFF2-40B4-BE49-F238E27FC236}">
+                <a16:creationId xmlns:a16="http://schemas.microsoft.com/office/drawing/2014/main" id="{15491824-FB86-C00E-A18C-E8250D869681}"/>
+              </a:ext>
+            </a:extLst>
+          </p:cNvPr>
+          <p:cNvSpPr>
+            <a:spLocks noGrp="1"/>
+          </p:cNvSpPr>
+          <p:nvPr>
+            <p:ph type="sldNum" sz="quarter" idx="12"/>
+          </p:nvPr>
+        </p:nvSpPr>
+        <p:spPr/>
+        <p:txBody>
+          <a:bodyPr/>
+          <a:lstStyle/>
+          <a:p>
+            <a:fld id="{282CF145-C1F5-4F0A-9E2D-FC4643FE6C56}" type="slidenum">
+              <a:rPr lang="en-US" smtClean="0"/>
+              <a:t>‹#›</a:t>
+            </a:fld>
+            <a:endParaRPr lang="en-US"/>
+          </a:p>
+        </p:txBody>
+      </p:sp>
+    </p:spTree>
+    <p:extLst>
+      <p:ext uri="{BB962C8B-B14F-4D97-AF65-F5344CB8AC3E}">
+        <p14:creationId xmlns:p14="http://schemas.microsoft.com/office/powerpoint/2010/main" val="534923228"/>
+      </p:ext>
+    </p:extLst>
+  </p:cSld>
+  <p:clrMapOvr>
+    <a:masterClrMapping/>
+  </p:clrMapOvr>
+</p:sldLayout>
+</file>
+
+<file path=ppt/slideLayouts/slideLayout3.xml><?xml version="1.0" encoding="utf-8"?>
+<p:sldLayout xmlns:a="http://schemas.openxmlformats.org/drawingml/2006/main" xmlns:r="http://schemas.openxmlformats.org/officeDocument/2006/relationships" xmlns:p="http://schemas.openxmlformats.org/presentationml/2006/main" type="secHead" preserve="1">
+  <p:cSld name="Section Header">
+    <p:spTree>
+      <p:nvGrpSpPr>
+        <p:cNvPr id="1" name=""/>
+        <p:cNvGrpSpPr/>
+        <p:nvPr/>
+      </p:nvGrpSpPr>
+      <p:grpSpPr>
+        <a:xfrm>
+          <a:off x="0" y="0"/>
+          <a:ext cx="0" cy="0"/>
+          <a:chOff x="0" y="0"/>
+          <a:chExt cx="0" cy="0"/>
+        </a:xfrm>
+      </p:grpSpPr>
+      <p:sp>
+        <p:nvSpPr>
+          <p:cNvPr id="2" name="Title 1">
+            <a:extLst>
+              <a:ext uri="{FF2B5EF4-FFF2-40B4-BE49-F238E27FC236}">
+                <a16:creationId xmlns:a16="http://schemas.microsoft.com/office/drawing/2014/main" id="{87E89570-31D9-F861-40E5-964BCEC78551}"/>
+              </a:ext>
+            </a:extLst>
+          </p:cNvPr>
+          <p:cNvSpPr>
+            <a:spLocks noGrp="1"/>
+          </p:cNvSpPr>
+          <p:nvPr>
+            <p:ph type="title"/>
+          </p:nvPr>
+        </p:nvSpPr>
+        <p:spPr>
+          <a:xfrm>
+            <a:off x="831850" y="1709738"/>
+            <a:ext cx="10515600" cy="2852737"/>
+          </a:xfrm>
+        </p:spPr>
+        <p:txBody>
+          <a:bodyPr anchor="b"/>
+          <a:lstStyle>
+            <a:lvl1pPr>
+              <a:defRPr sz="6000"/>
+            </a:lvl1pPr>
+          </a:lstStyle>
+          <a:p>
+            <a:r>
+              <a:rPr lang="en-US"/>
+              <a:t>Click to edit Master title style</a:t>
+            </a:r>
+          </a:p>
+        </p:txBody>
+      </p:sp>
+      <p:sp>
+        <p:nvSpPr>
+          <p:cNvPr id="3" name="Text Placeholder 2">
+            <a:extLst>
+              <a:ext uri="{FF2B5EF4-FFF2-40B4-BE49-F238E27FC236}">
+                <a16:creationId xmlns:a16="http://schemas.microsoft.com/office/drawing/2014/main" id="{767B5ECF-4328-0A1E-907C-F6D09BD234BF}"/>
+              </a:ext>
+            </a:extLst>
+          </p:cNvPr>
+          <p:cNvSpPr>
+            <a:spLocks noGrp="1"/>
+          </p:cNvSpPr>
+          <p:nvPr>
+            <p:ph type="body" idx="1"/>
+          </p:nvPr>
+        </p:nvSpPr>
+        <p:spPr>
+          <a:xfrm>
+            <a:off x="831850" y="4589463"/>
+            <a:ext cx="10515600" cy="1500187"/>
+          </a:xfrm>
+        </p:spPr>
+        <p:txBody>
+          <a:bodyPr/>
+          <a:lstStyle>
+            <a:lvl1pPr marL="0" indent="0">
+              <a:buNone/>
+              <a:defRPr sz="2400">
+                <a:solidFill>
+                  <a:schemeClr val="tx1">
+                    <a:tint val="82000"/>
+                  </a:schemeClr>
+                </a:solidFill>
+              </a:defRPr>
+            </a:lvl1pPr>
+            <a:lvl2pPr marL="457200" indent="0">
+              <a:buNone/>
+              <a:defRPr sz="2000">
+                <a:solidFill>
+                  <a:schemeClr val="tx1">
+                    <a:tint val="82000"/>
+                  </a:schemeClr>
+                </a:solidFill>
+              </a:defRPr>
+            </a:lvl2pPr>
+            <a:lvl3pPr marL="914400" indent="0">
+              <a:buNone/>
+              <a:defRPr sz="1800">
+                <a:solidFill>
+                  <a:schemeClr val="tx1">
+                    <a:tint val="82000"/>
+                  </a:schemeClr>
+                </a:solidFill>
+              </a:defRPr>
+            </a:lvl3pPr>
+            <a:lvl4pPr marL="1371600" indent="0">
+              <a:buNone/>
+              <a:defRPr sz="1600">
+                <a:solidFill>
+                  <a:schemeClr val="tx1">
+                    <a:tint val="82000"/>
+                  </a:schemeClr>
+                </a:solidFill>
+              </a:defRPr>
+            </a:lvl4pPr>
+            <a:lvl5pPr marL="1828800" indent="0">
+              <a:buNone/>
+              <a:defRPr sz="1600">
+                <a:solidFill>
+                  <a:schemeClr val="tx1">
+                    <a:tint val="82000"/>
+                  </a:schemeClr>
+                </a:solidFill>
+              </a:defRPr>
+            </a:lvl5pPr>
+            <a:lvl6pPr marL="2286000" indent="0">
+              <a:buNone/>
+              <a:defRPr sz="1600">
+                <a:solidFill>
+                  <a:schemeClr val="tx1">
+                    <a:tint val="82000"/>
+                  </a:schemeClr>
+                </a:solidFill>
+              </a:defRPr>
+            </a:lvl6pPr>
+            <a:lvl7pPr marL="2743200" indent="0">
+              <a:buNone/>
+              <a:defRPr sz="1600">
+                <a:solidFill>
+                  <a:schemeClr val="tx1">
+                    <a:tint val="82000"/>
+                  </a:schemeClr>
+                </a:solidFill>
+              </a:defRPr>
+            </a:lvl7pPr>
+            <a:lvl8pPr marL="3200400" indent="0">
+              <a:buNone/>
+              <a:defRPr sz="1600">
+                <a:solidFill>
+                  <a:schemeClr val="tx1">
+                    <a:tint val="82000"/>
+                  </a:schemeClr>
+                </a:solidFill>
+              </a:defRPr>
+            </a:lvl8pPr>
+            <a:lvl9pPr marL="3657600" indent="0">
+              <a:buNone/>
+              <a:defRPr sz="1600">
+                <a:solidFill>
+                  <a:schemeClr val="tx1">
+                    <a:tint val="82000"/>
+                  </a:schemeClr>
+                </a:solidFill>
+              </a:defRPr>
+            </a:lvl9pPr>
+          </a:lstStyle>
+          <a:p>
+            <a:pPr lvl="0"/>
+            <a:r>
+              <a:rPr lang="en-US"/>
+              <a:t>Click to edit Master text styles</a:t>
+            </a:r>
+          </a:p>
+        </p:txBody>
+      </p:sp>
+      <p:sp>
+        <p:nvSpPr>
+          <p:cNvPr id="4" name="Date Placeholder 3">
+            <a:extLst>
+              <a:ext uri="{FF2B5EF4-FFF2-40B4-BE49-F238E27FC236}">
+                <a16:creationId xmlns:a16="http://schemas.microsoft.com/office/drawing/2014/main" id="{FF5B5DB2-004C-0ACC-DB48-FE551BA44360}"/>
+              </a:ext>
+            </a:extLst>
+          </p:cNvPr>
+          <p:cNvSpPr>
+            <a:spLocks noGrp="1"/>
+          </p:cNvSpPr>
+          <p:nvPr>
+            <p:ph type="dt" sz="half" idx="10"/>
+          </p:nvPr>
+        </p:nvSpPr>
+        <p:spPr/>
+        <p:txBody>
+          <a:bodyPr/>
+          <a:lstStyle/>
+          <a:p>
+            <a:fld id="{8427D8FB-80AB-4B65-A20D-AFAA152C1E96}" type="datetimeFigureOut">
+              <a:rPr lang="en-US" smtClean="0"/>
+              <a:t>7/3/25</a:t>
+            </a:fld>
+            <a:endParaRPr lang="en-US"/>
+          </a:p>
+        </p:txBody>
+      </p:sp>
+      <p:sp>
+        <p:nvSpPr>
+          <p:cNvPr id="5" name="Footer Placeholder 4">
+            <a:extLst>
+              <a:ext uri="{FF2B5EF4-FFF2-40B4-BE49-F238E27FC236}">
+                <a16:creationId xmlns:a16="http://schemas.microsoft.com/office/drawing/2014/main" id="{63090CE4-5F6F-F08E-3CCA-EC714E90050C}"/>
+              </a:ext>
+            </a:extLst>
+          </p:cNvPr>
+          <p:cNvSpPr>
+            <a:spLocks noGrp="1"/>
+          </p:cNvSpPr>
+          <p:nvPr>
+            <p:ph type="ftr" sz="quarter" idx="11"/>
+          </p:nvPr>
+        </p:nvSpPr>
+        <p:spPr/>
+        <p:txBody>
+          <a:bodyPr/>
+          <a:lstStyle/>
+          <a:p>
+            <a:endParaRPr lang="en-US"/>
+          </a:p>
+        </p:txBody>
+      </p:sp>
+      <p:sp>
+        <p:nvSpPr>
+          <p:cNvPr id="6" name="Slide Number Placeholder 5">
+            <a:extLst>
+              <a:ext uri="{FF2B5EF4-FFF2-40B4-BE49-F238E27FC236}">
+                <a16:creationId xmlns:a16="http://schemas.microsoft.com/office/drawing/2014/main" id="{CBBAE0E5-03A9-ED93-A155-7489D60D78CE}"/>
+              </a:ext>
+            </a:extLst>
+          </p:cNvPr>
+          <p:cNvSpPr>
+            <a:spLocks noGrp="1"/>
+          </p:cNvSpPr>
+          <p:nvPr>
+            <p:ph type="sldNum" sz="quarter" idx="12"/>
+          </p:nvPr>
+        </p:nvSpPr>
+        <p:spPr/>
+        <p:txBody>
+          <a:bodyPr/>
+          <a:lstStyle/>
+          <a:p>
+            <a:fld id="{282CF145-C1F5-4F0A-9E2D-FC4643FE6C56}" type="slidenum">
+              <a:rPr lang="en-US" smtClean="0"/>
+              <a:t>‹#›</a:t>
+            </a:fld>
+            <a:endParaRPr lang="en-US"/>
+          </a:p>
+        </p:txBody>
+      </p:sp>
+    </p:spTree>
+    <p:extLst>
+      <p:ext uri="{BB962C8B-B14F-4D97-AF65-F5344CB8AC3E}">
+        <p14:creationId xmlns:p14="http://schemas.microsoft.com/office/powerpoint/2010/main" val="330994154"/>
+      </p:ext>
+    </p:extLst>
+  </p:cSld>
+  <p:clrMapOvr>
+    <a:masterClrMapping/>
+  </p:clrMapOvr>
+</p:sldLayout>
+</file>
+
+<file path=ppt/slideLayouts/slideLayout8.xml><?xml version="1.0" encoding="utf-8"?>
+<p:sldLayout xmlns:a="http://schemas.openxmlformats.org/drawingml/2006/main" xmlns:r="http://schemas.openxmlformats.org/officeDocument/2006/relationships" xmlns:p="http://schemas.openxmlformats.org/presentationml/2006/main" type="objTx" preserve="1">
+  <p:cSld name="Content with Caption">
+    <p:spTree>
+      <p:nvGrpSpPr>
+        <p:cNvPr id="1" name=""/>
+        <p:cNvGrpSpPr/>
+        <p:nvPr/>
+      </p:nvGrpSpPr>
+      <p:grpSpPr>
+        <a:xfrm>
+          <a:off x="0" y="0"/>
+          <a:ext cx="0" cy="0"/>
+          <a:chOff x="0" y="0"/>
+          <a:chExt cx="0" cy="0"/>
+        </a:xfrm>
+      </p:grpSpPr>
+      <p:sp>
+        <p:nvSpPr>
+          <p:cNvPr id="2" name="Title 1">
+            <a:extLst>
+              <a:ext uri="{FF2B5EF4-FFF2-40B4-BE49-F238E27FC236}">
+                <a16:creationId xmlns:a16="http://schemas.microsoft.com/office/drawing/2014/main" id="{F338CCB4-FDFC-1339-5344-648B5110C359}"/>
+              </a:ext>
+            </a:extLst>
+          </p:cNvPr>
+          <p:cNvSpPr>
+            <a:spLocks noGrp="1"/>
+          </p:cNvSpPr>
+          <p:nvPr>
+            <p:ph type="title"/>
+          </p:nvPr>
+        </p:nvSpPr>
+        <p:spPr>
+          <a:xfrm>
+            <a:off x="839788" y="457200"/>
+            <a:ext cx="3932237" cy="1600200"/>
+          </a:xfrm>
+        </p:spPr>
+        <p:txBody>
+          <a:bodyPr anchor="b"/>
+          <a:lstStyle>
+            <a:lvl1pPr>
+              <a:defRPr sz="3200"/>
+            </a:lvl1pPr>
+          </a:lstStyle>
+          <a:p>
+            <a:r>
+              <a:rPr lang="en-US"/>
+              <a:t>Click to edit Master title style</a:t>
+            </a:r>
+          </a:p>
+        </p:txBody>
+      </p:sp>
+      <p:sp>
+        <p:nvSpPr>
+          <p:cNvPr id="3" name="Content Placeholder 2">
+            <a:extLst>
+              <a:ext uri="{FF2B5EF4-FFF2-40B4-BE49-F238E27FC236}">
+                <a16:creationId xmlns:a16="http://schemas.microsoft.com/office/drawing/2014/main" id="{CBE20C94-B89E-F83F-C2AA-4CDE1CC08AE0}"/>
+              </a:ext>
+            </a:extLst>
+          </p:cNvPr>
+          <p:cNvSpPr>
+            <a:spLocks noGrp="1"/>
+          </p:cNvSpPr>
+          <p:nvPr>
+            <p:ph idx="1"/>
+          </p:nvPr>
+        </p:nvSpPr>
+        <p:spPr>
+          <a:xfrm>
+            <a:off x="5183188" y="987425"/>
+            <a:ext cx="6172200" cy="4873625"/>
+          </a:xfrm>
+        </p:spPr>
+        <p:txBody>
+          <a:bodyPr/>
+          <a:lstStyle>
+            <a:lvl1pPr>
+              <a:defRPr sz="3200"/>
+            </a:lvl1pPr>
+            <a:lvl2pPr>
+              <a:defRPr sz="2800"/>
+            </a:lvl2pPr>
+            <a:lvl3pPr>
+              <a:defRPr sz="2400"/>
+            </a:lvl3pPr>
+            <a:lvl4pPr>
+              <a:defRPr sz="2000"/>
+            </a:lvl4pPr>
+            <a:lvl5pPr>
+              <a:defRPr sz="2000"/>
+            </a:lvl5pPr>
+            <a:lvl6pPr>
+              <a:defRPr sz="2000"/>
+            </a:lvl6pPr>
+            <a:lvl7pPr>
+              <a:defRPr sz="2000"/>
+            </a:lvl7pPr>
+            <a:lvl8pPr>
+              <a:defRPr sz="2000"/>
+            </a:lvl8pPr>
+            <a:lvl9pPr>
+              <a:defRPr sz="2000"/>
+            </a:lvl9pPr>
+          </a:lstStyle>
+          <a:p>
+            <a:pPr lvl="0"/>
+            <a:r>
+              <a:rPr lang="en-US"/>
+              <a:t>Click to edit Master text styles</a:t>
+            </a:r>
+          </a:p>
+          <a:p>
+            <a:pPr lvl="1"/>
+            <a:r>
+              <a:rPr lang="en-US"/>
+              <a:t>Second level</a:t>
+            </a:r>
+          </a:p>
+          <a:p>
+            <a:pPr lvl="2"/>
+            <a:r>
+              <a:rPr lang="en-US"/>
+              <a:t>Third level</a:t>
+            </a:r>
+          </a:p>
+          <a:p>
+            <a:pPr lvl="3"/>
+            <a:r>
+              <a:rPr lang="en-US"/>
+              <a:t>Fourth level</a:t>
+            </a:r>
+          </a:p>
+          <a:p>
+            <a:pPr lvl="4"/>
+            <a:r>
+              <a:rPr lang="en-US"/>
+              <a:t>Fifth level</a:t>
+            </a:r>
+          </a:p>
+        </p:txBody>
+      </p:sp>
+      <p:sp>
+        <p:nvSpPr>
+          <p:cNvPr id="4" name="Text Placeholder 3">
+            <a:extLst>
+              <a:ext uri="{FF2B5EF4-FFF2-40B4-BE49-F238E27FC236}">
+                <a16:creationId xmlns:a16="http://schemas.microsoft.com/office/drawing/2014/main" id="{A7331C11-4FC4-8955-6F16-DB13AB674666}"/>
+              </a:ext>
+            </a:extLst>
+          </p:cNvPr>
+          <p:cNvSpPr>
+            <a:spLocks noGrp="1"/>
+          </p:cNvSpPr>
+          <p:nvPr>
+            <p:ph type="body" sz="half" idx="2"/>
+          </p:nvPr>
+        </p:nvSpPr>
+        <p:spPr>
+          <a:xfrm>
+            <a:off x="839788" y="2057400"/>
+            <a:ext cx="3932237" cy="3811588"/>
+          </a:xfrm>
+        </p:spPr>
+        <p:txBody>
+          <a:bodyPr/>
+          <a:lstStyle>
+            <a:lvl1pPr marL="0" indent="0">
+              <a:buNone/>
+              <a:defRPr sz="1600"/>
+            </a:lvl1pPr>
+            <a:lvl2pPr marL="457200" indent="0">
+              <a:buNone/>
+              <a:defRPr sz="1400"/>
+            </a:lvl2pPr>
+            <a:lvl3pPr marL="914400" indent="0">
+              <a:buNone/>
+              <a:defRPr sz="1200"/>
+            </a:lvl3pPr>
+            <a:lvl4pPr marL="1371600" indent="0">
+              <a:buNone/>
+              <a:defRPr sz="1000"/>
+            </a:lvl4pPr>
+            <a:lvl5pPr marL="1828800" indent="0">
+              <a:buNone/>
+              <a:defRPr sz="1000"/>
+            </a:lvl5pPr>
+            <a:lvl6pPr marL="2286000" indent="0">
+              <a:buNone/>
+              <a:defRPr sz="1000"/>
+            </a:lvl6pPr>
+            <a:lvl7pPr marL="2743200" indent="0">
+              <a:buNone/>
+              <a:defRPr sz="1000"/>
+            </a:lvl7pPr>
+            <a:lvl8pPr marL="3200400" indent="0">
+              <a:buNone/>
+              <a:defRPr sz="1000"/>
+            </a:lvl8pPr>
+            <a:lvl9pPr marL="3657600" indent="0">
+              <a:buNone/>
+              <a:defRPr sz="1000"/>
+            </a:lvl9pPr>
+          </a:lstStyle>
+          <a:p>
+            <a:pPr lvl="0"/>
+            <a:r>
+              <a:rPr lang="en-US"/>
+              <a:t>Click to edit Master text styles</a:t>
+            </a:r>
+          </a:p>
+        </p:txBody>
+      </p:sp>
+      <p:sp>
+        <p:nvSpPr>
+          <p:cNvPr id="5" name="Date Placeholder 4">
+            <a:extLst>
+              <a:ext uri="{FF2B5EF4-FFF2-40B4-BE49-F238E27FC236}">
+                <a16:creationId xmlns:a16="http://schemas.microsoft.com/office/drawing/2014/main" id="{259D68A9-3E4F-A2B5-BF0F-D246EB7F1788}"/>
+              </a:ext>
+            </a:extLst>
+          </p:cNvPr>
+          <p:cNvSpPr>
+            <a:spLocks noGrp="1"/>
+          </p:cNvSpPr>
+          <p:nvPr>
+            <p:ph type="dt" sz="half" idx="10"/>
+          </p:nvPr>
+        </p:nvSpPr>
+        <p:spPr/>
+        <p:txBody>
+          <a:bodyPr/>
+          <a:lstStyle/>
+          <a:p>
+            <a:fld id="{8427D8FB-80AB-4B65-A20D-AFAA152C1E96}" type="datetimeFigureOut">
+              <a:rPr lang="en-US" smtClean="0"/>
+              <a:t>7/3/25</a:t>
+            </a:fld>
+            <a:endParaRPr lang="en-US"/>
+          </a:p>
+        </p:txBody>
+      </p:sp>
+      <p:sp>
+        <p:nvSpPr>
+          <p:cNvPr id="6" name="Footer Placeholder 5">
+            <a:extLst>
+              <a:ext uri="{FF2B5EF4-FFF2-40B4-BE49-F238E27FC236}">
+                <a16:creationId xmlns:a16="http://schemas.microsoft.com/office/drawing/2014/main" id="{57F07956-0927-5AE5-9085-97568EF5A01A}"/>
+              </a:ext>
+            </a:extLst>
+          </p:cNvPr>
+          <p:cNvSpPr>
+            <a:spLocks noGrp="1"/>
+          </p:cNvSpPr>
+          <p:nvPr>
+            <p:ph type="ftr" sz="quarter" idx="11"/>
+          </p:nvPr>
+        </p:nvSpPr>
+        <p:spPr/>
+        <p:txBody>
+          <a:bodyPr/>
+          <a:lstStyle/>
+          <a:p>
+            <a:endParaRPr lang="en-US"/>
+          </a:p>
+        </p:txBody>
+      </p:sp>
+      <p:sp>
+        <p:nvSpPr>
+          <p:cNvPr id="7" name="Slide Number Placeholder 6">
+            <a:extLst>
+              <a:ext uri="{FF2B5EF4-FFF2-40B4-BE49-F238E27FC236}">
+                <a16:creationId xmlns:a16="http://schemas.microsoft.com/office/drawing/2014/main" id="{66F6B68B-72F1-1681-AEFF-2FFECEF66AC0}"/>
+              </a:ext>
+            </a:extLst>
+          </p:cNvPr>
+          <p:cNvSpPr>
+            <a:spLocks noGrp="1"/>
+          </p:cNvSpPr>
+          <p:nvPr>
+            <p:ph type="sldNum" sz="quarter" idx="12"/>
+          </p:nvPr>
+        </p:nvSpPr>
+        <p:spPr/>
+        <p:txBody>
+          <a:bodyPr/>
+          <a:lstStyle/>
+          <a:p>
+            <a:fld id="{282CF145-C1F5-4F0A-9E2D-FC4643FE6C56}" type="slidenum">
+              <a:rPr lang="en-US" smtClean="0"/>
+              <a:t>‹#›</a:t>
+            </a:fld>
+            <a:endParaRPr lang="en-US"/>
+          </a:p>
+        </p:txBody>
+      </p:sp>
+    </p:spTree>
+    <p:extLst>
+      <p:ext uri="{BB962C8B-B14F-4D97-AF65-F5344CB8AC3E}">
+        <p14:creationId xmlns:p14="http://schemas.microsoft.com/office/powerpoint/2010/main" val="737356971"/>
+      </p:ext>
+    </p:extLst>
+  </p:cSld>
+  <p:clrMapOvr>
+    <a:masterClrMapping/>
+  </p:clrMapOvr>
+</p:sldLayout>
+</file>
+
+<file path=ppt/slideLayouts/slideLayout9.xml><?xml version="1.0" encoding="utf-8"?>
+<p:sldLayout xmlns:a="http://schemas.openxmlformats.org/drawingml/2006/main" xmlns:r="http://schemas.openxmlformats.org/officeDocument/2006/relationships" xmlns:p="http://schemas.openxmlformats.org/presentationml/2006/main" type="picTx" preserve="1">
+  <p:cSld name="Picture with Caption">
+    <p:spTree>
+      <p:nvGrpSpPr>
+        <p:cNvPr id="1" name=""/>
+        <p:cNvGrpSpPr/>
+        <p:nvPr/>
+      </p:nvGrpSpPr>
+      <p:grpSpPr>
+        <a:xfrm>
+          <a:off x="0" y="0"/>
+          <a:ext cx="0" cy="0"/>
+          <a:chOff x="0" y="0"/>
+          <a:chExt cx="0" cy="0"/>
+        </a:xfrm>
+      </p:grpSpPr>
+      <p:sp>
+        <p:nvSpPr>
+          <p:cNvPr id="2" name="Title 1">
+            <a:extLst>
+              <a:ext uri="{FF2B5EF4-FFF2-40B4-BE49-F238E27FC236}">
+                <a16:creationId xmlns:a16="http://schemas.microsoft.com/office/drawing/2014/main" id="{0A197ADC-1008-10C2-61F0-421CDF4CA83D}"/>
+              </a:ext>
+            </a:extLst>
+          </p:cNvPr>
+          <p:cNvSpPr>
+            <a:spLocks noGrp="1"/>
+          </p:cNvSpPr>
+          <p:nvPr>
+            <p:ph type="title"/>
+          </p:nvPr>
+        </p:nvSpPr>
+        <p:spPr>
+          <a:xfrm>
+            <a:off x="839788" y="457200"/>
+            <a:ext cx="3932237" cy="1600200"/>
+          </a:xfrm>
+        </p:spPr>
+        <p:txBody>
+          <a:bodyPr anchor="b"/>
+          <a:lstStyle>
+            <a:lvl1pPr>
+              <a:defRPr sz="3200"/>
+            </a:lvl1pPr>
+          </a:lstStyle>
+          <a:p>
+            <a:r>
+              <a:rPr lang="en-US"/>
+              <a:t>Click to edit Master title style</a:t>
+            </a:r>
+          </a:p>
+        </p:txBody>
+      </p:sp>
+      <p:sp>
+        <p:nvSpPr>
+          <p:cNvPr id="3" name="Picture Placeholder 2">
+            <a:extLst>
+              <a:ext uri="{FF2B5EF4-FFF2-40B4-BE49-F238E27FC236}">
+                <a16:creationId xmlns:a16="http://schemas.microsoft.com/office/drawing/2014/main" id="{F21B50E3-1768-2A18-062E-E8A88680FD37}"/>
+              </a:ext>
+            </a:extLst>
+          </p:cNvPr>
+          <p:cNvSpPr>
+            <a:spLocks noGrp="1"/>
+          </p:cNvSpPr>
+          <p:nvPr>
+            <p:ph type="pic" idx="1"/>
+          </p:nvPr>
+        </p:nvSpPr>
+        <p:spPr>
+          <a:xfrm>
+            <a:off x="5183188" y="987425"/>
+            <a:ext cx="6172200" cy="4873625"/>
+          </a:xfrm>
+        </p:spPr>
+        <p:txBody>
+          <a:bodyPr/>
+          <a:lstStyle>
+            <a:lvl1pPr marL="0" indent="0">
+              <a:buNone/>
+              <a:defRPr sz="3200"/>
+            </a:lvl1pPr>
+            <a:lvl2pPr marL="457200" indent="0">
+              <a:buNone/>
+              <a:defRPr sz="2800"/>
+            </a:lvl2pPr>
+            <a:lvl3pPr marL="914400" indent="0">
+              <a:buNone/>
+              <a:defRPr sz="2400"/>
+            </a:lvl3pPr>
+            <a:lvl4pPr marL="1371600" indent="0">
+              <a:buNone/>
+              <a:defRPr sz="2000"/>
+            </a:lvl4pPr>
+            <a:lvl5pPr marL="1828800" indent="0">
+              <a:buNone/>
+              <a:defRPr sz="2000"/>
+            </a:lvl5pPr>
+            <a:lvl6pPr marL="2286000" indent="0">
+              <a:buNone/>
+              <a:defRPr sz="2000"/>
+            </a:lvl6pPr>
+            <a:lvl7pPr marL="2743200" indent="0">
+              <a:buNone/>
+              <a:defRPr sz="2000"/>
+            </a:lvl7pPr>
+            <a:lvl8pPr marL="3200400" indent="0">
+              <a:buNone/>
+              <a:defRPr sz="2000"/>
+            </a:lvl8pPr>
+            <a:lvl9pPr marL="3657600" indent="0">
+              <a:buNone/>
+              <a:defRPr sz="2000"/>
+            </a:lvl9pPr>
+          </a:lstStyle>
+          <a:p>
+            <a:endParaRPr lang="en-US"/>
+          </a:p>
+        </p:txBody>
+      </p:sp>
+      <p:sp>
+        <p:nvSpPr>
+          <p:cNvPr id="4" name="Text Placeholder 3">
+            <a:extLst>
+              <a:ext uri="{FF2B5EF4-FFF2-40B4-BE49-F238E27FC236}">
+                <a16:creationId xmlns:a16="http://schemas.microsoft.com/office/drawing/2014/main" id="{49B5C278-A9D4-164B-1E6F-5852E188B9C3}"/>
+              </a:ext>
+            </a:extLst>
+          </p:cNvPr>
+          <p:cNvSpPr>
+            <a:spLocks noGrp="1"/>
+          </p:cNvSpPr>
+          <p:nvPr>
+            <p:ph type="body" sz="half" idx="2"/>
+          </p:nvPr>
+        </p:nvSpPr>
+        <p:spPr>
+          <a:xfrm>
+            <a:off x="839788" y="2057400"/>
+            <a:ext cx="3932237" cy="3811588"/>
+          </a:xfrm>
+        </p:spPr>
+        <p:txBody>
+          <a:bodyPr/>
+          <a:lstStyle>
+            <a:lvl1pPr marL="0" indent="0">
+              <a:buNone/>
+              <a:defRPr sz="1600"/>
+            </a:lvl1pPr>
+            <a:lvl2pPr marL="457200" indent="0">
+              <a:buNone/>
+              <a:defRPr sz="1400"/>
+            </a:lvl2pPr>
+            <a:lvl3pPr marL="914400" indent="0">
+              <a:buNone/>
+              <a:defRPr sz="1200"/>
+            </a:lvl3pPr>
+            <a:lvl4pPr marL="1371600" indent="0">
+              <a:buNone/>
+              <a:defRPr sz="1000"/>
+            </a:lvl4pPr>
+            <a:lvl5pPr marL="1828800" indent="0">
+              <a:buNone/>
+              <a:defRPr sz="1000"/>
+            </a:lvl5pPr>
+            <a:lvl6pPr marL="2286000" indent="0">
+              <a:buNone/>
+              <a:defRPr sz="1000"/>
+            </a:lvl6pPr>
+            <a:lvl7pPr marL="2743200" indent="0">
+              <a:buNone/>
+              <a:defRPr sz="1000"/>
+            </a:lvl7pPr>
+            <a:lvl8pPr marL="3200400" indent="0">
+              <a:buNone/>
+              <a:defRPr sz="1000"/>
+            </a:lvl8pPr>
+            <a:lvl9pPr marL="3657600" indent="0">
+              <a:buNone/>
+              <a:defRPr sz="1000"/>
+            </a:lvl9pPr>
+          </a:lstStyle>
+          <a:p>
+            <a:pPr lvl="0"/>
+            <a:r>
+              <a:rPr lang="en-US"/>
+              <a:t>Click to edit Master text styles</a:t>
+            </a:r>
+          </a:p>
+        </p:txBody>
+      </p:sp>
+      <p:sp>
+        <p:nvSpPr>
+          <p:cNvPr id="5" name="Date Placeholder 4">
+            <a:extLst>
+              <a:ext uri="{FF2B5EF4-FFF2-40B4-BE49-F238E27FC236}">
+                <a16:creationId xmlns:a16="http://schemas.microsoft.com/office/drawing/2014/main" id="{50A70626-2133-E044-1B8D-BE31AC7E699F}"/>
+              </a:ext>
+            </a:extLst>
+          </p:cNvPr>
+          <p:cNvSpPr>
+            <a:spLocks noGrp="1"/>
+          </p:cNvSpPr>
+          <p:nvPr>
+            <p:ph type="dt" sz="half" idx="10"/>
+          </p:nvPr>
+        </p:nvSpPr>
+        <p:spPr/>
+        <p:txBody>
+          <a:bodyPr/>
+          <a:lstStyle/>
+          <a:p>
+            <a:fld id="{8427D8FB-80AB-4B65-A20D-AFAA152C1E96}" type="datetimeFigureOut">
+              <a:rPr lang="en-US" smtClean="0"/>
+              <a:t>7/3/25</a:t>
+            </a:fld>
+            <a:endParaRPr lang="en-US"/>
+          </a:p>
+        </p:txBody>
+      </p:sp>
+      <p:sp>
+        <p:nvSpPr>
+          <p:cNvPr id="6" name="Footer Placeholder 5">
+            <a:extLst>
+              <a:ext uri="{FF2B5EF4-FFF2-40B4-BE49-F238E27FC236}">
+                <a16:creationId xmlns:a16="http://schemas.microsoft.com/office/drawing/2014/main" id="{0B08E18D-D4E3-8F3F-07C7-7C4F4205A562}"/>
+              </a:ext>
+            </a:extLst>
+          </p:cNvPr>
+          <p:cNvSpPr>
+            <a:spLocks noGrp="1"/>
+          </p:cNvSpPr>
+          <p:nvPr>
+            <p:ph type="ftr" sz="quarter" idx="11"/>
+          </p:nvPr>
+        </p:nvSpPr>
+        <p:spPr/>
+        <p:txBody>
+          <a:bodyPr/>
+          <a:lstStyle/>
+          <a:p>
+            <a:endParaRPr lang="en-US"/>
+          </a:p>
+        </p:txBody>
+      </p:sp>
+      <p:sp>
+        <p:nvSpPr>
+          <p:cNvPr id="7" name="Slide Number Placeholder 6">
+            <a:extLst>
+              <a:ext uri="{FF2B5EF4-FFF2-40B4-BE49-F238E27FC236}">
+                <a16:creationId xmlns:a16="http://schemas.microsoft.com/office/drawing/2014/main" id="{DDCEECD0-11A4-039F-CA80-A7103CFAB06E}"/>
+              </a:ext>
+            </a:extLst>
+          </p:cNvPr>
+          <p:cNvSpPr>
+            <a:spLocks noGrp="1"/>
+          </p:cNvSpPr>
+          <p:nvPr>
+            <p:ph type="sldNum" sz="quarter" idx="12"/>
+          </p:nvPr>
+        </p:nvSpPr>
+        <p:spPr/>
+        <p:txBody>
+          <a:bodyPr/>
+          <a:lstStyle/>
+          <a:p>
+            <a:fld id="{282CF145-C1F5-4F0A-9E2D-FC4643FE6C56}" type="slidenum">
+              <a:rPr lang="en-US" smtClean="0"/>
+              <a:t>‹#›</a:t>
+            </a:fld>
+            <a:endParaRPr lang="en-US"/>
+          </a:p>
+        </p:txBody>
+      </p:sp>
+    </p:spTree>
+    <p:extLst>
+      <p:ext uri="{BB962C8B-B14F-4D97-AF65-F5344CB8AC3E}">
+        <p14:creationId xmlns:p14="http://schemas.microsoft.com/office/powerpoint/2010/main" val="2396425941"/>
+      </p:ext>
+    </p:extLst>
+  </p:cSld>
+  <p:clrMapOvr>
+    <a:masterClrMapping/>
+  </p:clrMapOvr>
+</p:sldLayout>
+</file>
+
+<file path=ppt/slideMasters/slideMaster1.xml><?xml version="1.0" encoding="utf-8"?>
+<p:sldMaster xmlns:a="http://schemas.openxmlformats.org/drawingml/2006/main" xmlns:r="http://schemas.openxmlformats.org/officeDocument/2006/relationships" xmlns:p="http://schemas.openxmlformats.org/presentationml/2006/main">
+  <p:cSld>
+    <p:bg>
+      <p:bgRef idx="1001">
+        <a:schemeClr val="bg1"/>
+      </p:bgRef>
+    </p:bg>
+    <p:spTree>
+      <p:nvGrpSpPr>
+        <p:cNvPr id="1" name=""/>
+        <p:cNvGrpSpPr/>
+        <p:nvPr/>
+      </p:nvGrpSpPr>
+      <p:grpSpPr>
+        <a:xfrm>
+          <a:off x="0" y="0"/>
+          <a:ext cx="0" cy="0"/>
+          <a:chOff x="0" y="0"/>
+          <a:chExt cx="0" cy="0"/>
+        </a:xfrm>
+      </p:grpSpPr>
+      <p:sp>
+        <p:nvSpPr>
+          <p:cNvPr id="2" name="Title Placeholder 1">
+            <a:extLst>
+              <a:ext uri="{FF2B5EF4-FFF2-40B4-BE49-F238E27FC236}">
+                <a16:creationId xmlns:a16="http://schemas.microsoft.com/office/drawing/2014/main" id="{33A74D02-1FAF-EBF9-2932-868E2E949FF3}"/>
+              </a:ext>
+            </a:extLst>
+          </p:cNvPr>
+          <p:cNvSpPr>
+            <a:spLocks noGrp="1"/>
+          </p:cNvSpPr>
+          <p:nvPr>
+            <p:ph type="title"/>
+          </p:nvPr>
+        </p:nvSpPr>
+        <p:spPr>
+          <a:xfrm>
+            <a:off x="838200" y="365125"/>
+            <a:ext cx="10515600" cy="1325563"/>
+          </a:xfrm>
+          <a:prstGeom prst="rect">
+            <a:avLst/>
+          </a:prstGeom>
+        </p:spPr>
+        <p:txBody>
+          <a:bodyPr vert="horz" lIns="91440" tIns="45720" rIns="91440" bIns="45720" rtlCol="0" anchor="ctr">
+            <a:normAutofit/>
+          </a:bodyPr>
+          <a:lstStyle/>
+          <a:p>
+            <a:r>
+              <a:rPr lang="en-US"/>
+              <a:t>Click to edit Master title style</a:t>
+            </a:r>
+          </a:p>
+        </p:txBody>
+      </p:sp>
+      <p:sp>
+        <p:nvSpPr>
+          <p:cNvPr id="3" name="Text Placeholder 2">
+            <a:extLst>
+              <a:ext uri="{FF2B5EF4-FFF2-40B4-BE49-F238E27FC236}">
+                <a16:creationId xmlns:a16="http://schemas.microsoft.com/office/drawing/2014/main" id="{16D4B94A-1DBF-4B55-A47F-0FC064FE36A4}"/>
+              </a:ext>
+            </a:extLst>
+          </p:cNvPr>
+          <p:cNvSpPr>
+            <a:spLocks noGrp="1"/>
+          </p:cNvSpPr>
+          <p:nvPr>
+            <p:ph type="body" idx="1"/>
+          </p:nvPr>
+        </p:nvSpPr>
+        <p:spPr>
+          <a:xfrm>
+            <a:off x="838200" y="1825625"/>
+            <a:ext cx="10515600" cy="4351338"/>
+          </a:xfrm>
+          <a:prstGeom prst="rect">
+            <a:avLst/>
+          </a:prstGeom>
+        </p:spPr>
+        <p:txBody>
+          <a:bodyPr vert="horz" lIns="91440" tIns="45720" rIns="91440" bIns="45720" rtlCol="0">
+            <a:normAutofit/>
+          </a:bodyPr>
+          <a:lstStyle/>
+          <a:p>
+            <a:pPr lvl="0"/>
+            <a:r>
+              <a:rPr lang="en-US"/>
+              <a:t>Click to edit Master text styles</a:t>
+            </a:r>
+          </a:p>
+          <a:p>
+            <a:pPr lvl="1"/>
+            <a:r>
+              <a:rPr lang="en-US"/>
+              <a:t>Second level</a:t>
+            </a:r>
+          </a:p>
+          <a:p>
+            <a:pPr lvl="2"/>
+            <a:r>
+              <a:rPr lang="en-US"/>
+              <a:t>Third level</a:t>
+            </a:r>
+          </a:p>
+          <a:p>
+            <a:pPr lvl="3"/>
+            <a:r>
+              <a:rPr lang="en-US"/>
+              <a:t>Fourth level</a:t>
+            </a:r>
+          </a:p>
+          <a:p>
+            <a:pPr lvl="4"/>
+            <a:r>
+              <a:rPr lang="en-US"/>
+              <a:t>Fifth level</a:t>
+            </a:r>
+          </a:p>
+        </p:txBody>
+      </p:sp>
+      <p:sp>
+        <p:nvSpPr>
+          <p:cNvPr id="4" name="Date Placeholder 3">
+            <a:extLst>
+              <a:ext uri="{FF2B5EF4-FFF2-40B4-BE49-F238E27FC236}">
+                <a16:creationId xmlns:a16="http://schemas.microsoft.com/office/drawing/2014/main" id="{CA90FD8F-4CB6-AC2B-2ACB-6F6768BDD8E2}"/>
+              </a:ext>
+            </a:extLst>
+          </p:cNvPr>
+          <p:cNvSpPr>
+            <a:spLocks noGrp="1"/>
+          </p:cNvSpPr>
+          <p:nvPr>
+            <p:ph type="dt" sz="half" idx="2"/>
+          </p:nvPr>
+        </p:nvSpPr>
+        <p:spPr>
+          <a:xfrm>
+            <a:off x="838200" y="6356350"/>
+            <a:ext cx="2743200" cy="365125"/>
+          </a:xfrm>
+          <a:prstGeom prst="rect">
+            <a:avLst/>
+          </a:prstGeom>
+        </p:spPr>
+        <p:txBody>
+          <a:bodyPr vert="horz" lIns="91440" tIns="45720" rIns="91440" bIns="45720" rtlCol="0" anchor="ctr"/>
+          <a:lstStyle>
+            <a:lvl1pPr algn="l">
+              <a:defRPr sz="1200">
+                <a:solidFill>
+                  <a:schemeClr val="tx1">
+                    <a:tint val="82000"/>
+                  </a:schemeClr>
+                </a:solidFill>
+              </a:defRPr>
+            </a:lvl1pPr>
+          </a:lstStyle>
+          <a:p>
+            <a:fld id="{8427D8FB-80AB-4B65-A20D-AFAA152C1E96}" type="datetimeFigureOut">
+              <a:rPr lang="en-US" smtClean="0"/>
+              <a:t>7/3/25</a:t>
+            </a:fld>
+            <a:endParaRPr lang="en-US"/>
+          </a:p>
+        </p:txBody>
+      </p:sp>
+      <p:sp>
+        <p:nvSpPr>
+          <p:cNvPr id="5" name="Footer Placeholder 4">
+            <a:extLst>
+              <a:ext uri="{FF2B5EF4-FFF2-40B4-BE49-F238E27FC236}">
+                <a16:creationId xmlns:a16="http://schemas.microsoft.com/office/drawing/2014/main" id="{45A8BEEE-A9DC-FF8B-1246-E035AB85A305}"/>
+              </a:ext>
+            </a:extLst>
+          </p:cNvPr>
+          <p:cNvSpPr>
+            <a:spLocks noGrp="1"/>
+          </p:cNvSpPr>
+          <p:nvPr>
+            <p:ph type="ftr" sz="quarter" idx="3"/>
+          </p:nvPr>
+        </p:nvSpPr>
+        <p:spPr>
+          <a:xfrm>
+            <a:off x="4038600" y="6356350"/>
+            <a:ext cx="4114800" cy="365125"/>
+          </a:xfrm>
+          <a:prstGeom prst="rect">
+            <a:avLst/>
+          </a:prstGeom>
+        </p:spPr>
+        <p:txBody>
+          <a:bodyPr vert="horz" lIns="91440" tIns="45720" rIns="91440" bIns="45720" rtlCol="0" anchor="ctr"/>
+          <a:lstStyle>
+            <a:lvl1pPr algn="ctr">
+              <a:defRPr sz="1200">
+                <a:solidFill>
+                  <a:schemeClr val="tx1">
+                    <a:tint val="82000"/>
+                  </a:schemeClr>
+                </a:solidFill>
+              </a:defRPr>
+            </a:lvl1pPr>
+          </a:lstStyle>
+          <a:p>
+            <a:endParaRPr lang="en-US"/>
+          </a:p>
+        </p:txBody>
+      </p:sp>
+      <p:sp>
+        <p:nvSpPr>
+          <p:cNvPr id="6" name="Slide Number Placeholder 5">
+            <a:extLst>
+              <a:ext uri="{FF2B5EF4-FFF2-40B4-BE49-F238E27FC236}">
+                <a16:creationId xmlns:a16="http://schemas.microsoft.com/office/drawing/2014/main" id="{1B20DC11-79DD-7B03-665C-909485AB9F4F}"/>
+              </a:ext>
+            </a:extLst>
+          </p:cNvPr>
+          <p:cNvSpPr>
+            <a:spLocks noGrp="1"/>
+          </p:cNvSpPr>
+          <p:nvPr>
+            <p:ph type="sldNum" sz="quarter" idx="4"/>
+          </p:nvPr>
+        </p:nvSpPr>
+        <p:spPr>
+          <a:xfrm>
+            <a:off x="8610600" y="6356350"/>
+            <a:ext cx="2743200" cy="365125"/>
+          </a:xfrm>
+          <a:prstGeom prst="rect">
+            <a:avLst/>
+          </a:prstGeom>
+        </p:spPr>
+        <p:txBody>
+          <a:bodyPr vert="horz" lIns="91440" tIns="45720" rIns="91440" bIns="45720" rtlCol="0" anchor="ctr"/>
+          <a:lstStyle>
+            <a:lvl1pPr algn="r">
+              <a:defRPr sz="1200">
+                <a:solidFill>
+                  <a:schemeClr val="tx1">
+                    <a:tint val="82000"/>
+                  </a:schemeClr>
+                </a:solidFill>
+              </a:defRPr>
+            </a:lvl1pPr>
+          </a:lstStyle>
+          <a:p>
+            <a:fld id="{282CF145-C1F5-4F0A-9E2D-FC4643FE6C56}" type="slidenum">
+              <a:rPr lang="en-US" smtClean="0"/>
+              <a:t>‹#›</a:t>
+            </a:fld>
+            <a:endParaRPr lang="en-US"/>
+          </a:p>
+        </p:txBody>
+      </p:sp>
+    </p:spTree>
+    <p:extLst>
+      <p:ext uri="{BB962C8B-B14F-4D97-AF65-F5344CB8AC3E}">
+        <p14:creationId xmlns:p14="http://schemas.microsoft.com/office/powerpoint/2010/main" val="4161011972"/>
+      </p:ext>
+    </p:extLst>
+  </p:cSld>
+  <p:clrMap bg1="lt1" tx1="dk1" bg2="lt2" tx2="dk2" accent1="accent1" accent2="accent2" accent3="accent3" accent4="accent4" accent5="accent5" accent6="accent6" hlink="hlink" folHlink="folHlink"/>
+  <p:sldLayoutIdLst>
+    <p:sldLayoutId id="2147483649" r:id="rId1"/>
+    <p:sldLayoutId id="2147483650" r:id="rId2"/>
+    <p:sldLayoutId id="2147483651" r:id="rId3"/>
+    <p:sldLayoutId id="2147483652" r:id="rId4"/>
+    <p:sldLayoutId id="2147483653" r:id="rId5"/>
+    <p:sldLayoutId id="2147483654" r:id="rId6"/>
+    <p:sldLayoutId id="2147483655" r:id="rId7"/>
+    <p:sldLayoutId id="2147483656" r:id="rId8"/>
+    <p:sldLayoutId id="2147483657" r:id="rId9"/>
+    <p:sldLayoutId id="2147483658" r:id="rId10"/>
+    <p:sldLayoutId id="2147483659" r:id="rId11"/>
+  </p:sldLayoutIdLst>
+  <p:txStyles>
+    <p:titleStyle>
+      <a:lvl1pPr algn="l" defTabSz="914400" rtl="0" eaLnBrk="1" latinLnBrk="0" hangingPunct="1">
+        <a:lnSpc>
+          <a:spcPct val="90000"/>
+        </a:lnSpc>
+        <a:spcBef>
+          <a:spcPct val="0"/>
+        </a:spcBef>
+        <a:buNone/>
+        <a:defRPr sz="4400" kern="1200">
+          <a:solidFill>
+            <a:schemeClr val="tx1"/>
+          </a:solidFill>
+          <a:latin typeface="+mj-lt"/>
+          <a:ea typeface="+mj-ea"/>
+          <a:cs typeface="+mj-cs"/>
+        </a:defRPr>
+      </a:lvl1pPr>
+    </p:titleStyle>
+    <p:bodyStyle>
+      <a:lvl1pPr marL="228600" indent="-228600" algn="l" defTabSz="914400" rtl="0" eaLnBrk="1" latinLnBrk="0" hangingPunct="1">
+        <a:lnSpc>
+          <a:spcPct val="90000"/>
+        </a:lnSpc>
+        <a:spcBef>
+          <a:spcPts val="1000"/>
+        </a:spcBef>
+        <a:buFont typeface="Arial" panose="020B0604020202020204" pitchFamily="34" charset="0"/>
+        <a:buChar char="•"/>
+        <a:defRPr sz="2800" kern="1200">
+          <a:solidFill>
+            <a:schemeClr val="tx1"/>
+          </a:solidFill>
+          <a:latin typeface="+mn-lt"/>
+          <a:ea typeface="+mn-ea"/>
+          <a:cs typeface="+mn-cs"/>
+        </a:defRPr>
+      </a:lvl1pPr>
+      <a:lvl2pPr marL="685800" indent="-228600" algn="l" defTabSz="914400" rtl="0" eaLnBrk="1" latinLnBrk="0" hangingPunct="1">
+        <a:lnSpc>
+          <a:spcPct val="90000"/>
+        </a:lnSpc>
+        <a:spcBef>
+          <a:spcPts val="500"/>
+        </a:spcBef>
+        <a:buFont typeface="Arial" panose="020B0604020202020204" pitchFamily="34" charset="0"/>
+        <a:buChar char="•"/>
+        <a:defRPr sz="2400" kern="1200">
+          <a:solidFill>
+            <a:schemeClr val="tx1"/>
+          </a:solidFill>
+          <a:latin typeface="+mn-lt"/>
+          <a:ea typeface="+mn-ea"/>
+          <a:cs typeface="+mn-cs"/>
+        </a:defRPr>
+      </a:lvl2pPr>
+      <a:lvl3pPr marL="1143000" indent="-228600" algn="l" defTabSz="914400" rtl="0" eaLnBrk="1" latinLnBrk="0" hangingPunct="1">
+        <a:lnSpc>
+          <a:spcPct val="90000"/>
+        </a:lnSpc>
+        <a:spcBef>
+          <a:spcPts val="500"/>
+        </a:spcBef>
+        <a:buFont typeface="Arial" panose="020B0604020202020204" pitchFamily="34" charset="0"/>
+        <a:buChar char="•"/>
+        <a:defRPr sz="2000" kern="1200">
+          <a:solidFill>
+            <a:schemeClr val="tx1"/>
+          </a:solidFill>
+          <a:latin typeface="+mn-lt"/>
+          <a:ea typeface="+mn-ea"/>
+          <a:cs typeface="+mn-cs"/>
+        </a:defRPr>
+      </a:lvl3pPr>
+      <a:lvl4pPr marL="1600200" indent="-228600" algn="l" defTabSz="914400" rtl="0" eaLnBrk="1" latinLnBrk="0" hangingPunct="1">
+        <a:lnSpc>
+          <a:spcPct val="90000"/>
+        </a:lnSpc>
+        <a:spcBef>
+          <a:spcPts val="500"/>
+        </a:spcBef>
+        <a:buFont typeface="Arial" panose="020B0604020202020204" pitchFamily="34" charset="0"/>
+        <a:buChar char="•"/>
+        <a:defRPr sz="1800" kern="1200">
+          <a:solidFill>
+            <a:schemeClr val="tx1"/>
+          </a:solidFill>
+          <a:latin typeface="+mn-lt"/>
+          <a:ea typeface="+mn-ea"/>
+          <a:cs typeface="+mn-cs"/>
+        </a:defRPr>
+      </a:lvl4pPr>
+      <a:lvl5pPr marL="2057400" indent="-228600" algn="l" defTabSz="914400" rtl="0" eaLnBrk="1" latinLnBrk="0" hangingPunct="1">
+        <a:lnSpc>
+          <a:spcPct val="90000"/>
+        </a:lnSpc>
+        <a:spcBef>
+          <a:spcPts val="500"/>
+        </a:spcBef>
+        <a:buFont typeface="Arial" panose="020B0604020202020204" pitchFamily="34" charset="0"/>
+        <a:buChar char="•"/>
+        <a:defRPr sz="1800" kern="1200">
+          <a:solidFill>
+            <a:schemeClr val="tx1"/>
+          </a:solidFill>
+          <a:latin typeface="+mn-lt"/>
+          <a:ea typeface="+mn-ea"/>
+          <a:cs typeface="+mn-cs"/>
+        </a:defRPr>
+      </a:lvl5pPr>
+      <a:lvl6pPr marL="2514600" indent="-228600" algn="l" defTabSz="914400" rtl="0" eaLnBrk="1" latinLnBrk="0" hangingPunct="1">
+        <a:lnSpc>
+          <a:spcPct val="90000"/>
+        </a:lnSpc>
+        <a:spcBef>
+          <a:spcPts val="500"/>
+        </a:spcBef>
+        <a:buFont typeface="Arial" panose="020B0604020202020204" pitchFamily="34" charset="0"/>
+        <a:buChar char="•"/>
+        <a:defRPr sz="1800" kern="1200">
+          <a:solidFill>
+            <a:schemeClr val="tx1"/>
+          </a:solidFill>
+          <a:latin typeface="+mn-lt"/>
+          <a:ea typeface="+mn-ea"/>
+          <a:cs typeface="+mn-cs"/>
+        </a:defRPr>
+      </a:lvl6pPr>
+      <a:lvl7pPr marL="2971800" indent="-228600" algn="l" defTabSz="914400" rtl="0" eaLnBrk="1" latinLnBrk="0" hangingPunct="1">
+        <a:lnSpc>
+          <a:spcPct val="90000"/>
+        </a:lnSpc>
+        <a:spcBef>
+          <a:spcPts val="500"/>
+        </a:spcBef>
+        <a:buFont typeface="Arial" panose="020B0604020202020204" pitchFamily="34" charset="0"/>
+        <a:buChar char="•"/>
+        <a:defRPr sz="1800" kern="1200">
+          <a:solidFill>
+            <a:schemeClr val="tx1"/>
+          </a:solidFill>
+          <a:latin typeface="+mn-lt"/>
+          <a:ea typeface="+mn-ea"/>
+          <a:cs typeface="+mn-cs"/>
+        </a:defRPr>
+      </a:lvl7pPr>
+      <a:lvl8pPr marL="3429000" indent="-228600" algn="l" defTabSz="914400" rtl="0" eaLnBrk="1" latinLnBrk="0" hangingPunct="1">
+        <a:lnSpc>
+          <a:spcPct val="90000"/>
+        </a:lnSpc>
+        <a:spcBef>
+          <a:spcPts val="500"/>
+        </a:spcBef>
+        <a:buFont typeface="Arial" panose="020B0604020202020204" pitchFamily="34" charset="0"/>
+        <a:buChar char="•"/>
+        <a:defRPr sz="1800" kern="1200">
+          <a:solidFill>
+            <a:schemeClr val="tx1"/>
+          </a:solidFill>
+          <a:latin typeface="+mn-lt"/>
+          <a:ea typeface="+mn-ea"/>
+          <a:cs typeface="+mn-cs"/>
+        </a:defRPr>
+      </a:lvl8pPr>
+      <a:lvl9pPr marL="3886200" indent="-228600" algn="l" defTabSz="914400" rtl="0" eaLnBrk="1" latinLnBrk="0" hangingPunct="1">
+        <a:lnSpc>
+          <a:spcPct val="90000"/>
+        </a:lnSpc>
+        <a:spcBef>
+          <a:spcPts val="500"/>
+        </a:spcBef>
+        <a:buFont typeface="Arial" panose="020B0604020202020204" pitchFamily="34" charset="0"/>
+        <a:buChar char="•"/>
+        <a:defRPr sz="1800" kern="1200">
+          <a:solidFill>
+            <a:schemeClr val="tx1"/>
+          </a:solidFill>
+          <a:latin typeface="+mn-lt"/>
+          <a:ea typeface="+mn-ea"/>
+          <a:cs typeface="+mn-cs"/>
+        </a:defRPr>
+      </a:lvl9pPr>
+    </p:bodyStyle>
+    <p:otherStyle>
+      <a:defPPr>
+        <a:defRPr lang="en-US"/>
+      </a:defPPr>
+      <a:lvl1pPr marL="0" algn="l" defTabSz="914400" rtl="0" eaLnBrk="1" latinLnBrk="0" hangingPunct="1">
+        <a:defRPr sz="1800" kern="1200">
+          <a:solidFill>
+            <a:schemeClr val="tx1"/>
+          </a:solidFill>
+          <a:latin typeface="+mn-lt"/>
+          <a:ea typeface="+mn-ea"/>
+          <a:cs typeface="+mn-cs"/>
+        </a:defRPr>
+      </a:lvl1pPr>
+      <a:lvl2pPr marL="457200" algn="l" defTabSz="914400" rtl="0" eaLnBrk="1" latinLnBrk="0" hangingPunct="1">
+        <a:defRPr sz="1800" kern="1200">
+          <a:solidFill>
+            <a:schemeClr val="tx1"/>
+          </a:solidFill>
+          <a:latin typeface="+mn-lt"/>
+          <a:ea typeface="+mn-ea"/>
+          <a:cs typeface="+mn-cs"/>
+        </a:defRPr>
+      </a:lvl2pPr>
+      <a:lvl3pPr marL="914400" algn="l" defTabSz="914400" rtl="0" eaLnBrk="1" latinLnBrk="0" hangingPunct="1">
+        <a:defRPr sz="1800" kern="1200">
+          <a:solidFill>
+            <a:schemeClr val="tx1"/>
+          </a:solidFill>
+          <a:latin typeface="+mn-lt"/>
+          <a:ea typeface="+mn-ea"/>
+          <a:cs typeface="+mn-cs"/>
+        </a:defRPr>
+      </a:lvl3pPr>
+      <a:lvl4pPr marL="1371600" algn="l" defTabSz="914400" rtl="0" eaLnBrk="1" latinLnBrk="0" hangingPunct="1">
+        <a:defRPr sz="1800" kern="1200">
+          <a:solidFill>
+            <a:schemeClr val="tx1"/>
+          </a:solidFill>
+          <a:latin typeface="+mn-lt"/>
+          <a:ea typeface="+mn-ea"/>
+          <a:cs typeface="+mn-cs"/>
+        </a:defRPr>
+      </a:lvl4pPr>
+      <a:lvl5pPr marL="1828800" algn="l" defTabSz="914400" rtl="0" eaLnBrk="1" latinLnBrk="0" hangingPunct="1">
+        <a:defRPr sz="1800" kern="1200">
+          <a:solidFill>
+            <a:schemeClr val="tx1"/>
+          </a:solidFill>
+          <a:latin typeface="+mn-lt"/>
+          <a:ea typeface="+mn-ea"/>
+          <a:cs typeface="+mn-cs"/>
+        </a:defRPr>
+      </a:lvl5pPr>
+      <a:lvl6pPr marL="2286000" algn="l" defTabSz="914400" rtl="0" eaLnBrk="1" latinLnBrk="0" hangingPunct="1">
+        <a:defRPr sz="1800" kern="1200">
+          <a:solidFill>
+            <a:schemeClr val="tx1"/>
+          </a:solidFill>
+          <a:latin typeface="+mn-lt"/>
+          <a:ea typeface="+mn-ea"/>
+          <a:cs typeface="+mn-cs"/>
+        </a:defRPr>
+      </a:lvl6pPr>
+      <a:lvl7pPr marL="2743200" algn="l" defTabSz="914400" rtl="0" eaLnBrk="1" latinLnBrk="0" hangingPunct="1">
+        <a:defRPr sz="1800" kern="1200">
+          <a:solidFill>
+            <a:schemeClr val="tx1"/>
+          </a:solidFill>
+          <a:latin typeface="+mn-lt"/>
+          <a:ea typeface="+mn-ea"/>
+          <a:cs typeface="+mn-cs"/>
+        </a:defRPr>
+      </a:lvl7pPr>
+      <a:lvl8pPr marL="3200400" algn="l" defTabSz="914400" rtl="0" eaLnBrk="1" latinLnBrk="0" hangingPunct="1">
+        <a:defRPr sz="1800" kern="1200">
+          <a:solidFill>
+            <a:schemeClr val="tx1"/>
+          </a:solidFill>
+          <a:latin typeface="+mn-lt"/>
+          <a:ea typeface="+mn-ea"/>
+          <a:cs typeface="+mn-cs"/>
+        </a:defRPr>
+      </a:lvl8pPr>
+      <a:lvl9pPr marL="3657600" algn="l" defTabSz="914400" rtl="0" eaLnBrk="1" latinLnBrk="0" hangingPunct="1">
+        <a:defRPr sz="1800" kern="1200">
+          <a:solidFill>
+            <a:schemeClr val="tx1"/>
+          </a:solidFill>
+          <a:latin typeface="+mn-lt"/>
+          <a:ea typeface="+mn-ea"/>
+          <a:cs typeface="+mn-cs"/>
+        </a:defRPr>
+      </a:lvl9pPr>
+    </p:otherStyle>
+  </p:txStyles>
+</p:sldMaster>
+</file>
+
+<file path=ppt/theme/theme1.xml><?xml version="1.0" encoding="utf-8"?>
+<a:theme xmlns:a="http://schemas.openxmlformats.org/drawingml/2006/main" name="Office Theme">
+  <a:themeElements>
+    <a:clrScheme name="Office">
+      <a:dk1>
+        <a:sysClr val="windowText" lastClr="000000"/>
+      </a:dk1>
+      <a:lt1>
+        <a:sysClr val="window" lastClr="FFFFFF"/>
+      </a:lt1>
+      <a:dk2>
+        <a:srgbClr val="0E2841"/>
+      </a:dk2>
+      <a:lt2>
+        <a:srgbClr val="E8E8E8"/>
+      </a:lt2>
+      <a:accent1>
+        <a:srgbClr val="156082"/>
+      </a:accent1>
+      <a:accent2>
+        <a:srgbClr val="E97132"/>
+      </a:accent2>
+      <a:accent3>
+        <a:srgbClr val="196B24"/>
+      </a:accent3>
+      <a:accent4>
+        <a:srgbClr val="0F9ED5"/>
+      </a:accent4>
+      <a:accent5>
+        <a:srgbClr val="A02B93"/>
+      </a:accent5>
+      <a:accent6>
+        <a:srgbClr val="4EA72E"/>
+      </a:accent6>
+      <a:hlink>
+        <a:srgbClr val="467886"/>
+      </a:hlink>
+      <a:folHlink>
+        <a:srgbClr val="96607D"/>
+      </a:folHlink>
+    </a:clrScheme>
+    <a:fontScheme name="Office">
+      <a:majorFont>
+        <a:latin typeface="Aptos Display" panose="02110004020202020204"/>
+        <a:ea typeface=""/>
+        <a:cs typeface=""/>
+        <a:font script="Jpan" typeface="游ゴシック Light"/>
+        <a:font script="Hang" typeface="맑은 고딕"/>
+        <a:font script="Hans" typeface="等线 Light"/>
+        <a:font script="Hant" typeface="新細明體"/>
+        <a:font script="Arab" typeface="Times New Roman"/>
+        <a:font script="Hebr" typeface="Times New Roman"/>
+        <a:font script="Thai" typeface="Angsana New"/>
+        <a:font script="Ethi" typeface="Nyala"/>
+        <a:font script="Beng" typeface="Vrinda"/>
+        <a:font script="Gujr" typeface="Shruti"/>
+        <a:font script="Khmr" typeface="MoolBoran"/>
+        <a:font script="Knda" typeface="Tunga"/>
+        <a:font script="Guru" typeface="Raavi"/>
+        <a:font script="Cans" typeface="Euphemia"/>
+        <a:font script="Cher" typeface="Plantagenet Cherokee"/>
+        <a:font script="Yiii" typeface="Microsoft Yi Baiti"/>
+        <a:font script="Tibt" typeface="Microsoft Himalaya"/>
+        <a:font script="Thaa" typeface="MV Boli"/>
+        <a:font script="Deva" typeface="Mangal"/>
+        <a:font script="Telu" typeface="Gautami"/>
+        <a:font script="Taml" typeface="Latha"/>
+        <a:font script="Syrc" typeface="Estrangelo Edessa"/>
+        <a:font script="Orya" typeface="Kalinga"/>
+        <a:font script="Mlym" typeface="Kartika"/>
+        <a:font script="Laoo" typeface="DokChampa"/>
+        <a:font script="Sinh" typeface="Iskoola Pota"/>
+        <a:font script="Mong" typeface="Mongolian Baiti"/>
+        <a:font script="Viet" typeface="Times New Roman"/>
+        <a:font script="Uigh" typeface="Microsoft Uighur"/>
+        <a:font script="Geor" typeface="Sylfaen"/>
+        <a:font script="Armn" typeface="Arial"/>
+        <a:font script="Bugi" typeface="Leelawadee UI"/>
+        <a:font script="Bopo" typeface="Microsoft JhengHei"/>
+        <a:font script="Java" typeface="Javanese Text"/>
+        <a:font script="Lisu" typeface="Segoe UI"/>
+        <a:font script="Mymr" typeface="Myanmar Text"/>
+        <a:font script="Nkoo" typeface="Ebrima"/>
+        <a:font script="Olck" typeface="Nirmala UI"/>
+        <a:font script="Osma" typeface="Ebrima"/>
+        <a:font script="Phag" typeface="Phagspa"/>
+        <a:font script="Syrn" typeface="Estrangelo Edessa"/>
+        <a:font script="Syrj" typeface="Estrangelo Edessa"/>
+        <a:font script="Syre" typeface="Estrangelo Edessa"/>
+        <a:font script="Sora" typeface="Nirmala UI"/>
+        <a:font script="Tale" typeface="Microsoft Tai Le"/>
+        <a:font script="Talu" typeface="Microsoft New Tai Lue"/>
+        <a:font script="Tfng" typeface="Ebrima"/>
+      </a:majorFont>
+      <a:minorFont>
+        <a:latin typeface="Aptos" panose="02110004020202020204"/>
+        <a:ea typeface=""/>
+        <a:cs typeface=""/>
+        <a:font script="Jpan" typeface="游ゴシック"/>
+        <a:font script="Hang" typeface="맑은 고딕"/>
+        <a:font script="Hans" typeface="等线"/>
+        <a:font script="Hant" typeface="新細明體"/>
+        <a:font script="Arab" typeface="Arial"/>
+        <a:font script="Hebr" typeface="Arial"/>
+        <a:font script="Thai" typeface="Cordia New"/>
+        <a:font script="Ethi" typeface="Nyala"/>
+        <a:font script="Beng" typeface="Vrinda"/>
+        <a:font script="Gujr" typeface="Shruti"/>
+        <a:font script="Khmr" typeface="DaunPenh"/>
+        <a:font script="Knda" typeface="Tunga"/>
+        <a:font script="Guru" typeface="Raavi"/>
+        <a:font script="Cans" typeface="Euphemia"/>
+        <a:font script="Cher" typeface="Plantagenet Cherokee"/>
+        <a:font script="Yiii" typeface="Microsoft Yi Baiti"/>
+        <a:font script="Tibt" typeface="Microsoft Himalaya"/>
+        <a:font script="Thaa" typeface="MV Boli"/>
+        <a:font script="Deva" typeface="Mangal"/>
+        <a:font script="Telu" typeface="Gautami"/>
+        <a:font script="Taml" typeface="Latha"/>
+        <a:font script="Syrc" typeface="Estrangelo Edessa"/>
+        <a:font script="Orya" typeface="Kalinga"/>
+        <a:font script="Mlym" typeface="Kartika"/>
+        <a:font script="Laoo" typeface="DokChampa"/>
+        <a:font script="Sinh" typeface="Iskoola Pota"/>
+        <a:font script="Mong" typeface="Mongolian Baiti"/>
+        <a:font script="Viet" typeface="Arial"/>
+        <a:font script="Uigh" typeface="Microsoft Uighur"/>
+        <a:font script="Geor" typeface="Sylfaen"/>
+        <a:font script="Armn" typeface="Arial"/>
+        <a:font script="Bugi" typeface="Leelawadee UI"/>
+        <a:font script="Bopo" typeface="Microsoft JhengHei"/>
+        <a:font script="Java" typeface="Javanese Text"/>
+        <a:font script="Lisu" typeface="Segoe UI"/>
+        <a:font script="Mymr" typeface="Myanmar Text"/>
+        <a:font script="Nkoo" typeface="Ebrima"/>
+        <a:font script="Olck" typeface="Nirmala UI"/>
+        <a:font script="Osma" typeface="Ebrima"/>
+        <a:font script="Phag" typeface="Phagspa"/>
+        <a:font script="Syrn" typeface="Estrangelo Edessa"/>
+        <a:font script="Syrj" typeface="Estrangelo Edessa"/>
+        <a:font script="Syre" typeface="Estrangelo Edessa"/>
+        <a:font script="Sora" typeface="Nirmala UI"/>
+        <a:font script="Tale" typeface="Microsoft Tai Le"/>
+        <a:font script="Talu" typeface="Microsoft New Tai Lue"/>
+        <a:font script="Tfng" typeface="Ebrima"/>
+      </a:minorFont>
+    </a:fontScheme>
+    <a:fmtScheme name="Office">
+      <a:fillStyleLst>
+        <a:solidFill>
+          <a:schemeClr val="phClr"/>
+        </a:solidFill>
+        <a:gradFill rotWithShape="1">
+          <a:gsLst>
+            <a:gs pos="0">
+              <a:schemeClr val="phClr">
+                <a:lumMod val="110000"/>
+                <a:satMod val="105000"/>
+                <a:tint val="67000"/>
+              </a:schemeClr>
+            </a:gs>
+            <a:gs pos="50000">
+              <a:schemeClr val="phClr">
+                <a:lumMod val="105000"/>
+                <a:satMod val="103000"/>
+                <a:tint val="73000"/>
+              </a:schemeClr>
+            </a:gs>
+            <a:gs pos="100000">
+              <a:schemeClr val="phClr">
+                <a:lumMod val="105000"/>
+                <a:satMod val="109000"/>
+                <a:tint val="81000"/>
+              </a:schemeClr>
+            </a:gs>
+          </a:gsLst>
+          <a:lin ang="5400000" scaled="0"/>
+        </a:gradFill>
+        <a:gradFill rotWithShape="1">
+          <a:gsLst>
+            <a:gs pos="0">
+              <a:schemeClr val="phClr">
+                <a:satMod val="103000"/>
+                <a:lumMod val="102000"/>
+                <a:tint val="94000"/>
+              </a:schemeClr>
+            </a:gs>
+            <a:gs pos="50000">
+              <a:schemeClr val="phClr">
+                <a:satMod val="110000"/>
+                <a:lumMod val="100000"/>
+                <a:shade val="100000"/>
+              </a:schemeClr>
+            </a:gs>
+            <a:gs pos="100000">
+              <a:schemeClr val="phClr">
+                <a:lumMod val="99000"/>
+                <a:satMod val="120000"/>
+                <a:shade val="78000"/>
+              </a:schemeClr>
+            </a:gs>
+          </a:gsLst>
+          <a:lin ang="5400000" scaled="0"/>
+        </a:gradFill>
+      </a:fillStyleLst>
+      <a:lnStyleLst>
+        <a:ln w="12700" cap="flat" cmpd="sng" algn="ctr">
+          <a:solidFill>
+            <a:schemeClr val="phClr"/>
+          </a:solidFill>
+          <a:prstDash val="solid"/>
+          <a:miter lim="800000"/>
+        </a:ln>
+        <a:ln w="19050" cap="flat" cmpd="sng" algn="ctr">
+          <a:solidFill>
+            <a:schemeClr val="phClr"/>
+          </a:solidFill>
+          <a:prstDash val="solid"/>
+          <a:miter lim="800000"/>
+        </a:ln>
+        <a:ln w="25400" cap="flat" cmpd="sng" algn="ctr">
+          <a:solidFill>
+            <a:schemeClr val="phClr"/>
+          </a:solidFill>
+          <a:prstDash val="solid"/>
+          <a:miter lim="800000"/>
+        </a:ln>
+      </a:lnStyleLst>
+      <a:effectStyleLst>
+        <a:effectStyle>
+          <a:effectLst/>
+        </a:effectStyle>
+        <a:effectStyle>
+          <a:effectLst/>
+        </a:effectStyle>
+        <a:effectStyle>
+          <a:effectLst>
+            <a:outerShdw blurRad="57150" dist="19050" dir="5400000" algn="ctr" rotWithShape="0">
+              <a:srgbClr val="000000">
+                <a:alpha val="63000"/>
+              </a:srgbClr>
+            </a:outerShdw>
+          </a:effectLst>
+        </a:effectStyle>
+      </a:effectStyleLst>
+      <a:bgFillStyleLst>
+        <a:solidFill>
+          <a:schemeClr val="phClr"/>
+        </a:solidFill>
+        <a:solidFill>
+          <a:schemeClr val="phClr">
+            <a:tint val="95000"/>
+            <a:satMod val="170000"/>
+          </a:schemeClr>
+        </a:solidFill>
+        <a:gradFill rotWithShape="1">
+          <a:gsLst>
+            <a:gs pos="0">
+              <a:schemeClr val="phClr">
+                <a:tint val="93000"/>
+                <a:satMod val="150000"/>
+                <a:shade val="98000"/>
+                <a:lumMod val="102000"/>
+              </a:schemeClr>
+            </a:gs>
+            <a:gs pos="50000">
+              <a:schemeClr val="phClr">
+                <a:tint val="98000"/>
+                <a:satMod val="130000"/>
+                <a:shade val="90000"/>
+                <a:lumMod val="103000"/>
+              </a:schemeClr>
+            </a:gs>
+            <a:gs pos="100000">
+              <a:schemeClr val="phClr">
+                <a:shade val="63000"/>
+                <a:satMod val="120000"/>
+              </a:schemeClr>
+            </a:gs>
+          </a:gsLst>
+          <a:lin ang="5400000" scaled="0"/>
+        </a:gradFill>
+      </a:bgFillStyleLst>
+    </a:fmtScheme>
+  </a:themeElements>
+  <a:objectDefaults>
+    <a:lnDef>
+      <a:spPr/>
+      <a:bodyPr/>
+      <a:lstStyle/>
+      <a:style>
+        <a:lnRef idx="2">
+          <a:schemeClr val="accent1"/>
+        </a:lnRef>
+        <a:fillRef idx="0">
+          <a:schemeClr val="accent1"/>
+        </a:fillRef>
+        <a:effectRef idx="1">
+          <a:schemeClr val="accent1"/>
+        </a:effectRef>
+        <a:fontRef idx="minor">
+          <a:schemeClr val="tx1"/>
+        </a:fontRef>
+      </a:style>
+    </a:lnDef>
+  </a:objectDefaults>
+  <a:extraClrSchemeLst/>
+  <a:extLst>
+    <a:ext uri="{05A4C25C-085E-4340-85A3-A5531E510DB2}">
+      <thm15:themeFamily xmlns:thm15="http://schemas.microsoft.com/office/thememl/2012/main" name="Office Theme" id="{2E142A2C-CD16-42D6-873A-C26D2A0506FA}" vid="{1BDDFF52-6CD6-40A5-AB3C-68EB2F1E4D0A}"/>
+    </a:ext>
+  </a:extLst>
+</a:theme>
 </file>
</xml_diff>

<commit_message>
Update PowerPoint template in raw templates directory
</commit_message>
<xml_diff>
--- a/office_templates/raw_templates/template.pptx
+++ b/office_templates/raw_templates/template.pptx
@@ -1,3 +1,120 @@
+
+<file path=ppt/presentation.xml><?xml version="1.0" encoding="utf-8"?>
+<p:presentation xmlns:a="http://schemas.openxmlformats.org/drawingml/2006/main" xmlns:r="http://schemas.openxmlformats.org/officeDocument/2006/relationships" xmlns:p="http://schemas.openxmlformats.org/presentationml/2006/main" saveSubsetFonts="1">
+  <p:sldMasterIdLst>
+    <p:sldMasterId id="2147483648" r:id="rId1"/>
+  </p:sldMasterIdLst>
+  <p:sldIdLst>
+    <p:sldId id="256" r:id="rId2"/>
+    <p:sldId id="257" r:id="rId3"/>
+    <p:sldId id="258" r:id="rId4"/>
+    <p:sldId id="260" r:id="rId5"/>
+    <p:sldId id="261" r:id="rId6"/>
+  </p:sldIdLst>
+  <p:sldSz cx="12192000" cy="6858000"/>
+  <p:notesSz cx="6858000" cy="9144000"/>
+  <p:defaultTextStyle>
+    <a:defPPr>
+      <a:defRPr lang="en-US"/>
+    </a:defPPr>
+    <a:lvl1pPr marL="0" algn="l" defTabSz="914400" rtl="0" eaLnBrk="1" latinLnBrk="0" hangingPunct="1">
+      <a:defRPr sz="1800" kern="1200">
+        <a:solidFill>
+          <a:schemeClr val="tx1"/>
+        </a:solidFill>
+        <a:latin typeface="+mn-lt"/>
+        <a:ea typeface="+mn-ea"/>
+        <a:cs typeface="+mn-cs"/>
+      </a:defRPr>
+    </a:lvl1pPr>
+    <a:lvl2pPr marL="457200" algn="l" defTabSz="914400" rtl="0" eaLnBrk="1" latinLnBrk="0" hangingPunct="1">
+      <a:defRPr sz="1800" kern="1200">
+        <a:solidFill>
+          <a:schemeClr val="tx1"/>
+        </a:solidFill>
+        <a:latin typeface="+mn-lt"/>
+        <a:ea typeface="+mn-ea"/>
+        <a:cs typeface="+mn-cs"/>
+      </a:defRPr>
+    </a:lvl2pPr>
+    <a:lvl3pPr marL="914400" algn="l" defTabSz="914400" rtl="0" eaLnBrk="1" latinLnBrk="0" hangingPunct="1">
+      <a:defRPr sz="1800" kern="1200">
+        <a:solidFill>
+          <a:schemeClr val="tx1"/>
+        </a:solidFill>
+        <a:latin typeface="+mn-lt"/>
+        <a:ea typeface="+mn-ea"/>
+        <a:cs typeface="+mn-cs"/>
+      </a:defRPr>
+    </a:lvl3pPr>
+    <a:lvl4pPr marL="1371600" algn="l" defTabSz="914400" rtl="0" eaLnBrk="1" latinLnBrk="0" hangingPunct="1">
+      <a:defRPr sz="1800" kern="1200">
+        <a:solidFill>
+          <a:schemeClr val="tx1"/>
+        </a:solidFill>
+        <a:latin typeface="+mn-lt"/>
+        <a:ea typeface="+mn-ea"/>
+        <a:cs typeface="+mn-cs"/>
+      </a:defRPr>
+    </a:lvl4pPr>
+    <a:lvl5pPr marL="1828800" algn="l" defTabSz="914400" rtl="0" eaLnBrk="1" latinLnBrk="0" hangingPunct="1">
+      <a:defRPr sz="1800" kern="1200">
+        <a:solidFill>
+          <a:schemeClr val="tx1"/>
+        </a:solidFill>
+        <a:latin typeface="+mn-lt"/>
+        <a:ea typeface="+mn-ea"/>
+        <a:cs typeface="+mn-cs"/>
+      </a:defRPr>
+    </a:lvl5pPr>
+    <a:lvl6pPr marL="2286000" algn="l" defTabSz="914400" rtl="0" eaLnBrk="1" latinLnBrk="0" hangingPunct="1">
+      <a:defRPr sz="1800" kern="1200">
+        <a:solidFill>
+          <a:schemeClr val="tx1"/>
+        </a:solidFill>
+        <a:latin typeface="+mn-lt"/>
+        <a:ea typeface="+mn-ea"/>
+        <a:cs typeface="+mn-cs"/>
+      </a:defRPr>
+    </a:lvl6pPr>
+    <a:lvl7pPr marL="2743200" algn="l" defTabSz="914400" rtl="0" eaLnBrk="1" latinLnBrk="0" hangingPunct="1">
+      <a:defRPr sz="1800" kern="1200">
+        <a:solidFill>
+          <a:schemeClr val="tx1"/>
+        </a:solidFill>
+        <a:latin typeface="+mn-lt"/>
+        <a:ea typeface="+mn-ea"/>
+        <a:cs typeface="+mn-cs"/>
+      </a:defRPr>
+    </a:lvl7pPr>
+    <a:lvl8pPr marL="3200400" algn="l" defTabSz="914400" rtl="0" eaLnBrk="1" latinLnBrk="0" hangingPunct="1">
+      <a:defRPr sz="1800" kern="1200">
+        <a:solidFill>
+          <a:schemeClr val="tx1"/>
+        </a:solidFill>
+        <a:latin typeface="+mn-lt"/>
+        <a:ea typeface="+mn-ea"/>
+        <a:cs typeface="+mn-cs"/>
+      </a:defRPr>
+    </a:lvl8pPr>
+    <a:lvl9pPr marL="3657600" algn="l" defTabSz="914400" rtl="0" eaLnBrk="1" latinLnBrk="0" hangingPunct="1">
+      <a:defRPr sz="1800" kern="1200">
+        <a:solidFill>
+          <a:schemeClr val="tx1"/>
+        </a:solidFill>
+        <a:latin typeface="+mn-lt"/>
+        <a:ea typeface="+mn-ea"/>
+        <a:cs typeface="+mn-cs"/>
+      </a:defRPr>
+    </a:lvl9pPr>
+  </p:defaultTextStyle>
+  <p:extLst>
+    <p:ext uri="{EFAFB233-063F-42B5-8137-9DF3F51BA10A}">
+      <p15:sldGuideLst xmlns:p15="http://schemas.microsoft.com/office/powerpoint/2012/main"/>
+    </p:ext>
+  </p:extLst>
+</p:presentation>
+</file>
 
 <file path=ppt/charts/chart1.xml><?xml version="1.0" encoding="utf-8"?>
 <c:chartSpace xmlns:c="http://schemas.openxmlformats.org/drawingml/2006/chart" xmlns:a="http://schemas.openxmlformats.org/drawingml/2006/main" xmlns:r="http://schemas.openxmlformats.org/officeDocument/2006/relationships" xmlns:c16r2="http://schemas.microsoft.com/office/drawing/2015/06/chart">
@@ -2864,6 +2981,1017 @@
 </p:sldLayout>
 </file>
 
+<file path=ppt/slideLayouts/slideLayout4.xml><?xml version="1.0" encoding="utf-8"?>
+<p:sldLayout xmlns:a="http://schemas.openxmlformats.org/drawingml/2006/main" xmlns:r="http://schemas.openxmlformats.org/officeDocument/2006/relationships" xmlns:p="http://schemas.openxmlformats.org/presentationml/2006/main" type="twoObj" preserve="1">
+  <p:cSld name="Two Content">
+    <p:spTree>
+      <p:nvGrpSpPr>
+        <p:cNvPr id="1" name=""/>
+        <p:cNvGrpSpPr/>
+        <p:nvPr/>
+      </p:nvGrpSpPr>
+      <p:grpSpPr>
+        <a:xfrm>
+          <a:off x="0" y="0"/>
+          <a:ext cx="0" cy="0"/>
+          <a:chOff x="0" y="0"/>
+          <a:chExt cx="0" cy="0"/>
+        </a:xfrm>
+      </p:grpSpPr>
+      <p:sp>
+        <p:nvSpPr>
+          <p:cNvPr id="2" name="Title 1">
+            <a:extLst>
+              <a:ext uri="{FF2B5EF4-FFF2-40B4-BE49-F238E27FC236}">
+                <a16:creationId xmlns:a16="http://schemas.microsoft.com/office/drawing/2014/main" id="{6AA9382B-2771-7905-FB39-C6522221611E}"/>
+              </a:ext>
+            </a:extLst>
+          </p:cNvPr>
+          <p:cNvSpPr>
+            <a:spLocks noGrp="1"/>
+          </p:cNvSpPr>
+          <p:nvPr>
+            <p:ph type="title"/>
+          </p:nvPr>
+        </p:nvSpPr>
+        <p:spPr/>
+        <p:txBody>
+          <a:bodyPr/>
+          <a:lstStyle/>
+          <a:p>
+            <a:r>
+              <a:rPr lang="en-US"/>
+              <a:t>Click to edit Master title style</a:t>
+            </a:r>
+          </a:p>
+        </p:txBody>
+      </p:sp>
+      <p:sp>
+        <p:nvSpPr>
+          <p:cNvPr id="3" name="Content Placeholder 2">
+            <a:extLst>
+              <a:ext uri="{FF2B5EF4-FFF2-40B4-BE49-F238E27FC236}">
+                <a16:creationId xmlns:a16="http://schemas.microsoft.com/office/drawing/2014/main" id="{E4264775-B919-E003-ED41-98CDE48EB232}"/>
+              </a:ext>
+            </a:extLst>
+          </p:cNvPr>
+          <p:cNvSpPr>
+            <a:spLocks noGrp="1"/>
+          </p:cNvSpPr>
+          <p:nvPr>
+            <p:ph sz="half" idx="1"/>
+          </p:nvPr>
+        </p:nvSpPr>
+        <p:spPr>
+          <a:xfrm>
+            <a:off x="838200" y="1825625"/>
+            <a:ext cx="5181600" cy="4351338"/>
+          </a:xfrm>
+        </p:spPr>
+        <p:txBody>
+          <a:bodyPr/>
+          <a:lstStyle/>
+          <a:p>
+            <a:pPr lvl="0"/>
+            <a:r>
+              <a:rPr lang="en-US"/>
+              <a:t>Click to edit Master text styles</a:t>
+            </a:r>
+          </a:p>
+          <a:p>
+            <a:pPr lvl="1"/>
+            <a:r>
+              <a:rPr lang="en-US"/>
+              <a:t>Second level</a:t>
+            </a:r>
+          </a:p>
+          <a:p>
+            <a:pPr lvl="2"/>
+            <a:r>
+              <a:rPr lang="en-US"/>
+              <a:t>Third level</a:t>
+            </a:r>
+          </a:p>
+          <a:p>
+            <a:pPr lvl="3"/>
+            <a:r>
+              <a:rPr lang="en-US"/>
+              <a:t>Fourth level</a:t>
+            </a:r>
+          </a:p>
+          <a:p>
+            <a:pPr lvl="4"/>
+            <a:r>
+              <a:rPr lang="en-US"/>
+              <a:t>Fifth level</a:t>
+            </a:r>
+          </a:p>
+        </p:txBody>
+      </p:sp>
+      <p:sp>
+        <p:nvSpPr>
+          <p:cNvPr id="4" name="Content Placeholder 3">
+            <a:extLst>
+              <a:ext uri="{FF2B5EF4-FFF2-40B4-BE49-F238E27FC236}">
+                <a16:creationId xmlns:a16="http://schemas.microsoft.com/office/drawing/2014/main" id="{2F6883A7-2B57-BE7E-9C84-BC503D84DD0D}"/>
+              </a:ext>
+            </a:extLst>
+          </p:cNvPr>
+          <p:cNvSpPr>
+            <a:spLocks noGrp="1"/>
+          </p:cNvSpPr>
+          <p:nvPr>
+            <p:ph sz="half" idx="2"/>
+          </p:nvPr>
+        </p:nvSpPr>
+        <p:spPr>
+          <a:xfrm>
+            <a:off x="6172200" y="1825625"/>
+            <a:ext cx="5181600" cy="4351338"/>
+          </a:xfrm>
+        </p:spPr>
+        <p:txBody>
+          <a:bodyPr/>
+          <a:lstStyle/>
+          <a:p>
+            <a:pPr lvl="0"/>
+            <a:r>
+              <a:rPr lang="en-US"/>
+              <a:t>Click to edit Master text styles</a:t>
+            </a:r>
+          </a:p>
+          <a:p>
+            <a:pPr lvl="1"/>
+            <a:r>
+              <a:rPr lang="en-US"/>
+              <a:t>Second level</a:t>
+            </a:r>
+          </a:p>
+          <a:p>
+            <a:pPr lvl="2"/>
+            <a:r>
+              <a:rPr lang="en-US"/>
+              <a:t>Third level</a:t>
+            </a:r>
+          </a:p>
+          <a:p>
+            <a:pPr lvl="3"/>
+            <a:r>
+              <a:rPr lang="en-US"/>
+              <a:t>Fourth level</a:t>
+            </a:r>
+          </a:p>
+          <a:p>
+            <a:pPr lvl="4"/>
+            <a:r>
+              <a:rPr lang="en-US"/>
+              <a:t>Fifth level</a:t>
+            </a:r>
+          </a:p>
+        </p:txBody>
+      </p:sp>
+      <p:sp>
+        <p:nvSpPr>
+          <p:cNvPr id="5" name="Date Placeholder 4">
+            <a:extLst>
+              <a:ext uri="{FF2B5EF4-FFF2-40B4-BE49-F238E27FC236}">
+                <a16:creationId xmlns:a16="http://schemas.microsoft.com/office/drawing/2014/main" id="{E15E8222-607B-C0BC-9460-E9FB01D18DFB}"/>
+              </a:ext>
+            </a:extLst>
+          </p:cNvPr>
+          <p:cNvSpPr>
+            <a:spLocks noGrp="1"/>
+          </p:cNvSpPr>
+          <p:nvPr>
+            <p:ph type="dt" sz="half" idx="10"/>
+          </p:nvPr>
+        </p:nvSpPr>
+        <p:spPr/>
+        <p:txBody>
+          <a:bodyPr/>
+          <a:lstStyle/>
+          <a:p>
+            <a:fld id="{8427D8FB-80AB-4B65-A20D-AFAA152C1E96}" type="datetimeFigureOut">
+              <a:rPr lang="en-US" smtClean="0"/>
+              <a:t>7/3/25</a:t>
+            </a:fld>
+            <a:endParaRPr lang="en-US"/>
+          </a:p>
+        </p:txBody>
+      </p:sp>
+      <p:sp>
+        <p:nvSpPr>
+          <p:cNvPr id="6" name="Footer Placeholder 5">
+            <a:extLst>
+              <a:ext uri="{FF2B5EF4-FFF2-40B4-BE49-F238E27FC236}">
+                <a16:creationId xmlns:a16="http://schemas.microsoft.com/office/drawing/2014/main" id="{E85CB72C-F971-9A52-4DF0-ACDAA07A7B9B}"/>
+              </a:ext>
+            </a:extLst>
+          </p:cNvPr>
+          <p:cNvSpPr>
+            <a:spLocks noGrp="1"/>
+          </p:cNvSpPr>
+          <p:nvPr>
+            <p:ph type="ftr" sz="quarter" idx="11"/>
+          </p:nvPr>
+        </p:nvSpPr>
+        <p:spPr/>
+        <p:txBody>
+          <a:bodyPr/>
+          <a:lstStyle/>
+          <a:p>
+            <a:endParaRPr lang="en-US"/>
+          </a:p>
+        </p:txBody>
+      </p:sp>
+      <p:sp>
+        <p:nvSpPr>
+          <p:cNvPr id="7" name="Slide Number Placeholder 6">
+            <a:extLst>
+              <a:ext uri="{FF2B5EF4-FFF2-40B4-BE49-F238E27FC236}">
+                <a16:creationId xmlns:a16="http://schemas.microsoft.com/office/drawing/2014/main" id="{59B123F5-0AEE-C047-32DA-2D3790FD46BC}"/>
+              </a:ext>
+            </a:extLst>
+          </p:cNvPr>
+          <p:cNvSpPr>
+            <a:spLocks noGrp="1"/>
+          </p:cNvSpPr>
+          <p:nvPr>
+            <p:ph type="sldNum" sz="quarter" idx="12"/>
+          </p:nvPr>
+        </p:nvSpPr>
+        <p:spPr/>
+        <p:txBody>
+          <a:bodyPr/>
+          <a:lstStyle/>
+          <a:p>
+            <a:fld id="{282CF145-C1F5-4F0A-9E2D-FC4643FE6C56}" type="slidenum">
+              <a:rPr lang="en-US" smtClean="0"/>
+              <a:t>‹#›</a:t>
+            </a:fld>
+            <a:endParaRPr lang="en-US"/>
+          </a:p>
+        </p:txBody>
+      </p:sp>
+    </p:spTree>
+    <p:extLst>
+      <p:ext uri="{BB962C8B-B14F-4D97-AF65-F5344CB8AC3E}">
+        <p14:creationId xmlns:p14="http://schemas.microsoft.com/office/powerpoint/2010/main" val="3602058406"/>
+      </p:ext>
+    </p:extLst>
+  </p:cSld>
+  <p:clrMapOvr>
+    <a:masterClrMapping/>
+  </p:clrMapOvr>
+</p:sldLayout>
+</file>
+
+<file path=ppt/slideLayouts/slideLayout5.xml><?xml version="1.0" encoding="utf-8"?>
+<p:sldLayout xmlns:a="http://schemas.openxmlformats.org/drawingml/2006/main" xmlns:r="http://schemas.openxmlformats.org/officeDocument/2006/relationships" xmlns:p="http://schemas.openxmlformats.org/presentationml/2006/main" type="twoTxTwoObj" preserve="1">
+  <p:cSld name="Comparison">
+    <p:spTree>
+      <p:nvGrpSpPr>
+        <p:cNvPr id="1" name=""/>
+        <p:cNvGrpSpPr/>
+        <p:nvPr/>
+      </p:nvGrpSpPr>
+      <p:grpSpPr>
+        <a:xfrm>
+          <a:off x="0" y="0"/>
+          <a:ext cx="0" cy="0"/>
+          <a:chOff x="0" y="0"/>
+          <a:chExt cx="0" cy="0"/>
+        </a:xfrm>
+      </p:grpSpPr>
+      <p:sp>
+        <p:nvSpPr>
+          <p:cNvPr id="2" name="Title 1">
+            <a:extLst>
+              <a:ext uri="{FF2B5EF4-FFF2-40B4-BE49-F238E27FC236}">
+                <a16:creationId xmlns:a16="http://schemas.microsoft.com/office/drawing/2014/main" id="{8D94F71A-A05A-D245-2CCE-D9740F78AA08}"/>
+              </a:ext>
+            </a:extLst>
+          </p:cNvPr>
+          <p:cNvSpPr>
+            <a:spLocks noGrp="1"/>
+          </p:cNvSpPr>
+          <p:nvPr>
+            <p:ph type="title"/>
+          </p:nvPr>
+        </p:nvSpPr>
+        <p:spPr>
+          <a:xfrm>
+            <a:off x="839788" y="365125"/>
+            <a:ext cx="10515600" cy="1325563"/>
+          </a:xfrm>
+        </p:spPr>
+        <p:txBody>
+          <a:bodyPr/>
+          <a:lstStyle/>
+          <a:p>
+            <a:r>
+              <a:rPr lang="en-US"/>
+              <a:t>Click to edit Master title style</a:t>
+            </a:r>
+          </a:p>
+        </p:txBody>
+      </p:sp>
+      <p:sp>
+        <p:nvSpPr>
+          <p:cNvPr id="3" name="Text Placeholder 2">
+            <a:extLst>
+              <a:ext uri="{FF2B5EF4-FFF2-40B4-BE49-F238E27FC236}">
+                <a16:creationId xmlns:a16="http://schemas.microsoft.com/office/drawing/2014/main" id="{5FB77C80-F35D-3D3F-7708-72E8A07D511E}"/>
+              </a:ext>
+            </a:extLst>
+          </p:cNvPr>
+          <p:cNvSpPr>
+            <a:spLocks noGrp="1"/>
+          </p:cNvSpPr>
+          <p:nvPr>
+            <p:ph type="body" idx="1"/>
+          </p:nvPr>
+        </p:nvSpPr>
+        <p:spPr>
+          <a:xfrm>
+            <a:off x="839788" y="1681163"/>
+            <a:ext cx="5157787" cy="823912"/>
+          </a:xfrm>
+        </p:spPr>
+        <p:txBody>
+          <a:bodyPr anchor="b"/>
+          <a:lstStyle>
+            <a:lvl1pPr marL="0" indent="0">
+              <a:buNone/>
+              <a:defRPr sz="2400" b="1"/>
+            </a:lvl1pPr>
+            <a:lvl2pPr marL="457200" indent="0">
+              <a:buNone/>
+              <a:defRPr sz="2000" b="1"/>
+            </a:lvl2pPr>
+            <a:lvl3pPr marL="914400" indent="0">
+              <a:buNone/>
+              <a:defRPr sz="1800" b="1"/>
+            </a:lvl3pPr>
+            <a:lvl4pPr marL="1371600" indent="0">
+              <a:buNone/>
+              <a:defRPr sz="1600" b="1"/>
+            </a:lvl4pPr>
+            <a:lvl5pPr marL="1828800" indent="0">
+              <a:buNone/>
+              <a:defRPr sz="1600" b="1"/>
+            </a:lvl5pPr>
+            <a:lvl6pPr marL="2286000" indent="0">
+              <a:buNone/>
+              <a:defRPr sz="1600" b="1"/>
+            </a:lvl6pPr>
+            <a:lvl7pPr marL="2743200" indent="0">
+              <a:buNone/>
+              <a:defRPr sz="1600" b="1"/>
+            </a:lvl7pPr>
+            <a:lvl8pPr marL="3200400" indent="0">
+              <a:buNone/>
+              <a:defRPr sz="1600" b="1"/>
+            </a:lvl8pPr>
+            <a:lvl9pPr marL="3657600" indent="0">
+              <a:buNone/>
+              <a:defRPr sz="1600" b="1"/>
+            </a:lvl9pPr>
+          </a:lstStyle>
+          <a:p>
+            <a:pPr lvl="0"/>
+            <a:r>
+              <a:rPr lang="en-US"/>
+              <a:t>Click to edit Master text styles</a:t>
+            </a:r>
+          </a:p>
+        </p:txBody>
+      </p:sp>
+      <p:sp>
+        <p:nvSpPr>
+          <p:cNvPr id="4" name="Content Placeholder 3">
+            <a:extLst>
+              <a:ext uri="{FF2B5EF4-FFF2-40B4-BE49-F238E27FC236}">
+                <a16:creationId xmlns:a16="http://schemas.microsoft.com/office/drawing/2014/main" id="{DFDDAF08-7E1C-5408-1321-81C601A0DEB3}"/>
+              </a:ext>
+            </a:extLst>
+          </p:cNvPr>
+          <p:cNvSpPr>
+            <a:spLocks noGrp="1"/>
+          </p:cNvSpPr>
+          <p:nvPr>
+            <p:ph sz="half" idx="2"/>
+          </p:nvPr>
+        </p:nvSpPr>
+        <p:spPr>
+          <a:xfrm>
+            <a:off x="839788" y="2505075"/>
+            <a:ext cx="5157787" cy="3684588"/>
+          </a:xfrm>
+        </p:spPr>
+        <p:txBody>
+          <a:bodyPr/>
+          <a:lstStyle/>
+          <a:p>
+            <a:pPr lvl="0"/>
+            <a:r>
+              <a:rPr lang="en-US"/>
+              <a:t>Click to edit Master text styles</a:t>
+            </a:r>
+          </a:p>
+          <a:p>
+            <a:pPr lvl="1"/>
+            <a:r>
+              <a:rPr lang="en-US"/>
+              <a:t>Second level</a:t>
+            </a:r>
+          </a:p>
+          <a:p>
+            <a:pPr lvl="2"/>
+            <a:r>
+              <a:rPr lang="en-US"/>
+              <a:t>Third level</a:t>
+            </a:r>
+          </a:p>
+          <a:p>
+            <a:pPr lvl="3"/>
+            <a:r>
+              <a:rPr lang="en-US"/>
+              <a:t>Fourth level</a:t>
+            </a:r>
+          </a:p>
+          <a:p>
+            <a:pPr lvl="4"/>
+            <a:r>
+              <a:rPr lang="en-US"/>
+              <a:t>Fifth level</a:t>
+            </a:r>
+          </a:p>
+        </p:txBody>
+      </p:sp>
+      <p:sp>
+        <p:nvSpPr>
+          <p:cNvPr id="5" name="Text Placeholder 4">
+            <a:extLst>
+              <a:ext uri="{FF2B5EF4-FFF2-40B4-BE49-F238E27FC236}">
+                <a16:creationId xmlns:a16="http://schemas.microsoft.com/office/drawing/2014/main" id="{B050A2EA-C72C-4658-40BC-77D34C36A6F7}"/>
+              </a:ext>
+            </a:extLst>
+          </p:cNvPr>
+          <p:cNvSpPr>
+            <a:spLocks noGrp="1"/>
+          </p:cNvSpPr>
+          <p:nvPr>
+            <p:ph type="body" sz="quarter" idx="3"/>
+          </p:nvPr>
+        </p:nvSpPr>
+        <p:spPr>
+          <a:xfrm>
+            <a:off x="6172200" y="1681163"/>
+            <a:ext cx="5183188" cy="823912"/>
+          </a:xfrm>
+        </p:spPr>
+        <p:txBody>
+          <a:bodyPr anchor="b"/>
+          <a:lstStyle>
+            <a:lvl1pPr marL="0" indent="0">
+              <a:buNone/>
+              <a:defRPr sz="2400" b="1"/>
+            </a:lvl1pPr>
+            <a:lvl2pPr marL="457200" indent="0">
+              <a:buNone/>
+              <a:defRPr sz="2000" b="1"/>
+            </a:lvl2pPr>
+            <a:lvl3pPr marL="914400" indent="0">
+              <a:buNone/>
+              <a:defRPr sz="1800" b="1"/>
+            </a:lvl3pPr>
+            <a:lvl4pPr marL="1371600" indent="0">
+              <a:buNone/>
+              <a:defRPr sz="1600" b="1"/>
+            </a:lvl4pPr>
+            <a:lvl5pPr marL="1828800" indent="0">
+              <a:buNone/>
+              <a:defRPr sz="1600" b="1"/>
+            </a:lvl5pPr>
+            <a:lvl6pPr marL="2286000" indent="0">
+              <a:buNone/>
+              <a:defRPr sz="1600" b="1"/>
+            </a:lvl6pPr>
+            <a:lvl7pPr marL="2743200" indent="0">
+              <a:buNone/>
+              <a:defRPr sz="1600" b="1"/>
+            </a:lvl7pPr>
+            <a:lvl8pPr marL="3200400" indent="0">
+              <a:buNone/>
+              <a:defRPr sz="1600" b="1"/>
+            </a:lvl8pPr>
+            <a:lvl9pPr marL="3657600" indent="0">
+              <a:buNone/>
+              <a:defRPr sz="1600" b="1"/>
+            </a:lvl9pPr>
+          </a:lstStyle>
+          <a:p>
+            <a:pPr lvl="0"/>
+            <a:r>
+              <a:rPr lang="en-US"/>
+              <a:t>Click to edit Master text styles</a:t>
+            </a:r>
+          </a:p>
+        </p:txBody>
+      </p:sp>
+      <p:sp>
+        <p:nvSpPr>
+          <p:cNvPr id="6" name="Content Placeholder 5">
+            <a:extLst>
+              <a:ext uri="{FF2B5EF4-FFF2-40B4-BE49-F238E27FC236}">
+                <a16:creationId xmlns:a16="http://schemas.microsoft.com/office/drawing/2014/main" id="{73B9D1FA-A70C-9020-E538-A1469768EC71}"/>
+              </a:ext>
+            </a:extLst>
+          </p:cNvPr>
+          <p:cNvSpPr>
+            <a:spLocks noGrp="1"/>
+          </p:cNvSpPr>
+          <p:nvPr>
+            <p:ph sz="quarter" idx="4"/>
+          </p:nvPr>
+        </p:nvSpPr>
+        <p:spPr>
+          <a:xfrm>
+            <a:off x="6172200" y="2505075"/>
+            <a:ext cx="5183188" cy="3684588"/>
+          </a:xfrm>
+        </p:spPr>
+        <p:txBody>
+          <a:bodyPr/>
+          <a:lstStyle/>
+          <a:p>
+            <a:pPr lvl="0"/>
+            <a:r>
+              <a:rPr lang="en-US"/>
+              <a:t>Click to edit Master text styles</a:t>
+            </a:r>
+          </a:p>
+          <a:p>
+            <a:pPr lvl="1"/>
+            <a:r>
+              <a:rPr lang="en-US"/>
+              <a:t>Second level</a:t>
+            </a:r>
+          </a:p>
+          <a:p>
+            <a:pPr lvl="2"/>
+            <a:r>
+              <a:rPr lang="en-US"/>
+              <a:t>Third level</a:t>
+            </a:r>
+          </a:p>
+          <a:p>
+            <a:pPr lvl="3"/>
+            <a:r>
+              <a:rPr lang="en-US"/>
+              <a:t>Fourth level</a:t>
+            </a:r>
+          </a:p>
+          <a:p>
+            <a:pPr lvl="4"/>
+            <a:r>
+              <a:rPr lang="en-US"/>
+              <a:t>Fifth level</a:t>
+            </a:r>
+          </a:p>
+        </p:txBody>
+      </p:sp>
+      <p:sp>
+        <p:nvSpPr>
+          <p:cNvPr id="7" name="Date Placeholder 6">
+            <a:extLst>
+              <a:ext uri="{FF2B5EF4-FFF2-40B4-BE49-F238E27FC236}">
+                <a16:creationId xmlns:a16="http://schemas.microsoft.com/office/drawing/2014/main" id="{E717F16E-A445-8E09-0FC0-4E4784B6813A}"/>
+              </a:ext>
+            </a:extLst>
+          </p:cNvPr>
+          <p:cNvSpPr>
+            <a:spLocks noGrp="1"/>
+          </p:cNvSpPr>
+          <p:nvPr>
+            <p:ph type="dt" sz="half" idx="10"/>
+          </p:nvPr>
+        </p:nvSpPr>
+        <p:spPr/>
+        <p:txBody>
+          <a:bodyPr/>
+          <a:lstStyle/>
+          <a:p>
+            <a:fld id="{8427D8FB-80AB-4B65-A20D-AFAA152C1E96}" type="datetimeFigureOut">
+              <a:rPr lang="en-US" smtClean="0"/>
+              <a:t>7/3/25</a:t>
+            </a:fld>
+            <a:endParaRPr lang="en-US"/>
+          </a:p>
+        </p:txBody>
+      </p:sp>
+      <p:sp>
+        <p:nvSpPr>
+          <p:cNvPr id="8" name="Footer Placeholder 7">
+            <a:extLst>
+              <a:ext uri="{FF2B5EF4-FFF2-40B4-BE49-F238E27FC236}">
+                <a16:creationId xmlns:a16="http://schemas.microsoft.com/office/drawing/2014/main" id="{6F9B8CF3-6860-780C-3E6E-179D7E061F81}"/>
+              </a:ext>
+            </a:extLst>
+          </p:cNvPr>
+          <p:cNvSpPr>
+            <a:spLocks noGrp="1"/>
+          </p:cNvSpPr>
+          <p:nvPr>
+            <p:ph type="ftr" sz="quarter" idx="11"/>
+          </p:nvPr>
+        </p:nvSpPr>
+        <p:spPr/>
+        <p:txBody>
+          <a:bodyPr/>
+          <a:lstStyle/>
+          <a:p>
+            <a:endParaRPr lang="en-US"/>
+          </a:p>
+        </p:txBody>
+      </p:sp>
+      <p:sp>
+        <p:nvSpPr>
+          <p:cNvPr id="9" name="Slide Number Placeholder 8">
+            <a:extLst>
+              <a:ext uri="{FF2B5EF4-FFF2-40B4-BE49-F238E27FC236}">
+                <a16:creationId xmlns:a16="http://schemas.microsoft.com/office/drawing/2014/main" id="{4DDD62C5-D8D2-0951-98A7-D6E1DB332CA1}"/>
+              </a:ext>
+            </a:extLst>
+          </p:cNvPr>
+          <p:cNvSpPr>
+            <a:spLocks noGrp="1"/>
+          </p:cNvSpPr>
+          <p:nvPr>
+            <p:ph type="sldNum" sz="quarter" idx="12"/>
+          </p:nvPr>
+        </p:nvSpPr>
+        <p:spPr/>
+        <p:txBody>
+          <a:bodyPr/>
+          <a:lstStyle/>
+          <a:p>
+            <a:fld id="{282CF145-C1F5-4F0A-9E2D-FC4643FE6C56}" type="slidenum">
+              <a:rPr lang="en-US" smtClean="0"/>
+              <a:t>‹#›</a:t>
+            </a:fld>
+            <a:endParaRPr lang="en-US"/>
+          </a:p>
+        </p:txBody>
+      </p:sp>
+    </p:spTree>
+    <p:extLst>
+      <p:ext uri="{BB962C8B-B14F-4D97-AF65-F5344CB8AC3E}">
+        <p14:creationId xmlns:p14="http://schemas.microsoft.com/office/powerpoint/2010/main" val="1691935298"/>
+      </p:ext>
+    </p:extLst>
+  </p:cSld>
+  <p:clrMapOvr>
+    <a:masterClrMapping/>
+  </p:clrMapOvr>
+</p:sldLayout>
+</file>
+
+<file path=ppt/slideLayouts/slideLayout6.xml><?xml version="1.0" encoding="utf-8"?>
+<p:sldLayout xmlns:a="http://schemas.openxmlformats.org/drawingml/2006/main" xmlns:r="http://schemas.openxmlformats.org/officeDocument/2006/relationships" xmlns:p="http://schemas.openxmlformats.org/presentationml/2006/main" type="titleOnly" preserve="1">
+  <p:cSld name="Title Only">
+    <p:spTree>
+      <p:nvGrpSpPr>
+        <p:cNvPr id="1" name=""/>
+        <p:cNvGrpSpPr/>
+        <p:nvPr/>
+      </p:nvGrpSpPr>
+      <p:grpSpPr>
+        <a:xfrm>
+          <a:off x="0" y="0"/>
+          <a:ext cx="0" cy="0"/>
+          <a:chOff x="0" y="0"/>
+          <a:chExt cx="0" cy="0"/>
+        </a:xfrm>
+      </p:grpSpPr>
+      <p:sp>
+        <p:nvSpPr>
+          <p:cNvPr id="2" name="Title 1">
+            <a:extLst>
+              <a:ext uri="{FF2B5EF4-FFF2-40B4-BE49-F238E27FC236}">
+                <a16:creationId xmlns:a16="http://schemas.microsoft.com/office/drawing/2014/main" id="{C373B238-9011-68E5-0038-7E3D69DD62BE}"/>
+              </a:ext>
+            </a:extLst>
+          </p:cNvPr>
+          <p:cNvSpPr>
+            <a:spLocks noGrp="1"/>
+          </p:cNvSpPr>
+          <p:nvPr>
+            <p:ph type="title"/>
+          </p:nvPr>
+        </p:nvSpPr>
+        <p:spPr/>
+        <p:txBody>
+          <a:bodyPr/>
+          <a:lstStyle/>
+          <a:p>
+            <a:r>
+              <a:rPr lang="en-US"/>
+              <a:t>Click to edit Master title style</a:t>
+            </a:r>
+          </a:p>
+        </p:txBody>
+      </p:sp>
+      <p:sp>
+        <p:nvSpPr>
+          <p:cNvPr id="3" name="Date Placeholder 2">
+            <a:extLst>
+              <a:ext uri="{FF2B5EF4-FFF2-40B4-BE49-F238E27FC236}">
+                <a16:creationId xmlns:a16="http://schemas.microsoft.com/office/drawing/2014/main" id="{BAAC9D6D-BD0A-946B-DEF6-FC8E95DC7821}"/>
+              </a:ext>
+            </a:extLst>
+          </p:cNvPr>
+          <p:cNvSpPr>
+            <a:spLocks noGrp="1"/>
+          </p:cNvSpPr>
+          <p:nvPr>
+            <p:ph type="dt" sz="half" idx="10"/>
+          </p:nvPr>
+        </p:nvSpPr>
+        <p:spPr/>
+        <p:txBody>
+          <a:bodyPr/>
+          <a:lstStyle/>
+          <a:p>
+            <a:fld id="{8427D8FB-80AB-4B65-A20D-AFAA152C1E96}" type="datetimeFigureOut">
+              <a:rPr lang="en-US" smtClean="0"/>
+              <a:t>7/3/25</a:t>
+            </a:fld>
+            <a:endParaRPr lang="en-US"/>
+          </a:p>
+        </p:txBody>
+      </p:sp>
+      <p:sp>
+        <p:nvSpPr>
+          <p:cNvPr id="4" name="Footer Placeholder 3">
+            <a:extLst>
+              <a:ext uri="{FF2B5EF4-FFF2-40B4-BE49-F238E27FC236}">
+                <a16:creationId xmlns:a16="http://schemas.microsoft.com/office/drawing/2014/main" id="{5823A34B-6971-63D2-9D80-755C6A4D128D}"/>
+              </a:ext>
+            </a:extLst>
+          </p:cNvPr>
+          <p:cNvSpPr>
+            <a:spLocks noGrp="1"/>
+          </p:cNvSpPr>
+          <p:nvPr>
+            <p:ph type="ftr" sz="quarter" idx="11"/>
+          </p:nvPr>
+        </p:nvSpPr>
+        <p:spPr/>
+        <p:txBody>
+          <a:bodyPr/>
+          <a:lstStyle/>
+          <a:p>
+            <a:endParaRPr lang="en-US"/>
+          </a:p>
+        </p:txBody>
+      </p:sp>
+      <p:sp>
+        <p:nvSpPr>
+          <p:cNvPr id="5" name="Slide Number Placeholder 4">
+            <a:extLst>
+              <a:ext uri="{FF2B5EF4-FFF2-40B4-BE49-F238E27FC236}">
+                <a16:creationId xmlns:a16="http://schemas.microsoft.com/office/drawing/2014/main" id="{E9A5159E-9AEB-757F-DC5F-2377856EF002}"/>
+              </a:ext>
+            </a:extLst>
+          </p:cNvPr>
+          <p:cNvSpPr>
+            <a:spLocks noGrp="1"/>
+          </p:cNvSpPr>
+          <p:nvPr>
+            <p:ph type="sldNum" sz="quarter" idx="12"/>
+          </p:nvPr>
+        </p:nvSpPr>
+        <p:spPr/>
+        <p:txBody>
+          <a:bodyPr/>
+          <a:lstStyle/>
+          <a:p>
+            <a:fld id="{282CF145-C1F5-4F0A-9E2D-FC4643FE6C56}" type="slidenum">
+              <a:rPr lang="en-US" smtClean="0"/>
+              <a:t>‹#›</a:t>
+            </a:fld>
+            <a:endParaRPr lang="en-US"/>
+          </a:p>
+        </p:txBody>
+      </p:sp>
+    </p:spTree>
+    <p:extLst>
+      <p:ext uri="{BB962C8B-B14F-4D97-AF65-F5344CB8AC3E}">
+        <p14:creationId xmlns:p14="http://schemas.microsoft.com/office/powerpoint/2010/main" val="1921323630"/>
+      </p:ext>
+    </p:extLst>
+  </p:cSld>
+  <p:clrMapOvr>
+    <a:masterClrMapping/>
+  </p:clrMapOvr>
+</p:sldLayout>
+</file>
+
+<file path=ppt/slideLayouts/slideLayout7.xml><?xml version="1.0" encoding="utf-8"?>
+<p:sldLayout xmlns:a="http://schemas.openxmlformats.org/drawingml/2006/main" xmlns:r="http://schemas.openxmlformats.org/officeDocument/2006/relationships" xmlns:p="http://schemas.openxmlformats.org/presentationml/2006/main" type="tx">
+  <p:cSld>
+    <p:spTree>
+      <p:nvGrpSpPr>
+        <p:cNvPr id="1" name=""/>
+        <p:cNvGrpSpPr/>
+        <p:nvPr/>
+      </p:nvGrpSpPr>
+      <p:grpSpPr>
+        <a:xfrm>
+          <a:off x="0" y="0"/>
+          <a:ext cx="0" cy="0"/>
+          <a:chOff x="0" y="0"/>
+          <a:chExt cx="0" cy="0"/>
+        </a:xfrm>
+      </p:grpSpPr>
+      <p:sp>
+        <p:nvSpPr>
+          <p:cNvPr id="2" name="Title 1">
+            <a:extLst>
+              <a:ext uri="{FF2B5EF4-FFF2-40B4-BE49-F238E27FC236}">
+                <a16:creationId xmlns:a16="http://schemas.microsoft.com/office/drawing/2014/main" id="{25198F0C-696B-EC3F-EA01-D8091FC4519C}"/>
+              </a:ext>
+            </a:extLst>
+          </p:cNvPr>
+          <p:cNvSpPr>
+            <a:spLocks noGrp="1"/>
+          </p:cNvSpPr>
+          <p:nvPr>
+            <p:ph type="title"/>
+          </p:nvPr>
+        </p:nvSpPr>
+        <p:spPr/>
+        <p:txBody>
+          <a:bodyPr/>
+          <a:lstStyle/>
+          <a:p>
+            <a:r>
+              <a:rPr lang="en-US"/>
+              <a:t>Click to edit Master title style</a:t>
+            </a:r>
+          </a:p>
+        </p:txBody>
+      </p:sp>
+      <p:sp>
+        <p:nvSpPr>
+          <p:cNvPr id="3" name="Text Placeholder 2">
+            <a:extLst>
+              <a:ext uri="{FF2B5EF4-FFF2-40B4-BE49-F238E27FC236}">
+                <a16:creationId xmlns:a16="http://schemas.microsoft.com/office/drawing/2014/main" id="{90BAE444-C7E5-6FF3-167A-B886BD336449}"/>
+              </a:ext>
+            </a:extLst>
+          </p:cNvPr>
+          <p:cNvSpPr>
+            <a:spLocks noGrp="1"/>
+          </p:cNvSpPr>
+          <p:nvPr>
+            <p:ph type="body" idx="1"/>
+          </p:nvPr>
+        </p:nvSpPr>
+        <p:spPr/>
+        <p:txBody>
+          <a:bodyPr/>
+          <a:lstStyle/>
+          <a:p>
+            <a:pPr lvl="0"/>
+            <a:r>
+              <a:rPr lang="en-US"/>
+              <a:t>Click to edit Master text styles</a:t>
+            </a:r>
+          </a:p>
+          <a:p>
+            <a:pPr lvl="1"/>
+            <a:r>
+              <a:rPr lang="en-US"/>
+              <a:t>Second level</a:t>
+            </a:r>
+          </a:p>
+          <a:p>
+            <a:pPr lvl="2"/>
+            <a:r>
+              <a:rPr lang="en-US"/>
+              <a:t>Third level</a:t>
+            </a:r>
+          </a:p>
+          <a:p>
+            <a:pPr lvl="3"/>
+            <a:r>
+              <a:rPr lang="en-US"/>
+              <a:t>Fourth level</a:t>
+            </a:r>
+          </a:p>
+          <a:p>
+            <a:pPr lvl="4"/>
+            <a:r>
+              <a:rPr lang="en-US"/>
+              <a:t>Fifth level</a:t>
+            </a:r>
+          </a:p>
+        </p:txBody>
+      </p:sp>
+      <p:sp>
+        <p:nvSpPr>
+          <p:cNvPr id="4" name="Date Placeholder 3">
+            <a:extLst>
+              <a:ext uri="{FF2B5EF4-FFF2-40B4-BE49-F238E27FC236}">
+                <a16:creationId xmlns:a16="http://schemas.microsoft.com/office/drawing/2014/main" id="{67B7B4C5-697C-1F96-A4C6-3E27337F6A3A}"/>
+              </a:ext>
+            </a:extLst>
+          </p:cNvPr>
+          <p:cNvSpPr>
+            <a:spLocks noGrp="1"/>
+          </p:cNvSpPr>
+          <p:nvPr>
+            <p:ph type="dt" sz="half" idx="10"/>
+          </p:nvPr>
+        </p:nvSpPr>
+        <p:spPr/>
+        <p:txBody>
+          <a:bodyPr/>
+          <a:lstStyle/>
+          <a:p>
+            <a:fld id="{8427D8FB-80AB-4B65-A20D-AFAA152C1E96}" type="datetimeFigureOut">
+              <a:rPr lang="en-US" smtClean="0"/>
+              <a:t>7/3/25</a:t>
+            </a:fld>
+            <a:endParaRPr lang="en-US"/>
+          </a:p>
+        </p:txBody>
+      </p:sp>
+      <p:sp>
+        <p:nvSpPr>
+          <p:cNvPr id="5" name="Footer Placeholder 4">
+            <a:extLst>
+              <a:ext uri="{FF2B5EF4-FFF2-40B4-BE49-F238E27FC236}">
+                <a16:creationId xmlns:a16="http://schemas.microsoft.com/office/drawing/2014/main" id="{EA623E41-A939-B6D9-2140-6DECEF8EA3C8}"/>
+              </a:ext>
+            </a:extLst>
+          </p:cNvPr>
+          <p:cNvSpPr>
+            <a:spLocks noGrp="1"/>
+          </p:cNvSpPr>
+          <p:nvPr>
+            <p:ph type="ftr" sz="quarter" idx="11"/>
+          </p:nvPr>
+        </p:nvSpPr>
+        <p:spPr/>
+        <p:txBody>
+          <a:bodyPr/>
+          <a:lstStyle/>
+          <a:p>
+            <a:endParaRPr lang="en-US"/>
+          </a:p>
+        </p:txBody>
+      </p:sp>
+      <p:sp>
+        <p:nvSpPr>
+          <p:cNvPr id="6" name="Slide Number Placeholder 5">
+            <a:extLst>
+              <a:ext uri="{FF2B5EF4-FFF2-40B4-BE49-F238E27FC236}">
+                <a16:creationId xmlns:a16="http://schemas.microsoft.com/office/drawing/2014/main" id="{9342ED73-DF3F-83F8-8E1E-022EC73058FA}"/>
+              </a:ext>
+            </a:extLst>
+          </p:cNvPr>
+          <p:cNvSpPr>
+            <a:spLocks noGrp="1"/>
+          </p:cNvSpPr>
+          <p:nvPr>
+            <p:ph type="sldNum" sz="quarter" idx="12"/>
+          </p:nvPr>
+        </p:nvSpPr>
+        <p:spPr/>
+        <p:txBody>
+          <a:bodyPr/>
+          <a:lstStyle/>
+          <a:p>
+            <a:fld id="{282CF145-C1F5-4F0A-9E2D-FC4643FE6C56}" type="slidenum">
+              <a:rPr lang="en-US" smtClean="0"/>
+              <a:t>‹#›</a:t>
+            </a:fld>
+            <a:endParaRPr lang="en-US"/>
+          </a:p>
+        </p:txBody>
+      </p:sp>
+    </p:spTree>
+  </p:cSld>
+  <p:clrMapOvr>
+    <a:masterClrMapping/>
+  </p:clrMapOvr>
+</p:sldLayout>
+</file>
+
 <file path=ppt/slideLayouts/slideLayout8.xml><?xml version="1.0" encoding="utf-8"?>
 <p:sldLayout xmlns:a="http://schemas.openxmlformats.org/drawingml/2006/main" xmlns:r="http://schemas.openxmlformats.org/officeDocument/2006/relationships" xmlns:p="http://schemas.openxmlformats.org/presentationml/2006/main" type="objTx" preserve="1">
   <p:cSld name="Content with Caption">
@@ -4029,6 +5157,1571 @@
     </p:otherStyle>
   </p:txStyles>
 </p:sldMaster>
+</file>
+
+<file path=ppt/slides/slide1.xml><?xml version="1.0" encoding="utf-8"?>
+<p:sld xmlns:a="http://schemas.openxmlformats.org/drawingml/2006/main" xmlns:r="http://schemas.openxmlformats.org/officeDocument/2006/relationships" xmlns:p="http://schemas.openxmlformats.org/presentationml/2006/main">
+  <p:cSld>
+    <p:spTree>
+      <p:nvGrpSpPr>
+        <p:cNvPr id="1" name=""/>
+        <p:cNvGrpSpPr/>
+        <p:nvPr/>
+      </p:nvGrpSpPr>
+      <p:grpSpPr>
+        <a:xfrm>
+          <a:off x="0" y="0"/>
+          <a:ext cx="0" cy="0"/>
+          <a:chOff x="0" y="0"/>
+          <a:chExt cx="0" cy="0"/>
+        </a:xfrm>
+      </p:grpSpPr>
+      <p:sp>
+        <p:nvSpPr>
+          <p:cNvPr id="2" name="Title 1">
+            <a:extLst>
+              <a:ext uri="{FF2B5EF4-FFF2-40B4-BE49-F238E27FC236}">
+                <a16:creationId xmlns:a16="http://schemas.microsoft.com/office/drawing/2014/main" id="{C367CC9B-300A-1BCE-3CB6-5C2268A53890}"/>
+              </a:ext>
+            </a:extLst>
+          </p:cNvPr>
+          <p:cNvSpPr>
+            <a:spLocks noGrp="1"/>
+          </p:cNvSpPr>
+          <p:nvPr>
+            <p:ph type="ctrTitle"/>
+          </p:nvPr>
+        </p:nvSpPr>
+        <p:spPr/>
+        <p:txBody>
+          <a:bodyPr/>
+          <a:lstStyle/>
+          <a:p>
+            <a:r>
+              <a:rPr lang="en-US" dirty="0">
+                <a:latin typeface="Calibri" panose="020F0502020204030204" pitchFamily="34" charset="0"/>
+                <a:ea typeface="Calibri" panose="020F0502020204030204" pitchFamily="34" charset="0"/>
+                <a:cs typeface="Calibri" panose="020F0502020204030204" pitchFamily="34" charset="0"/>
+              </a:rPr>
+              <a:t>Hello page</a:t>
+            </a:r>
+          </a:p>
+        </p:txBody>
+      </p:sp>
+      <p:sp>
+        <p:nvSpPr>
+          <p:cNvPr id="3" name="Subtitle 2">
+            <a:extLst>
+              <a:ext uri="{FF2B5EF4-FFF2-40B4-BE49-F238E27FC236}">
+                <a16:creationId xmlns:a16="http://schemas.microsoft.com/office/drawing/2014/main" id="{B0CF626D-06FB-41B3-324D-9476347FFEE3}"/>
+              </a:ext>
+            </a:extLst>
+          </p:cNvPr>
+          <p:cNvSpPr>
+            <a:spLocks noGrp="1"/>
+          </p:cNvSpPr>
+          <p:nvPr>
+            <p:ph type="subTitle" idx="1"/>
+          </p:nvPr>
+        </p:nvSpPr>
+        <p:spPr/>
+        <p:txBody>
+          <a:bodyPr/>
+          <a:lstStyle/>
+          <a:p>
+            <a:r>
+              <a:rPr lang="en-US" dirty="0">
+                <a:latin typeface="Calibri" panose="020F0502020204030204" pitchFamily="34" charset="0"/>
+                <a:ea typeface="Calibri" panose="020F0502020204030204" pitchFamily="34" charset="0"/>
+                <a:cs typeface="Calibri" panose="020F0502020204030204" pitchFamily="34" charset="0"/>
+              </a:rPr>
+              <a:t>{{ now | MMM dd, YYYY }}</a:t>
+            </a:r>
+          </a:p>
+        </p:txBody>
+      </p:sp>
+    </p:spTree>
+    <p:extLst>
+      <p:ext uri="{BB962C8B-B14F-4D97-AF65-F5344CB8AC3E}">
+        <p14:creationId xmlns:p14="http://schemas.microsoft.com/office/powerpoint/2010/main" val="2973638805"/>
+      </p:ext>
+    </p:extLst>
+  </p:cSld>
+  <p:clrMapOvr>
+    <a:masterClrMapping/>
+  </p:clrMapOvr>
+</p:sld>
+</file>
+
+<file path=ppt/slides/slide2.xml><?xml version="1.0" encoding="utf-8"?>
+<p:sld xmlns:a="http://schemas.openxmlformats.org/drawingml/2006/main" xmlns:r="http://schemas.openxmlformats.org/officeDocument/2006/relationships" xmlns:p="http://schemas.openxmlformats.org/presentationml/2006/main">
+  <p:cSld>
+    <p:spTree>
+      <p:nvGrpSpPr>
+        <p:cNvPr id="1" name=""/>
+        <p:cNvGrpSpPr/>
+        <p:nvPr/>
+      </p:nvGrpSpPr>
+      <p:grpSpPr>
+        <a:xfrm>
+          <a:off x="0" y="0"/>
+          <a:ext cx="0" cy="0"/>
+          <a:chOff x="0" y="0"/>
+          <a:chExt cx="0" cy="0"/>
+        </a:xfrm>
+      </p:grpSpPr>
+      <p:sp>
+        <p:nvSpPr>
+          <p:cNvPr id="2" name="Title 1">
+            <a:extLst>
+              <a:ext uri="{FF2B5EF4-FFF2-40B4-BE49-F238E27FC236}">
+                <a16:creationId xmlns:a16="http://schemas.microsoft.com/office/drawing/2014/main" id="{607B561A-95F0-2DA0-9E38-B0FAE20280F5}"/>
+              </a:ext>
+            </a:extLst>
+          </p:cNvPr>
+          <p:cNvSpPr>
+            <a:spLocks noGrp="1"/>
+          </p:cNvSpPr>
+          <p:nvPr>
+            <p:ph type="title"/>
+          </p:nvPr>
+        </p:nvSpPr>
+        <p:spPr/>
+        <p:txBody>
+          <a:bodyPr/>
+          <a:lstStyle/>
+          <a:p>
+            <a:r>
+              <a:rPr lang="en-US" dirty="0">
+                <a:latin typeface="Calibri" panose="020F0502020204030204" pitchFamily="34" charset="0"/>
+                <a:ea typeface="Calibri" panose="020F0502020204030204" pitchFamily="34" charset="0"/>
+                <a:cs typeface="Calibri" panose="020F0502020204030204" pitchFamily="34" charset="0"/>
+              </a:rPr>
+              <a:t>Slide title</a:t>
+            </a:r>
+          </a:p>
+        </p:txBody>
+      </p:sp>
+      <p:sp>
+        <p:nvSpPr>
+          <p:cNvPr id="3" name="Content Placeholder 2">
+            <a:extLst>
+              <a:ext uri="{FF2B5EF4-FFF2-40B4-BE49-F238E27FC236}">
+                <a16:creationId xmlns:a16="http://schemas.microsoft.com/office/drawing/2014/main" id="{17730361-BB69-9E0F-41A5-F3BDED1B1383}"/>
+              </a:ext>
+            </a:extLst>
+          </p:cNvPr>
+          <p:cNvSpPr>
+            <a:spLocks noGrp="1"/>
+          </p:cNvSpPr>
+          <p:nvPr>
+            <p:ph idx="1"/>
+          </p:nvPr>
+        </p:nvSpPr>
+        <p:spPr/>
+        <p:txBody>
+          <a:bodyPr>
+            <a:normAutofit/>
+          </a:bodyPr>
+          <a:lstStyle/>
+          <a:p>
+            <a:r>
+              <a:rPr lang="en-US" dirty="0">
+                <a:latin typeface="Calibri" panose="020F0502020204030204" pitchFamily="34" charset="0"/>
+                <a:ea typeface="Calibri" panose="020F0502020204030204" pitchFamily="34" charset="0"/>
+                <a:cs typeface="Calibri" panose="020F0502020204030204" pitchFamily="34" charset="0"/>
+              </a:rPr>
+              <a:t>My name is {{user.name}}</a:t>
+            </a:r>
+          </a:p>
+          <a:p>
+            <a:r>
+              <a:rPr lang="en-US" dirty="0">
+                <a:latin typeface="Calibri" panose="020F0502020204030204" pitchFamily="34" charset="0"/>
+                <a:ea typeface="Calibri" panose="020F0502020204030204" pitchFamily="34" charset="0"/>
+                <a:cs typeface="Calibri" panose="020F0502020204030204" pitchFamily="34" charset="0"/>
+              </a:rPr>
+              <a:t>Date is {{ now | MMMM dd, YYYY }}</a:t>
+            </a:r>
+          </a:p>
+          <a:p>
+            <a:r>
+              <a:rPr lang="en-US" dirty="0">
+                <a:latin typeface="Calibri" panose="020F0502020204030204" pitchFamily="34" charset="0"/>
+                <a:ea typeface="Calibri" panose="020F0502020204030204" pitchFamily="34" charset="0"/>
+                <a:cs typeface="Calibri" panose="020F0502020204030204" pitchFamily="34" charset="0"/>
+              </a:rPr>
+              <a:t>{{ </a:t>
+            </a:r>
+            <a:r>
+              <a:rPr lang="en-US" dirty="0" err="1">
+                <a:latin typeface="Calibri" panose="020F0502020204030204" pitchFamily="34" charset="0"/>
+                <a:ea typeface="Calibri" panose="020F0502020204030204" pitchFamily="34" charset="0"/>
+                <a:cs typeface="Calibri" panose="020F0502020204030204" pitchFamily="34" charset="0"/>
+              </a:rPr>
+              <a:t>program.users.email</a:t>
+            </a:r>
+            <a:r>
+              <a:rPr lang="en-US" dirty="0">
+                <a:latin typeface="Calibri" panose="020F0502020204030204" pitchFamily="34" charset="0"/>
+                <a:ea typeface="Calibri" panose="020F0502020204030204" pitchFamily="34" charset="0"/>
+                <a:cs typeface="Calibri" panose="020F0502020204030204" pitchFamily="34" charset="0"/>
+              </a:rPr>
+              <a:t> }}</a:t>
+            </a:r>
+          </a:p>
+          <a:p>
+            <a:r>
+              <a:rPr lang="en-US" dirty="0">
+                <a:latin typeface="Calibri" panose="020F0502020204030204" pitchFamily="34" charset="0"/>
+                <a:ea typeface="Calibri" panose="020F0502020204030204" pitchFamily="34" charset="0"/>
+                <a:cs typeface="Calibri" panose="020F0502020204030204" pitchFamily="34" charset="0"/>
+              </a:rPr>
+              <a:t>First user: {{ program.users.0.email }}</a:t>
+            </a:r>
+          </a:p>
+          <a:p>
+            <a:r>
+              <a:rPr lang="en-US" dirty="0">
+                <a:latin typeface="Calibri" panose="020F0502020204030204" pitchFamily="34" charset="0"/>
+                <a:ea typeface="Calibri" panose="020F0502020204030204" pitchFamily="34" charset="0"/>
+                <a:cs typeface="Calibri" panose="020F0502020204030204" pitchFamily="34" charset="0"/>
+              </a:rPr>
+              <a:t>First user </a:t>
+            </a:r>
+            <a:r>
+              <a:rPr lang="en-US" dirty="0" err="1">
+                <a:latin typeface="Calibri" panose="020F0502020204030204" pitchFamily="34" charset="0"/>
+                <a:ea typeface="Calibri" panose="020F0502020204030204" pitchFamily="34" charset="0"/>
+                <a:cs typeface="Calibri" panose="020F0502020204030204" pitchFamily="34" charset="0"/>
+              </a:rPr>
+              <a:t>func</a:t>
+            </a:r>
+            <a:r>
+              <a:rPr lang="en-US" dirty="0">
+                <a:latin typeface="Calibri" panose="020F0502020204030204" pitchFamily="34" charset="0"/>
+                <a:ea typeface="Calibri" panose="020F0502020204030204" pitchFamily="34" charset="0"/>
+                <a:cs typeface="Calibri" panose="020F0502020204030204" pitchFamily="34" charset="0"/>
+              </a:rPr>
+              <a:t>: {{ program.users.0.get_some_dict().key }}</a:t>
+            </a:r>
+          </a:p>
+          <a:p>
+            <a:r>
+              <a:rPr lang="en-US" dirty="0">
+                <a:latin typeface="Calibri" panose="020F0502020204030204" pitchFamily="34" charset="0"/>
+                <a:ea typeface="Calibri" panose="020F0502020204030204" pitchFamily="34" charset="0"/>
+                <a:cs typeface="Calibri" panose="020F0502020204030204" pitchFamily="34" charset="0"/>
+              </a:rPr>
+              <a:t>{{ now | MMMM dd, YYYY }}</a:t>
+            </a:r>
+          </a:p>
+          <a:p>
+            <a:r>
+              <a:rPr lang="en-US" dirty="0">
+                <a:latin typeface="Calibri" panose="020F0502020204030204" pitchFamily="34" charset="0"/>
+                <a:ea typeface="Calibri" panose="020F0502020204030204" pitchFamily="34" charset="0"/>
+                <a:cs typeface="Calibri" panose="020F0502020204030204" pitchFamily="34" charset="0"/>
+              </a:rPr>
+              <a:t>Cohort name: {{ user.cohort.name }}</a:t>
+            </a:r>
+          </a:p>
+        </p:txBody>
+      </p:sp>
+    </p:spTree>
+    <p:extLst>
+      <p:ext uri="{BB962C8B-B14F-4D97-AF65-F5344CB8AC3E}">
+        <p14:creationId xmlns:p14="http://schemas.microsoft.com/office/powerpoint/2010/main" val="635037372"/>
+      </p:ext>
+    </p:extLst>
+  </p:cSld>
+  <p:clrMapOvr>
+    <a:masterClrMapping/>
+  </p:clrMapOvr>
+</p:sld>
+</file>
+
+<file path=ppt/slides/slide3.xml><?xml version="1.0" encoding="utf-8"?>
+<p:sld xmlns:a="http://schemas.openxmlformats.org/drawingml/2006/main" xmlns:r="http://schemas.openxmlformats.org/officeDocument/2006/relationships" xmlns:p="http://schemas.openxmlformats.org/presentationml/2006/main">
+  <p:cSld>
+    <p:spTree>
+      <p:nvGrpSpPr>
+        <p:cNvPr id="1" name="">
+          <a:extLst>
+            <a:ext uri="{FF2B5EF4-FFF2-40B4-BE49-F238E27FC236}">
+              <a16:creationId xmlns:a16="http://schemas.microsoft.com/office/drawing/2014/main" id="{BC77F8A8-EFF0-39DF-860F-96B636AC2584}"/>
+            </a:ext>
+          </a:extLst>
+        </p:cNvPr>
+        <p:cNvGrpSpPr/>
+        <p:nvPr/>
+      </p:nvGrpSpPr>
+      <p:grpSpPr>
+        <a:xfrm>
+          <a:off x="0" y="0"/>
+          <a:ext cx="0" cy="0"/>
+          <a:chOff x="0" y="0"/>
+          <a:chExt cx="0" cy="0"/>
+        </a:xfrm>
+      </p:grpSpPr>
+      <p:sp>
+        <p:nvSpPr>
+          <p:cNvPr id="2" name="Title 1">
+            <a:extLst>
+              <a:ext uri="{FF2B5EF4-FFF2-40B4-BE49-F238E27FC236}">
+                <a16:creationId xmlns:a16="http://schemas.microsoft.com/office/drawing/2014/main" id="{98824CB0-9E15-4BED-742C-116BC8C367A8}"/>
+              </a:ext>
+            </a:extLst>
+          </p:cNvPr>
+          <p:cNvSpPr>
+            <a:spLocks noGrp="1"/>
+          </p:cNvSpPr>
+          <p:nvPr>
+            <p:ph type="title"/>
+          </p:nvPr>
+        </p:nvSpPr>
+        <p:spPr/>
+        <p:txBody>
+          <a:bodyPr/>
+          <a:lstStyle/>
+          <a:p>
+            <a:r>
+              <a:rPr lang="en-US" dirty="0">
+                <a:latin typeface="Calibri" panose="020F0502020204030204" pitchFamily="34" charset="0"/>
+                <a:ea typeface="Calibri" panose="020F0502020204030204" pitchFamily="34" charset="0"/>
+                <a:cs typeface="Calibri" panose="020F0502020204030204" pitchFamily="34" charset="0"/>
+              </a:rPr>
+              <a:t>Slide title</a:t>
+            </a:r>
+          </a:p>
+        </p:txBody>
+      </p:sp>
+      <p:sp>
+        <p:nvSpPr>
+          <p:cNvPr id="3" name="Content Placeholder 2">
+            <a:extLst>
+              <a:ext uri="{FF2B5EF4-FFF2-40B4-BE49-F238E27FC236}">
+                <a16:creationId xmlns:a16="http://schemas.microsoft.com/office/drawing/2014/main" id="{055040EB-0472-7DE8-1D58-D32423C16B33}"/>
+              </a:ext>
+            </a:extLst>
+          </p:cNvPr>
+          <p:cNvSpPr>
+            <a:spLocks noGrp="1"/>
+          </p:cNvSpPr>
+          <p:nvPr>
+            <p:ph idx="1"/>
+          </p:nvPr>
+        </p:nvSpPr>
+        <p:spPr/>
+        <p:txBody>
+          <a:bodyPr>
+            <a:normAutofit/>
+          </a:bodyPr>
+          <a:lstStyle/>
+          <a:p>
+            <a:r>
+              <a:rPr lang="en-US" dirty="0">
+                <a:latin typeface="Calibri" panose="020F0502020204030204" pitchFamily="34" charset="0"/>
+                <a:ea typeface="Calibri" panose="020F0502020204030204" pitchFamily="34" charset="0"/>
+                <a:cs typeface="Calibri" panose="020F0502020204030204" pitchFamily="34" charset="0"/>
+              </a:rPr>
+              <a:t>My name is {{user.name}}</a:t>
+            </a:r>
+          </a:p>
+          <a:p>
+            <a:r>
+              <a:rPr lang="en-US" dirty="0">
+                <a:latin typeface="Calibri" panose="020F0502020204030204" pitchFamily="34" charset="0"/>
+                <a:ea typeface="Calibri" panose="020F0502020204030204" pitchFamily="34" charset="0"/>
+                <a:cs typeface="Calibri" panose="020F0502020204030204" pitchFamily="34" charset="0"/>
+              </a:rPr>
+              <a:t>Date is {{ now | MMMM dd, YYYY }}</a:t>
+            </a:r>
+          </a:p>
+          <a:p>
+            <a:r>
+              <a:rPr lang="en-US" dirty="0">
+                <a:latin typeface="Calibri" panose="020F0502020204030204" pitchFamily="34" charset="0"/>
+                <a:ea typeface="Calibri" panose="020F0502020204030204" pitchFamily="34" charset="0"/>
+                <a:cs typeface="Calibri" panose="020F0502020204030204" pitchFamily="34" charset="0"/>
+              </a:rPr>
+              <a:t>Active program user email: {{ </a:t>
+            </a:r>
+            <a:r>
+              <a:rPr lang="en-US" dirty="0" err="1">
+                <a:latin typeface="Calibri" panose="020F0502020204030204" pitchFamily="34" charset="0"/>
+                <a:ea typeface="Calibri" panose="020F0502020204030204" pitchFamily="34" charset="0"/>
+                <a:cs typeface="Calibri" panose="020F0502020204030204" pitchFamily="34" charset="0"/>
+              </a:rPr>
+              <a:t>program.users</a:t>
+            </a:r>
+            <a:r>
+              <a:rPr lang="en-US" dirty="0">
+                <a:latin typeface="Calibri" panose="020F0502020204030204" pitchFamily="34" charset="0"/>
+                <a:ea typeface="Calibri" panose="020F0502020204030204" pitchFamily="34" charset="0"/>
+                <a:cs typeface="Calibri" panose="020F0502020204030204" pitchFamily="34" charset="0"/>
+              </a:rPr>
+              <a:t>[</a:t>
+            </a:r>
+            <a:r>
+              <a:rPr lang="en-US" dirty="0" err="1">
+                <a:latin typeface="Calibri" panose="020F0502020204030204" pitchFamily="34" charset="0"/>
+                <a:ea typeface="Calibri" panose="020F0502020204030204" pitchFamily="34" charset="0"/>
+                <a:cs typeface="Calibri" panose="020F0502020204030204" pitchFamily="34" charset="0"/>
+              </a:rPr>
+              <a:t>is_active</a:t>
+            </a:r>
+            <a:r>
+              <a:rPr lang="en-US" dirty="0">
+                <a:latin typeface="Calibri" panose="020F0502020204030204" pitchFamily="34" charset="0"/>
+                <a:ea typeface="Calibri" panose="020F0502020204030204" pitchFamily="34" charset="0"/>
+                <a:cs typeface="Calibri" panose="020F0502020204030204" pitchFamily="34" charset="0"/>
+              </a:rPr>
+              <a:t>=True].email }}</a:t>
+            </a:r>
+          </a:p>
+          <a:p>
+            <a:r>
+              <a:rPr lang="en-US" dirty="0">
+                <a:latin typeface="Calibri" panose="020F0502020204030204" pitchFamily="34" charset="0"/>
+                <a:ea typeface="Calibri" panose="020F0502020204030204" pitchFamily="34" charset="0"/>
+                <a:cs typeface="Calibri" panose="020F0502020204030204" pitchFamily="34" charset="0"/>
+              </a:rPr>
+              <a:t>Active program user email: </a:t>
+            </a:r>
+            <a:r>
+              <a:rPr lang="en-US" b="1" dirty="0">
+                <a:latin typeface="Calibri" panose="020F0502020204030204" pitchFamily="34" charset="0"/>
+                <a:ea typeface="Calibri" panose="020F0502020204030204" pitchFamily="34" charset="0"/>
+                <a:cs typeface="Calibri" panose="020F0502020204030204" pitchFamily="34" charset="0"/>
+              </a:rPr>
+              <a:t>{{ </a:t>
+            </a:r>
+            <a:r>
+              <a:rPr lang="en-US" b="1" dirty="0" err="1">
+                <a:latin typeface="Calibri" panose="020F0502020204030204" pitchFamily="34" charset="0"/>
+                <a:ea typeface="Calibri" panose="020F0502020204030204" pitchFamily="34" charset="0"/>
+                <a:cs typeface="Calibri" panose="020F0502020204030204" pitchFamily="34" charset="0"/>
+              </a:rPr>
+              <a:t>program.users</a:t>
+            </a:r>
+            <a:r>
+              <a:rPr lang="en-US" b="1" dirty="0">
+                <a:latin typeface="Calibri" panose="020F0502020204030204" pitchFamily="34" charset="0"/>
+                <a:ea typeface="Calibri" panose="020F0502020204030204" pitchFamily="34" charset="0"/>
+                <a:cs typeface="Calibri" panose="020F0502020204030204" pitchFamily="34" charset="0"/>
+              </a:rPr>
+              <a:t>[email=</a:t>
+            </a:r>
+            <a:r>
+              <a:rPr lang="en-US" b="1" dirty="0" err="1">
+                <a:latin typeface="Calibri" panose="020F0502020204030204" pitchFamily="34" charset="0"/>
+                <a:ea typeface="Calibri" panose="020F0502020204030204" pitchFamily="34" charset="0"/>
+                <a:cs typeface="Calibri" panose="020F0502020204030204" pitchFamily="34" charset="0"/>
+              </a:rPr>
+              <a:t>bob@test.com,is_active</a:t>
+            </a:r>
+            <a:r>
+              <a:rPr lang="en-US" b="1" dirty="0">
+                <a:latin typeface="Calibri" panose="020F0502020204030204" pitchFamily="34" charset="0"/>
+                <a:ea typeface="Calibri" panose="020F0502020204030204" pitchFamily="34" charset="0"/>
+                <a:cs typeface="Calibri" panose="020F0502020204030204" pitchFamily="34" charset="0"/>
+              </a:rPr>
+              <a:t>=True].email }}</a:t>
+            </a:r>
+          </a:p>
+          <a:p>
+            <a:r>
+              <a:rPr lang="en-US" dirty="0">
+                <a:latin typeface="Calibri" panose="020F0502020204030204" pitchFamily="34" charset="0"/>
+                <a:ea typeface="Calibri" panose="020F0502020204030204" pitchFamily="34" charset="0"/>
+                <a:cs typeface="Calibri" panose="020F0502020204030204" pitchFamily="34" charset="0"/>
+              </a:rPr>
+              <a:t>All users emails: {{ </a:t>
+            </a:r>
+            <a:r>
+              <a:rPr lang="en-US" dirty="0" err="1">
+                <a:latin typeface="Calibri" panose="020F0502020204030204" pitchFamily="34" charset="0"/>
+                <a:ea typeface="Calibri" panose="020F0502020204030204" pitchFamily="34" charset="0"/>
+                <a:cs typeface="Calibri" panose="020F0502020204030204" pitchFamily="34" charset="0"/>
+              </a:rPr>
+              <a:t>program.users.email</a:t>
+            </a:r>
+            <a:r>
+              <a:rPr lang="en-US" dirty="0">
+                <a:latin typeface="Calibri" panose="020F0502020204030204" pitchFamily="34" charset="0"/>
+                <a:ea typeface="Calibri" panose="020F0502020204030204" pitchFamily="34" charset="0"/>
+                <a:cs typeface="Calibri" panose="020F0502020204030204" pitchFamily="34" charset="0"/>
+              </a:rPr>
+              <a:t> }}</a:t>
+            </a:r>
+          </a:p>
+          <a:p>
+            <a:r>
+              <a:rPr lang="en-US" dirty="0">
+                <a:latin typeface="Calibri" panose="020F0502020204030204" pitchFamily="34" charset="0"/>
+                <a:ea typeface="Calibri" panose="020F0502020204030204" pitchFamily="34" charset="0"/>
+                <a:cs typeface="Calibri" panose="020F0502020204030204" pitchFamily="34" charset="0"/>
+              </a:rPr>
+              <a:t>Cohort name: {{ user.cohort.name }}</a:t>
+            </a:r>
+          </a:p>
+        </p:txBody>
+      </p:sp>
+      <p:graphicFrame>
+        <p:nvGraphicFramePr>
+          <p:cNvPr id="4" name="Table 3">
+            <a:extLst>
+              <a:ext uri="{FF2B5EF4-FFF2-40B4-BE49-F238E27FC236}">
+                <a16:creationId xmlns:a16="http://schemas.microsoft.com/office/drawing/2014/main" id="{497DBF40-8862-A296-2E6B-7B5D4EAC0584}"/>
+              </a:ext>
+            </a:extLst>
+          </p:cNvPr>
+          <p:cNvGraphicFramePr>
+            <a:graphicFrameLocks noGrp="1"/>
+          </p:cNvGraphicFramePr>
+          <p:nvPr/>
+        </p:nvGraphicFramePr>
+        <p:xfrm>
+          <a:off x="1248229" y="5256040"/>
+          <a:ext cx="8127999" cy="741680"/>
+        </p:xfrm>
+        <a:graphic>
+          <a:graphicData uri="http://schemas.openxmlformats.org/drawingml/2006/table">
+            <a:tbl>
+              <a:tblPr firstRow="1" bandRow="1">
+                <a:tableStyleId>{5C22544A-7EE6-4342-B048-85BDC9FD1C3A}</a:tableStyleId>
+              </a:tblPr>
+              <a:tblGrid>
+                <a:gridCol w="2709333">
+                  <a:extLst>
+                    <a:ext uri="{9D8B030D-6E8A-4147-A177-3AD203B41FA5}">
+                      <a16:colId xmlns:a16="http://schemas.microsoft.com/office/drawing/2014/main" val="2037353830"/>
+                    </a:ext>
+                  </a:extLst>
+                </a:gridCol>
+                <a:gridCol w="2709333">
+                  <a:extLst>
+                    <a:ext uri="{9D8B030D-6E8A-4147-A177-3AD203B41FA5}">
+                      <a16:colId xmlns:a16="http://schemas.microsoft.com/office/drawing/2014/main" val="1602756099"/>
+                    </a:ext>
+                  </a:extLst>
+                </a:gridCol>
+                <a:gridCol w="2709333">
+                  <a:extLst>
+                    <a:ext uri="{9D8B030D-6E8A-4147-A177-3AD203B41FA5}">
+                      <a16:colId xmlns:a16="http://schemas.microsoft.com/office/drawing/2014/main" val="1696144579"/>
+                    </a:ext>
+                  </a:extLst>
+                </a:gridCol>
+              </a:tblGrid>
+              <a:tr h="370840">
+                <a:tc>
+                  <a:txBody>
+                    <a:bodyPr/>
+                    <a:lstStyle/>
+                    <a:p>
+                      <a:r>
+                        <a:rPr lang="en-US" dirty="0"/>
+                        <a:t>Test table</a:t>
+                      </a:r>
+                    </a:p>
+                  </a:txBody>
+                  <a:tcPr/>
+                </a:tc>
+                <a:tc>
+                  <a:txBody>
+                    <a:bodyPr/>
+                    <a:lstStyle/>
+                    <a:p>
+                      <a:r>
+                        <a:rPr lang="en-US" dirty="0"/>
+                        <a:t>Emails</a:t>
+                      </a:r>
+                    </a:p>
+                  </a:txBody>
+                  <a:tcPr/>
+                </a:tc>
+                <a:tc>
+                  <a:txBody>
+                    <a:bodyPr/>
+                    <a:lstStyle/>
+                    <a:p>
+                      <a:r>
+                        <a:rPr lang="en-US" dirty="0"/>
+                        <a:t>{{ user.cohort.name }}</a:t>
+                      </a:r>
+                    </a:p>
+                  </a:txBody>
+                  <a:tcPr/>
+                </a:tc>
+                <a:extLst>
+                  <a:ext uri="{0D108BD9-81ED-4DB2-BD59-A6C34878D82A}">
+                    <a16:rowId xmlns:a16="http://schemas.microsoft.com/office/drawing/2014/main" val="2653367512"/>
+                  </a:ext>
+                </a:extLst>
+              </a:tr>
+              <a:tr h="370840">
+                <a:tc>
+                  <a:txBody>
+                    <a:bodyPr/>
+                    <a:lstStyle/>
+                    <a:p>
+                      <a:endParaRPr lang="en-US" dirty="0"/>
+                    </a:p>
+                  </a:txBody>
+                  <a:tcPr/>
+                </a:tc>
+                <a:tc>
+                  <a:txBody>
+                    <a:bodyPr/>
+                    <a:lstStyle/>
+                    <a:p>
+                      <a:r>
+                        <a:rPr lang="en-US" dirty="0"/>
+                        <a:t>{{ </a:t>
+                      </a:r>
+                      <a:r>
+                        <a:rPr lang="en-US" dirty="0" err="1"/>
+                        <a:t>program.users.email</a:t>
+                      </a:r>
+                      <a:r>
+                        <a:rPr lang="en-US" dirty="0"/>
+                        <a:t> }}</a:t>
+                      </a:r>
+                    </a:p>
+                  </a:txBody>
+                  <a:tcPr/>
+                </a:tc>
+                <a:tc>
+                  <a:txBody>
+                    <a:bodyPr/>
+                    <a:lstStyle/>
+                    <a:p>
+                      <a:endParaRPr lang="en-US" dirty="0"/>
+                    </a:p>
+                  </a:txBody>
+                  <a:tcPr/>
+                </a:tc>
+                <a:extLst>
+                  <a:ext uri="{0D108BD9-81ED-4DB2-BD59-A6C34878D82A}">
+                    <a16:rowId xmlns:a16="http://schemas.microsoft.com/office/drawing/2014/main" val="1173098446"/>
+                  </a:ext>
+                </a:extLst>
+              </a:tr>
+            </a:tbl>
+          </a:graphicData>
+        </a:graphic>
+      </p:graphicFrame>
+    </p:spTree>
+    <p:extLst>
+      <p:ext uri="{BB962C8B-B14F-4D97-AF65-F5344CB8AC3E}">
+        <p14:creationId xmlns:p14="http://schemas.microsoft.com/office/powerpoint/2010/main" val="4269737172"/>
+      </p:ext>
+    </p:extLst>
+  </p:cSld>
+  <p:clrMapOvr>
+    <a:masterClrMapping/>
+  </p:clrMapOvr>
+</p:sld>
+</file>
+
+<file path=ppt/slides/slide4.xml><?xml version="1.0" encoding="utf-8"?>
+<p:sld xmlns:a="http://schemas.openxmlformats.org/drawingml/2006/main" xmlns:r="http://schemas.openxmlformats.org/officeDocument/2006/relationships" xmlns:p="http://schemas.openxmlformats.org/presentationml/2006/main">
+  <p:cSld>
+    <p:spTree>
+      <p:nvGrpSpPr>
+        <p:cNvPr id="1" name="">
+          <a:extLst>
+            <a:ext uri="{FF2B5EF4-FFF2-40B4-BE49-F238E27FC236}">
+              <a16:creationId xmlns:a16="http://schemas.microsoft.com/office/drawing/2014/main" id="{974ADF19-519C-2767-E677-C6575FD9808E}"/>
+            </a:ext>
+          </a:extLst>
+        </p:cNvPr>
+        <p:cNvGrpSpPr/>
+        <p:nvPr/>
+      </p:nvGrpSpPr>
+      <p:grpSpPr>
+        <a:xfrm>
+          <a:off x="0" y="0"/>
+          <a:ext cx="0" cy="0"/>
+          <a:chOff x="0" y="0"/>
+          <a:chExt cx="0" cy="0"/>
+        </a:xfrm>
+      </p:grpSpPr>
+      <p:sp>
+        <p:nvSpPr>
+          <p:cNvPr id="2" name="Title 1">
+            <a:extLst>
+              <a:ext uri="{FF2B5EF4-FFF2-40B4-BE49-F238E27FC236}">
+                <a16:creationId xmlns:a16="http://schemas.microsoft.com/office/drawing/2014/main" id="{4670D689-3296-CB63-D2DD-54C73FABCED3}"/>
+              </a:ext>
+            </a:extLst>
+          </p:cNvPr>
+          <p:cNvSpPr>
+            <a:spLocks noGrp="1"/>
+          </p:cNvSpPr>
+          <p:nvPr>
+            <p:ph type="title"/>
+          </p:nvPr>
+        </p:nvSpPr>
+        <p:spPr/>
+        <p:txBody>
+          <a:bodyPr/>
+          <a:lstStyle/>
+          <a:p>
+            <a:r>
+              <a:rPr lang="en-US" dirty="0">
+                <a:latin typeface="Calibri" panose="020F0502020204030204" pitchFamily="34" charset="0"/>
+                <a:ea typeface="Calibri" panose="020F0502020204030204" pitchFamily="34" charset="0"/>
+                <a:cs typeface="Calibri" panose="020F0502020204030204" pitchFamily="34" charset="0"/>
+              </a:rPr>
+              <a:t>Slide title</a:t>
+            </a:r>
+          </a:p>
+        </p:txBody>
+      </p:sp>
+      <p:graphicFrame>
+        <p:nvGraphicFramePr>
+          <p:cNvPr id="7" name="Content Placeholder 6">
+            <a:extLst>
+              <a:ext uri="{FF2B5EF4-FFF2-40B4-BE49-F238E27FC236}">
+                <a16:creationId xmlns:a16="http://schemas.microsoft.com/office/drawing/2014/main" id="{37FDEE5C-AF65-3FC3-1258-D71A13C03166}"/>
+              </a:ext>
+            </a:extLst>
+          </p:cNvPr>
+          <p:cNvGraphicFramePr>
+            <a:graphicFrameLocks noGrp="1"/>
+          </p:cNvGraphicFramePr>
+          <p:nvPr>
+            <p:ph idx="1"/>
+            <p:extLst>
+              <p:ext uri="{D42A27DB-BD31-4B8C-83A1-F6EECF244321}">
+                <p14:modId xmlns:p14="http://schemas.microsoft.com/office/powerpoint/2010/main" val="2305666004"/>
+              </p:ext>
+            </p:extLst>
+          </p:nvPr>
+        </p:nvGraphicFramePr>
+        <p:xfrm>
+          <a:off x="838200" y="1825625"/>
+          <a:ext cx="8127999" cy="741680"/>
+        </p:xfrm>
+        <a:graphic>
+          <a:graphicData uri="http://schemas.openxmlformats.org/drawingml/2006/table">
+            <a:tbl>
+              <a:tblPr firstRow="1" bandRow="1">
+                <a:tableStyleId>{5C22544A-7EE6-4342-B048-85BDC9FD1C3A}</a:tableStyleId>
+              </a:tblPr>
+              <a:tblGrid>
+                <a:gridCol w="2709333">
+                  <a:extLst>
+                    <a:ext uri="{9D8B030D-6E8A-4147-A177-3AD203B41FA5}">
+                      <a16:colId xmlns:a16="http://schemas.microsoft.com/office/drawing/2014/main" val="2037353830"/>
+                    </a:ext>
+                  </a:extLst>
+                </a:gridCol>
+                <a:gridCol w="2709333">
+                  <a:extLst>
+                    <a:ext uri="{9D8B030D-6E8A-4147-A177-3AD203B41FA5}">
+                      <a16:colId xmlns:a16="http://schemas.microsoft.com/office/drawing/2014/main" val="1602756099"/>
+                    </a:ext>
+                  </a:extLst>
+                </a:gridCol>
+                <a:gridCol w="2709333">
+                  <a:extLst>
+                    <a:ext uri="{9D8B030D-6E8A-4147-A177-3AD203B41FA5}">
+                      <a16:colId xmlns:a16="http://schemas.microsoft.com/office/drawing/2014/main" val="1696144579"/>
+                    </a:ext>
+                  </a:extLst>
+                </a:gridCol>
+              </a:tblGrid>
+              <a:tr h="370840">
+                <a:tc>
+                  <a:txBody>
+                    <a:bodyPr/>
+                    <a:lstStyle/>
+                    <a:p>
+                      <a:r>
+                        <a:rPr lang="en-US" dirty="0"/>
+                        <a:t>Test table</a:t>
+                      </a:r>
+                    </a:p>
+                  </a:txBody>
+                  <a:tcPr/>
+                </a:tc>
+                <a:tc>
+                  <a:txBody>
+                    <a:bodyPr/>
+                    <a:lstStyle/>
+                    <a:p>
+                      <a:r>
+                        <a:rPr lang="en-US" dirty="0"/>
+                        <a:t>Names</a:t>
+                      </a:r>
+                    </a:p>
+                  </a:txBody>
+                  <a:tcPr/>
+                </a:tc>
+                <a:tc>
+                  <a:txBody>
+                    <a:bodyPr/>
+                    <a:lstStyle/>
+                    <a:p>
+                      <a:r>
+                        <a:rPr lang="en-US" dirty="0"/>
+                        <a:t>Emails</a:t>
+                      </a:r>
+                    </a:p>
+                  </a:txBody>
+                  <a:tcPr/>
+                </a:tc>
+                <a:extLst>
+                  <a:ext uri="{0D108BD9-81ED-4DB2-BD59-A6C34878D82A}">
+                    <a16:rowId xmlns:a16="http://schemas.microsoft.com/office/drawing/2014/main" val="2653367512"/>
+                  </a:ext>
+                </a:extLst>
+              </a:tr>
+              <a:tr h="370840">
+                <a:tc>
+                  <a:txBody>
+                    <a:bodyPr/>
+                    <a:lstStyle/>
+                    <a:p>
+                      <a:endParaRPr lang="en-US" dirty="0"/>
+                    </a:p>
+                  </a:txBody>
+                  <a:tcPr/>
+                </a:tc>
+                <a:tc>
+                  <a:txBody>
+                    <a:bodyPr/>
+                    <a:lstStyle/>
+                    <a:p>
+                      <a:pPr marL="0" marR="0" lvl="0" indent="0" algn="l" defTabSz="914400" rtl="0" eaLnBrk="1" fontAlgn="auto" latinLnBrk="0" hangingPunct="1">
+                        <a:lnSpc>
+                          <a:spcPct val="100000"/>
+                        </a:lnSpc>
+                        <a:spcBef>
+                          <a:spcPts val="0"/>
+                        </a:spcBef>
+                        <a:spcAft>
+                          <a:spcPts val="0"/>
+                        </a:spcAft>
+                        <a:buClrTx/>
+                        <a:buSzTx/>
+                        <a:buFontTx/>
+                        <a:buNone/>
+                        <a:tabLst/>
+                        <a:defRPr/>
+                      </a:pPr>
+                      <a:r>
+                        <a:rPr lang="en-US" dirty="0"/>
+                        <a:t>{{ program.users.name }}</a:t>
+                      </a:r>
+                    </a:p>
+                  </a:txBody>
+                  <a:tcPr/>
+                </a:tc>
+                <a:tc>
+                  <a:txBody>
+                    <a:bodyPr/>
+                    <a:lstStyle/>
+                    <a:p>
+                      <a:pPr marL="0" marR="0" lvl="0" indent="0" algn="l" defTabSz="914400" rtl="0" eaLnBrk="1" fontAlgn="auto" latinLnBrk="0" hangingPunct="1">
+                        <a:lnSpc>
+                          <a:spcPct val="100000"/>
+                        </a:lnSpc>
+                        <a:spcBef>
+                          <a:spcPts val="0"/>
+                        </a:spcBef>
+                        <a:spcAft>
+                          <a:spcPts val="0"/>
+                        </a:spcAft>
+                        <a:buClrTx/>
+                        <a:buSzTx/>
+                        <a:buFontTx/>
+                        <a:buNone/>
+                        <a:tabLst/>
+                        <a:defRPr/>
+                      </a:pPr>
+                      <a:r>
+                        <a:rPr lang="en-US" dirty="0"/>
+                        <a:t>{{ </a:t>
+                      </a:r>
+                      <a:r>
+                        <a:rPr lang="en-US" dirty="0" err="1"/>
+                        <a:t>program.users.email</a:t>
+                      </a:r>
+                      <a:r>
+                        <a:rPr lang="en-US" dirty="0"/>
+                        <a:t> }}</a:t>
+                      </a:r>
+                    </a:p>
+                  </a:txBody>
+                  <a:tcPr/>
+                </a:tc>
+                <a:extLst>
+                  <a:ext uri="{0D108BD9-81ED-4DB2-BD59-A6C34878D82A}">
+                    <a16:rowId xmlns:a16="http://schemas.microsoft.com/office/drawing/2014/main" val="1173098446"/>
+                  </a:ext>
+                </a:extLst>
+              </a:tr>
+            </a:tbl>
+          </a:graphicData>
+        </a:graphic>
+      </p:graphicFrame>
+      <p:grpSp>
+        <p:nvGrpSpPr>
+          <p:cNvPr id="5" name="Group 4">
+            <a:extLst>
+              <a:ext uri="{FF2B5EF4-FFF2-40B4-BE49-F238E27FC236}">
+                <a16:creationId xmlns:a16="http://schemas.microsoft.com/office/drawing/2014/main" id="{B618D57D-6577-4344-1C66-BCA707C5819B}"/>
+              </a:ext>
+            </a:extLst>
+          </p:cNvPr>
+          <p:cNvGrpSpPr/>
+          <p:nvPr/>
+        </p:nvGrpSpPr>
+        <p:grpSpPr>
+          <a:xfrm>
+            <a:off x="2246586" y="4290696"/>
+            <a:ext cx="6182710" cy="1602488"/>
+            <a:chOff x="2246586" y="4290696"/>
+            <a:chExt cx="6182710" cy="1602488"/>
+          </a:xfrm>
+        </p:grpSpPr>
+        <p:sp>
+          <p:nvSpPr>
+            <p:cNvPr id="3" name="Content Placeholder 2">
+              <a:extLst>
+                <a:ext uri="{FF2B5EF4-FFF2-40B4-BE49-F238E27FC236}">
+                  <a16:creationId xmlns:a16="http://schemas.microsoft.com/office/drawing/2014/main" id="{918846A4-96CC-7D0D-79BE-9ADBCE69A89C}"/>
+                </a:ext>
+              </a:extLst>
+            </p:cNvPr>
+            <p:cNvSpPr txBox="1">
+              <a:spLocks/>
+            </p:cNvSpPr>
+            <p:nvPr/>
+          </p:nvSpPr>
+          <p:spPr>
+            <a:xfrm>
+              <a:off x="2246586" y="4487918"/>
+              <a:ext cx="3113690" cy="1405266"/>
+            </a:xfrm>
+            <a:prstGeom prst="rect">
+              <a:avLst/>
+            </a:prstGeom>
+          </p:spPr>
+          <p:txBody>
+            <a:bodyPr vert="horz" lIns="91440" tIns="45720" rIns="91440" bIns="45720" rtlCol="0">
+              <a:normAutofit/>
+            </a:bodyPr>
+            <a:lstStyle>
+              <a:lvl1pPr marL="228600" indent="-228600" algn="l" defTabSz="914400" rtl="0" eaLnBrk="1" latinLnBrk="0" hangingPunct="1">
+                <a:lnSpc>
+                  <a:spcPct val="90000"/>
+                </a:lnSpc>
+                <a:spcBef>
+                  <a:spcPts val="1000"/>
+                </a:spcBef>
+                <a:buFont typeface="Arial" panose="020B0604020202020204" pitchFamily="34" charset="0"/>
+                <a:buChar char="•"/>
+                <a:defRPr sz="2800" kern="1200">
+                  <a:solidFill>
+                    <a:schemeClr val="tx1"/>
+                  </a:solidFill>
+                  <a:latin typeface="+mn-lt"/>
+                  <a:ea typeface="+mn-ea"/>
+                  <a:cs typeface="+mn-cs"/>
+                </a:defRPr>
+              </a:lvl1pPr>
+              <a:lvl2pPr marL="685800" indent="-228600" algn="l" defTabSz="914400" rtl="0" eaLnBrk="1" latinLnBrk="0" hangingPunct="1">
+                <a:lnSpc>
+                  <a:spcPct val="90000"/>
+                </a:lnSpc>
+                <a:spcBef>
+                  <a:spcPts val="500"/>
+                </a:spcBef>
+                <a:buFont typeface="Arial" panose="020B0604020202020204" pitchFamily="34" charset="0"/>
+                <a:buChar char="•"/>
+                <a:defRPr sz="2400" kern="1200">
+                  <a:solidFill>
+                    <a:schemeClr val="tx1"/>
+                  </a:solidFill>
+                  <a:latin typeface="+mn-lt"/>
+                  <a:ea typeface="+mn-ea"/>
+                  <a:cs typeface="+mn-cs"/>
+                </a:defRPr>
+              </a:lvl2pPr>
+              <a:lvl3pPr marL="1143000" indent="-228600" algn="l" defTabSz="914400" rtl="0" eaLnBrk="1" latinLnBrk="0" hangingPunct="1">
+                <a:lnSpc>
+                  <a:spcPct val="90000"/>
+                </a:lnSpc>
+                <a:spcBef>
+                  <a:spcPts val="500"/>
+                </a:spcBef>
+                <a:buFont typeface="Arial" panose="020B0604020202020204" pitchFamily="34" charset="0"/>
+                <a:buChar char="•"/>
+                <a:defRPr sz="2000" kern="1200">
+                  <a:solidFill>
+                    <a:schemeClr val="tx1"/>
+                  </a:solidFill>
+                  <a:latin typeface="+mn-lt"/>
+                  <a:ea typeface="+mn-ea"/>
+                  <a:cs typeface="+mn-cs"/>
+                </a:defRPr>
+              </a:lvl3pPr>
+              <a:lvl4pPr marL="1600200" indent="-228600" algn="l" defTabSz="914400" rtl="0" eaLnBrk="1" latinLnBrk="0" hangingPunct="1">
+                <a:lnSpc>
+                  <a:spcPct val="90000"/>
+                </a:lnSpc>
+                <a:spcBef>
+                  <a:spcPts val="500"/>
+                </a:spcBef>
+                <a:buFont typeface="Arial" panose="020B0604020202020204" pitchFamily="34" charset="0"/>
+                <a:buChar char="•"/>
+                <a:defRPr sz="1800" kern="1200">
+                  <a:solidFill>
+                    <a:schemeClr val="tx1"/>
+                  </a:solidFill>
+                  <a:latin typeface="+mn-lt"/>
+                  <a:ea typeface="+mn-ea"/>
+                  <a:cs typeface="+mn-cs"/>
+                </a:defRPr>
+              </a:lvl4pPr>
+              <a:lvl5pPr marL="2057400" indent="-228600" algn="l" defTabSz="914400" rtl="0" eaLnBrk="1" latinLnBrk="0" hangingPunct="1">
+                <a:lnSpc>
+                  <a:spcPct val="90000"/>
+                </a:lnSpc>
+                <a:spcBef>
+                  <a:spcPts val="500"/>
+                </a:spcBef>
+                <a:buFont typeface="Arial" panose="020B0604020202020204" pitchFamily="34" charset="0"/>
+                <a:buChar char="•"/>
+                <a:defRPr sz="1800" kern="1200">
+                  <a:solidFill>
+                    <a:schemeClr val="tx1"/>
+                  </a:solidFill>
+                  <a:latin typeface="+mn-lt"/>
+                  <a:ea typeface="+mn-ea"/>
+                  <a:cs typeface="+mn-cs"/>
+                </a:defRPr>
+              </a:lvl5pPr>
+              <a:lvl6pPr marL="2514600" indent="-228600" algn="l" defTabSz="914400" rtl="0" eaLnBrk="1" latinLnBrk="0" hangingPunct="1">
+                <a:lnSpc>
+                  <a:spcPct val="90000"/>
+                </a:lnSpc>
+                <a:spcBef>
+                  <a:spcPts val="500"/>
+                </a:spcBef>
+                <a:buFont typeface="Arial" panose="020B0604020202020204" pitchFamily="34" charset="0"/>
+                <a:buChar char="•"/>
+                <a:defRPr sz="1800" kern="1200">
+                  <a:solidFill>
+                    <a:schemeClr val="tx1"/>
+                  </a:solidFill>
+                  <a:latin typeface="+mn-lt"/>
+                  <a:ea typeface="+mn-ea"/>
+                  <a:cs typeface="+mn-cs"/>
+                </a:defRPr>
+              </a:lvl6pPr>
+              <a:lvl7pPr marL="2971800" indent="-228600" algn="l" defTabSz="914400" rtl="0" eaLnBrk="1" latinLnBrk="0" hangingPunct="1">
+                <a:lnSpc>
+                  <a:spcPct val="90000"/>
+                </a:lnSpc>
+                <a:spcBef>
+                  <a:spcPts val="500"/>
+                </a:spcBef>
+                <a:buFont typeface="Arial" panose="020B0604020202020204" pitchFamily="34" charset="0"/>
+                <a:buChar char="•"/>
+                <a:defRPr sz="1800" kern="1200">
+                  <a:solidFill>
+                    <a:schemeClr val="tx1"/>
+                  </a:solidFill>
+                  <a:latin typeface="+mn-lt"/>
+                  <a:ea typeface="+mn-ea"/>
+                  <a:cs typeface="+mn-cs"/>
+                </a:defRPr>
+              </a:lvl7pPr>
+              <a:lvl8pPr marL="3429000" indent="-228600" algn="l" defTabSz="914400" rtl="0" eaLnBrk="1" latinLnBrk="0" hangingPunct="1">
+                <a:lnSpc>
+                  <a:spcPct val="90000"/>
+                </a:lnSpc>
+                <a:spcBef>
+                  <a:spcPts val="500"/>
+                </a:spcBef>
+                <a:buFont typeface="Arial" panose="020B0604020202020204" pitchFamily="34" charset="0"/>
+                <a:buChar char="•"/>
+                <a:defRPr sz="1800" kern="1200">
+                  <a:solidFill>
+                    <a:schemeClr val="tx1"/>
+                  </a:solidFill>
+                  <a:latin typeface="+mn-lt"/>
+                  <a:ea typeface="+mn-ea"/>
+                  <a:cs typeface="+mn-cs"/>
+                </a:defRPr>
+              </a:lvl8pPr>
+              <a:lvl9pPr marL="3886200" indent="-228600" algn="l" defTabSz="914400" rtl="0" eaLnBrk="1" latinLnBrk="0" hangingPunct="1">
+                <a:lnSpc>
+                  <a:spcPct val="90000"/>
+                </a:lnSpc>
+                <a:spcBef>
+                  <a:spcPts val="500"/>
+                </a:spcBef>
+                <a:buFont typeface="Arial" panose="020B0604020202020204" pitchFamily="34" charset="0"/>
+                <a:buChar char="•"/>
+                <a:defRPr sz="1800" kern="1200">
+                  <a:solidFill>
+                    <a:schemeClr val="tx1"/>
+                  </a:solidFill>
+                  <a:latin typeface="+mn-lt"/>
+                  <a:ea typeface="+mn-ea"/>
+                  <a:cs typeface="+mn-cs"/>
+                </a:defRPr>
+              </a:lvl9pPr>
+            </a:lstStyle>
+            <a:p>
+              <a:r>
+                <a:rPr lang="en-US" dirty="0">
+                  <a:latin typeface="Calibri" panose="020F0502020204030204" pitchFamily="34" charset="0"/>
+                  <a:ea typeface="Calibri" panose="020F0502020204030204" pitchFamily="34" charset="0"/>
+                  <a:cs typeface="Calibri" panose="020F0502020204030204" pitchFamily="34" charset="0"/>
+                </a:rPr>
+                <a:t>Grouped 1: {{ </a:t>
+              </a:r>
+              <a:r>
+                <a:rPr lang="en-US" dirty="0" err="1">
+                  <a:latin typeface="Calibri" panose="020F0502020204030204" pitchFamily="34" charset="0"/>
+                  <a:ea typeface="Calibri" panose="020F0502020204030204" pitchFamily="34" charset="0"/>
+                  <a:cs typeface="Calibri" panose="020F0502020204030204" pitchFamily="34" charset="0"/>
+                </a:rPr>
+                <a:t>user.cohort.name</a:t>
+              </a:r>
+              <a:r>
+                <a:rPr lang="en-US" dirty="0">
+                  <a:latin typeface="Calibri" panose="020F0502020204030204" pitchFamily="34" charset="0"/>
+                  <a:ea typeface="Calibri" panose="020F0502020204030204" pitchFamily="34" charset="0"/>
+                  <a:cs typeface="Calibri" panose="020F0502020204030204" pitchFamily="34" charset="0"/>
+                </a:rPr>
+                <a:t> }}</a:t>
+              </a:r>
+            </a:p>
+          </p:txBody>
+        </p:sp>
+        <p:sp>
+          <p:nvSpPr>
+            <p:cNvPr id="4" name="Content Placeholder 2">
+              <a:extLst>
+                <a:ext uri="{FF2B5EF4-FFF2-40B4-BE49-F238E27FC236}">
+                  <a16:creationId xmlns:a16="http://schemas.microsoft.com/office/drawing/2014/main" id="{86BC0765-9898-9F66-2E1D-98D68C69CBBA}"/>
+                </a:ext>
+              </a:extLst>
+            </p:cNvPr>
+            <p:cNvSpPr txBox="1">
+              <a:spLocks/>
+            </p:cNvSpPr>
+            <p:nvPr/>
+          </p:nvSpPr>
+          <p:spPr>
+            <a:xfrm>
+              <a:off x="5315606" y="4290696"/>
+              <a:ext cx="3113690" cy="1405266"/>
+            </a:xfrm>
+            <a:prstGeom prst="rect">
+              <a:avLst/>
+            </a:prstGeom>
+          </p:spPr>
+          <p:txBody>
+            <a:bodyPr vert="horz" lIns="91440" tIns="45720" rIns="91440" bIns="45720" rtlCol="0">
+              <a:normAutofit/>
+            </a:bodyPr>
+            <a:lstStyle>
+              <a:lvl1pPr marL="228600" indent="-228600" algn="l" defTabSz="914400" rtl="0" eaLnBrk="1" latinLnBrk="0" hangingPunct="1">
+                <a:lnSpc>
+                  <a:spcPct val="90000"/>
+                </a:lnSpc>
+                <a:spcBef>
+                  <a:spcPts val="1000"/>
+                </a:spcBef>
+                <a:buFont typeface="Arial" panose="020B0604020202020204" pitchFamily="34" charset="0"/>
+                <a:buChar char="•"/>
+                <a:defRPr sz="2800" kern="1200">
+                  <a:solidFill>
+                    <a:schemeClr val="tx1"/>
+                  </a:solidFill>
+                  <a:latin typeface="+mn-lt"/>
+                  <a:ea typeface="+mn-ea"/>
+                  <a:cs typeface="+mn-cs"/>
+                </a:defRPr>
+              </a:lvl1pPr>
+              <a:lvl2pPr marL="685800" indent="-228600" algn="l" defTabSz="914400" rtl="0" eaLnBrk="1" latinLnBrk="0" hangingPunct="1">
+                <a:lnSpc>
+                  <a:spcPct val="90000"/>
+                </a:lnSpc>
+                <a:spcBef>
+                  <a:spcPts val="500"/>
+                </a:spcBef>
+                <a:buFont typeface="Arial" panose="020B0604020202020204" pitchFamily="34" charset="0"/>
+                <a:buChar char="•"/>
+                <a:defRPr sz="2400" kern="1200">
+                  <a:solidFill>
+                    <a:schemeClr val="tx1"/>
+                  </a:solidFill>
+                  <a:latin typeface="+mn-lt"/>
+                  <a:ea typeface="+mn-ea"/>
+                  <a:cs typeface="+mn-cs"/>
+                </a:defRPr>
+              </a:lvl2pPr>
+              <a:lvl3pPr marL="1143000" indent="-228600" algn="l" defTabSz="914400" rtl="0" eaLnBrk="1" latinLnBrk="0" hangingPunct="1">
+                <a:lnSpc>
+                  <a:spcPct val="90000"/>
+                </a:lnSpc>
+                <a:spcBef>
+                  <a:spcPts val="500"/>
+                </a:spcBef>
+                <a:buFont typeface="Arial" panose="020B0604020202020204" pitchFamily="34" charset="0"/>
+                <a:buChar char="•"/>
+                <a:defRPr sz="2000" kern="1200">
+                  <a:solidFill>
+                    <a:schemeClr val="tx1"/>
+                  </a:solidFill>
+                  <a:latin typeface="+mn-lt"/>
+                  <a:ea typeface="+mn-ea"/>
+                  <a:cs typeface="+mn-cs"/>
+                </a:defRPr>
+              </a:lvl3pPr>
+              <a:lvl4pPr marL="1600200" indent="-228600" algn="l" defTabSz="914400" rtl="0" eaLnBrk="1" latinLnBrk="0" hangingPunct="1">
+                <a:lnSpc>
+                  <a:spcPct val="90000"/>
+                </a:lnSpc>
+                <a:spcBef>
+                  <a:spcPts val="500"/>
+                </a:spcBef>
+                <a:buFont typeface="Arial" panose="020B0604020202020204" pitchFamily="34" charset="0"/>
+                <a:buChar char="•"/>
+                <a:defRPr sz="1800" kern="1200">
+                  <a:solidFill>
+                    <a:schemeClr val="tx1"/>
+                  </a:solidFill>
+                  <a:latin typeface="+mn-lt"/>
+                  <a:ea typeface="+mn-ea"/>
+                  <a:cs typeface="+mn-cs"/>
+                </a:defRPr>
+              </a:lvl4pPr>
+              <a:lvl5pPr marL="2057400" indent="-228600" algn="l" defTabSz="914400" rtl="0" eaLnBrk="1" latinLnBrk="0" hangingPunct="1">
+                <a:lnSpc>
+                  <a:spcPct val="90000"/>
+                </a:lnSpc>
+                <a:spcBef>
+                  <a:spcPts val="500"/>
+                </a:spcBef>
+                <a:buFont typeface="Arial" panose="020B0604020202020204" pitchFamily="34" charset="0"/>
+                <a:buChar char="•"/>
+                <a:defRPr sz="1800" kern="1200">
+                  <a:solidFill>
+                    <a:schemeClr val="tx1"/>
+                  </a:solidFill>
+                  <a:latin typeface="+mn-lt"/>
+                  <a:ea typeface="+mn-ea"/>
+                  <a:cs typeface="+mn-cs"/>
+                </a:defRPr>
+              </a:lvl5pPr>
+              <a:lvl6pPr marL="2514600" indent="-228600" algn="l" defTabSz="914400" rtl="0" eaLnBrk="1" latinLnBrk="0" hangingPunct="1">
+                <a:lnSpc>
+                  <a:spcPct val="90000"/>
+                </a:lnSpc>
+                <a:spcBef>
+                  <a:spcPts val="500"/>
+                </a:spcBef>
+                <a:buFont typeface="Arial" panose="020B0604020202020204" pitchFamily="34" charset="0"/>
+                <a:buChar char="•"/>
+                <a:defRPr sz="1800" kern="1200">
+                  <a:solidFill>
+                    <a:schemeClr val="tx1"/>
+                  </a:solidFill>
+                  <a:latin typeface="+mn-lt"/>
+                  <a:ea typeface="+mn-ea"/>
+                  <a:cs typeface="+mn-cs"/>
+                </a:defRPr>
+              </a:lvl6pPr>
+              <a:lvl7pPr marL="2971800" indent="-228600" algn="l" defTabSz="914400" rtl="0" eaLnBrk="1" latinLnBrk="0" hangingPunct="1">
+                <a:lnSpc>
+                  <a:spcPct val="90000"/>
+                </a:lnSpc>
+                <a:spcBef>
+                  <a:spcPts val="500"/>
+                </a:spcBef>
+                <a:buFont typeface="Arial" panose="020B0604020202020204" pitchFamily="34" charset="0"/>
+                <a:buChar char="•"/>
+                <a:defRPr sz="1800" kern="1200">
+                  <a:solidFill>
+                    <a:schemeClr val="tx1"/>
+                  </a:solidFill>
+                  <a:latin typeface="+mn-lt"/>
+                  <a:ea typeface="+mn-ea"/>
+                  <a:cs typeface="+mn-cs"/>
+                </a:defRPr>
+              </a:lvl7pPr>
+              <a:lvl8pPr marL="3429000" indent="-228600" algn="l" defTabSz="914400" rtl="0" eaLnBrk="1" latinLnBrk="0" hangingPunct="1">
+                <a:lnSpc>
+                  <a:spcPct val="90000"/>
+                </a:lnSpc>
+                <a:spcBef>
+                  <a:spcPts val="500"/>
+                </a:spcBef>
+                <a:buFont typeface="Arial" panose="020B0604020202020204" pitchFamily="34" charset="0"/>
+                <a:buChar char="•"/>
+                <a:defRPr sz="1800" kern="1200">
+                  <a:solidFill>
+                    <a:schemeClr val="tx1"/>
+                  </a:solidFill>
+                  <a:latin typeface="+mn-lt"/>
+                  <a:ea typeface="+mn-ea"/>
+                  <a:cs typeface="+mn-cs"/>
+                </a:defRPr>
+              </a:lvl8pPr>
+              <a:lvl9pPr marL="3886200" indent="-228600" algn="l" defTabSz="914400" rtl="0" eaLnBrk="1" latinLnBrk="0" hangingPunct="1">
+                <a:lnSpc>
+                  <a:spcPct val="90000"/>
+                </a:lnSpc>
+                <a:spcBef>
+                  <a:spcPts val="500"/>
+                </a:spcBef>
+                <a:buFont typeface="Arial" panose="020B0604020202020204" pitchFamily="34" charset="0"/>
+                <a:buChar char="•"/>
+                <a:defRPr sz="1800" kern="1200">
+                  <a:solidFill>
+                    <a:schemeClr val="tx1"/>
+                  </a:solidFill>
+                  <a:latin typeface="+mn-lt"/>
+                  <a:ea typeface="+mn-ea"/>
+                  <a:cs typeface="+mn-cs"/>
+                </a:defRPr>
+              </a:lvl9pPr>
+            </a:lstStyle>
+            <a:p>
+              <a:r>
+                <a:rPr lang="en-US" dirty="0">
+                  <a:latin typeface="Calibri" panose="020F0502020204030204" pitchFamily="34" charset="0"/>
+                  <a:ea typeface="Calibri" panose="020F0502020204030204" pitchFamily="34" charset="0"/>
+                  <a:cs typeface="Calibri" panose="020F0502020204030204" pitchFamily="34" charset="0"/>
+                </a:rPr>
+                <a:t>Grouped 2: {{ </a:t>
+              </a:r>
+              <a:r>
+                <a:rPr lang="en-US" dirty="0" err="1">
+                  <a:latin typeface="Calibri" panose="020F0502020204030204" pitchFamily="34" charset="0"/>
+                  <a:ea typeface="Calibri" panose="020F0502020204030204" pitchFamily="34" charset="0"/>
+                  <a:cs typeface="Calibri" panose="020F0502020204030204" pitchFamily="34" charset="0"/>
+                </a:rPr>
+                <a:t>user.cohort.name</a:t>
+              </a:r>
+              <a:r>
+                <a:rPr lang="en-US" dirty="0">
+                  <a:latin typeface="Calibri" panose="020F0502020204030204" pitchFamily="34" charset="0"/>
+                  <a:ea typeface="Calibri" panose="020F0502020204030204" pitchFamily="34" charset="0"/>
+                  <a:cs typeface="Calibri" panose="020F0502020204030204" pitchFamily="34" charset="0"/>
+                </a:rPr>
+                <a:t> }}</a:t>
+              </a:r>
+            </a:p>
+          </p:txBody>
+        </p:sp>
+      </p:grpSp>
+    </p:spTree>
+    <p:extLst>
+      <p:ext uri="{BB962C8B-B14F-4D97-AF65-F5344CB8AC3E}">
+        <p14:creationId xmlns:p14="http://schemas.microsoft.com/office/powerpoint/2010/main" val="2773459250"/>
+      </p:ext>
+    </p:extLst>
+  </p:cSld>
+  <p:clrMapOvr>
+    <a:masterClrMapping/>
+  </p:clrMapOvr>
+</p:sld>
+</file>
+
+<file path=ppt/slides/slide5.xml><?xml version="1.0" encoding="utf-8"?>
+<p:sld xmlns:a="http://schemas.openxmlformats.org/drawingml/2006/main" xmlns:r="http://schemas.openxmlformats.org/officeDocument/2006/relationships" xmlns:p="http://schemas.openxmlformats.org/presentationml/2006/main">
+  <p:cSld>
+    <p:spTree>
+      <p:nvGrpSpPr>
+        <p:cNvPr id="1" name="">
+          <a:extLst>
+            <a:ext uri="{FF2B5EF4-FFF2-40B4-BE49-F238E27FC236}">
+              <a16:creationId xmlns:a16="http://schemas.microsoft.com/office/drawing/2014/main" id="{82BAE2D5-0041-72C4-89D0-8EDB45DE8001}"/>
+            </a:ext>
+          </a:extLst>
+        </p:cNvPr>
+        <p:cNvGrpSpPr/>
+        <p:nvPr/>
+      </p:nvGrpSpPr>
+      <p:grpSpPr>
+        <a:xfrm>
+          <a:off x="0" y="0"/>
+          <a:ext cx="0" cy="0"/>
+          <a:chOff x="0" y="0"/>
+          <a:chExt cx="0" cy="0"/>
+        </a:xfrm>
+      </p:grpSpPr>
+      <p:sp>
+        <p:nvSpPr>
+          <p:cNvPr id="3" name="Title 2">
+            <a:extLst>
+              <a:ext uri="{FF2B5EF4-FFF2-40B4-BE49-F238E27FC236}">
+                <a16:creationId xmlns:a16="http://schemas.microsoft.com/office/drawing/2014/main" id="{EFA643D7-687F-4D92-54C0-B0C05EF3BC7E}"/>
+              </a:ext>
+            </a:extLst>
+          </p:cNvPr>
+          <p:cNvSpPr>
+            <a:spLocks noGrp="1"/>
+          </p:cNvSpPr>
+          <p:nvPr>
+            <p:ph type="title"/>
+          </p:nvPr>
+        </p:nvSpPr>
+        <p:spPr/>
+        <p:txBody>
+          <a:bodyPr/>
+          <a:lstStyle/>
+          <a:p>
+            <a:r>
+              <a:rPr lang="en-US" dirty="0"/>
+              <a:t>Swap rows and cols</a:t>
+            </a:r>
+          </a:p>
+        </p:txBody>
+      </p:sp>
+      <p:sp>
+        <p:nvSpPr>
+          <p:cNvPr id="4" name="Text Placeholder 3">
+            <a:extLst>
+              <a:ext uri="{FF2B5EF4-FFF2-40B4-BE49-F238E27FC236}">
+                <a16:creationId xmlns:a16="http://schemas.microsoft.com/office/drawing/2014/main" id="{5632C2B7-EC1D-7FFF-6086-38B52CE1D1AF}"/>
+              </a:ext>
+            </a:extLst>
+          </p:cNvPr>
+          <p:cNvSpPr>
+            <a:spLocks noGrp="1"/>
+          </p:cNvSpPr>
+          <p:nvPr>
+            <p:ph type="body" idx="1"/>
+          </p:nvPr>
+        </p:nvSpPr>
+        <p:spPr/>
+        <p:txBody>
+          <a:bodyPr/>
+          <a:lstStyle/>
+          <a:p>
+            <a:r>
+              <a:rPr lang="en-US" dirty="0"/>
+              <a:t>Not swapped</a:t>
+            </a:r>
+          </a:p>
+        </p:txBody>
+      </p:sp>
+      <p:graphicFrame>
+        <p:nvGraphicFramePr>
+          <p:cNvPr id="6" name="Content Placeholder 5">
+            <a:extLst>
+              <a:ext uri="{FF2B5EF4-FFF2-40B4-BE49-F238E27FC236}">
+                <a16:creationId xmlns:a16="http://schemas.microsoft.com/office/drawing/2014/main" id="{97EC6868-6C96-E184-A30D-D591FA431572}"/>
+              </a:ext>
+            </a:extLst>
+          </p:cNvPr>
+          <p:cNvGraphicFramePr>
+            <a:graphicFrameLocks noGrp="1"/>
+          </p:cNvGraphicFramePr>
+          <p:nvPr>
+            <p:ph sz="half" idx="2"/>
+            <p:extLst>
+              <p:ext uri="{D42A27DB-BD31-4B8C-83A1-F6EECF244321}">
+                <p14:modId xmlns:p14="http://schemas.microsoft.com/office/powerpoint/2010/main" val="147707056"/>
+              </p:ext>
+            </p:extLst>
+          </p:nvPr>
+        </p:nvGraphicFramePr>
+        <p:xfrm>
+          <a:off x="839788" y="2505075"/>
+          <a:ext cx="5157787" cy="3684588"/>
+        </p:xfrm>
+        <a:graphic>
+          <a:graphicData uri="http://schemas.openxmlformats.org/drawingml/2006/chart">
+            <c:chart xmlns:c="http://schemas.openxmlformats.org/drawingml/2006/chart" xmlns:r="http://schemas.openxmlformats.org/officeDocument/2006/relationships" r:id="rId2"/>
+          </a:graphicData>
+        </a:graphic>
+      </p:graphicFrame>
+      <p:sp>
+        <p:nvSpPr>
+          <p:cNvPr id="5" name="Text Placeholder 4">
+            <a:extLst>
+              <a:ext uri="{FF2B5EF4-FFF2-40B4-BE49-F238E27FC236}">
+                <a16:creationId xmlns:a16="http://schemas.microsoft.com/office/drawing/2014/main" id="{D621D6C8-BB41-6100-D5C4-440080433B75}"/>
+              </a:ext>
+            </a:extLst>
+          </p:cNvPr>
+          <p:cNvSpPr>
+            <a:spLocks noGrp="1"/>
+          </p:cNvSpPr>
+          <p:nvPr>
+            <p:ph type="body" sz="quarter" idx="3"/>
+          </p:nvPr>
+        </p:nvSpPr>
+        <p:spPr/>
+        <p:txBody>
+          <a:bodyPr/>
+          <a:lstStyle/>
+          <a:p>
+            <a:r>
+              <a:rPr lang="en-US" dirty="0"/>
+              <a:t>Swapped</a:t>
+            </a:r>
+          </a:p>
+        </p:txBody>
+      </p:sp>
+      <p:graphicFrame>
+        <p:nvGraphicFramePr>
+          <p:cNvPr id="12" name="Content Placeholder 5">
+            <a:extLst>
+              <a:ext uri="{FF2B5EF4-FFF2-40B4-BE49-F238E27FC236}">
+                <a16:creationId xmlns:a16="http://schemas.microsoft.com/office/drawing/2014/main" id="{AADF89EA-6151-40BF-043E-3B49A306E57B}"/>
+              </a:ext>
+            </a:extLst>
+          </p:cNvPr>
+          <p:cNvGraphicFramePr>
+            <a:graphicFrameLocks noGrp="1"/>
+          </p:cNvGraphicFramePr>
+          <p:nvPr>
+            <p:ph sz="quarter" idx="4"/>
+            <p:extLst>
+              <p:ext uri="{D42A27DB-BD31-4B8C-83A1-F6EECF244321}">
+                <p14:modId xmlns:p14="http://schemas.microsoft.com/office/powerpoint/2010/main" val="3414074341"/>
+              </p:ext>
+            </p:extLst>
+          </p:nvPr>
+        </p:nvGraphicFramePr>
+        <p:xfrm>
+          <a:off x="6172200" y="2505075"/>
+          <a:ext cx="5183188" cy="3684588"/>
+        </p:xfrm>
+        <a:graphic>
+          <a:graphicData uri="http://schemas.openxmlformats.org/drawingml/2006/chart">
+            <c:chart xmlns:c="http://schemas.openxmlformats.org/drawingml/2006/chart" xmlns:r="http://schemas.openxmlformats.org/officeDocument/2006/relationships" r:id="rId3"/>
+          </a:graphicData>
+        </a:graphic>
+      </p:graphicFrame>
+    </p:spTree>
+    <p:extLst>
+      <p:ext uri="{BB962C8B-B14F-4D97-AF65-F5344CB8AC3E}">
+        <p14:creationId xmlns:p14="http://schemas.microsoft.com/office/powerpoint/2010/main" val="2461931502"/>
+      </p:ext>
+    </p:extLst>
+  </p:cSld>
+  <p:clrMapOvr>
+    <a:masterClrMapping/>
+  </p:clrMapOvr>
+</p:sld>
 </file>
 
 <file path=ppt/theme/theme1.xml><?xml version="1.0" encoding="utf-8"?>

</xml_diff>